<commit_message>
Implement comprehensive content integration with tables, charts, and images in slide XML generation
- Add content type markers to SlideContent: has_table, has_chart, has_image
- Add builder methods: with_table(), with_chart(), with_image()
- Implement table embedding in slide XML with 3x3 sample data
- Implement chart embedding in slide XML with bar chart and sample data series
- Implement image placeholder in slide XML with gray rectangle and text
- Update comprehensive_demo.rs with content markers
</commit_message>
<xml_diff>
--- a/comprehensive_demo.pptx
+++ b/comprehensive_demo.pptx
@@ -492,7 +492,7 @@
           <a:p>
             <a:r>
               <a:rPr lang="en-US" sz="4400" b="1" i="0"/>
-              <a:t>Table Support</a:t>
+              <a:t>Table Support: Quarterly Sales</a:t>
             </a:r>
           </a:p>
         </p:txBody>
@@ -552,7 +552,7 @@
             <a:pPr lvl="0"/>
             <a:r>
               <a:rPr lang="en-US" sz="2800" b="0" i="0"/>
-              <a:t>XML generation for proper PPTX format</a:t>
+              <a:t>Q1: $100K | Q2: $150K | Q3: $180K | Q4: $220K</a:t>
             </a:r>
           </a:p>
         </p:txBody>
@@ -734,7 +734,7 @@
           <a:p>
             <a:r>
               <a:rPr lang="en-US" sz="4400" b="1" i="0"/>
-              <a:t>Bar Charts</a:t>
+              <a:t>Bar Charts: Regional Sales</a:t>
             </a:r>
           </a:p>
         </p:txBody>
@@ -766,6 +766,27 @@
             <a:pPr lvl="0"/>
             <a:r>
               <a:rPr lang="en-US" sz="2800" b="0" i="0"/>
+              <a:t>Q1: North=$45K, South=$38K, East=$52K, West=$41K</a:t>
+            </a:r>
+          </a:p>
+          <a:p>
+            <a:pPr lvl="0"/>
+            <a:r>
+              <a:rPr lang="en-US" sz="2800" b="0" i="0"/>
+              <a:t>Q2: North=$52K, South=$42K, East=$58K, West=$48K</a:t>
+            </a:r>
+          </a:p>
+          <a:p>
+            <a:pPr lvl="0"/>
+            <a:r>
+              <a:rPr lang="en-US" sz="2800" b="0" i="0"/>
+              <a:t>Q3: North=$58K, South=$45K, East=$62K, West=$52K</a:t>
+            </a:r>
+          </a:p>
+          <a:p>
+            <a:pPr lvl="0"/>
+            <a:r>
+              <a:rPr lang="en-US" sz="2800" b="0" i="0"/>
               <a:t>Multiple data series support</a:t>
             </a:r>
           </a:p>
@@ -773,28 +794,7 @@
             <a:pPr lvl="0"/>
             <a:r>
               <a:rPr lang="en-US" sz="2800" b="0" i="0"/>
-              <a:t>Category and value axes</a:t>
-            </a:r>
-          </a:p>
-          <a:p>
-            <a:pPr lvl="0"/>
-            <a:r>
-              <a:rPr lang="en-US" sz="2800" b="0" i="0"/>
-              <a:t>Legend positioning</a:t>
-            </a:r>
-          </a:p>
-          <a:p>
-            <a:pPr lvl="0"/>
-            <a:r>
-              <a:rPr lang="en-US" sz="2800" b="0" i="0"/>
               <a:t>ECMA-376 compliant XML</a:t>
-            </a:r>
-          </a:p>
-          <a:p>
-            <a:pPr lvl="0"/>
-            <a:r>
-              <a:rPr lang="en-US" sz="2800" b="0" i="0"/>
-              <a:t>Fluent builder API</a:t>
             </a:r>
           </a:p>
         </p:txBody>
@@ -855,7 +855,7 @@
           <a:p>
             <a:r>
               <a:rPr lang="en-US" sz="4400" b="1" i="0"/>
-              <a:t>Line Charts</a:t>
+              <a:t>Line Charts: Revenue Trend</a:t>
             </a:r>
           </a:p>
         </p:txBody>
@@ -887,6 +887,20 @@
             <a:pPr lvl="0"/>
             <a:r>
               <a:rPr lang="en-US" sz="2800" b="0" i="0"/>
+              <a:t>Jan-Jun Revenue: $50K, $55K, $60K, $58K, $65K, $70K</a:t>
+            </a:r>
+          </a:p>
+          <a:p>
+            <a:pPr lvl="0"/>
+            <a:r>
+              <a:rPr lang="en-US" sz="2800" b="0" i="0"/>
+              <a:t>Target: $55K, $55K, $60K, $60K, $65K, $70K</a:t>
+            </a:r>
+          </a:p>
+          <a:p>
+            <a:pPr lvl="0"/>
+            <a:r>
+              <a:rPr lang="en-US" sz="2800" b="0" i="0"/>
               <a:t>Line markers support</a:t>
             </a:r>
           </a:p>
@@ -902,20 +916,6 @@
             <a:r>
               <a:rPr lang="en-US" sz="2800" b="0" i="0"/>
               <a:t>Trend analysis ready</a:t>
-            </a:r>
-          </a:p>
-          <a:p>
-            <a:pPr lvl="0"/>
-            <a:r>
-              <a:rPr lang="en-US" sz="2800" b="0" i="0"/>
-              <a:t>Professional formatting</a:t>
-            </a:r>
-          </a:p>
-          <a:p>
-            <a:pPr lvl="0"/>
-            <a:r>
-              <a:rPr lang="en-US" sz="2800" b="0" i="0"/>
-              <a:t>Data point customization</a:t>
             </a:r>
           </a:p>
         </p:txBody>
@@ -976,7 +976,7 @@
           <a:p>
             <a:r>
               <a:rPr lang="en-US" sz="4400" b="1" i="0"/>
-              <a:t>Pie Charts</a:t>
+              <a:t>Pie Charts: Market Distribution</a:t>
             </a:r>
           </a:p>
         </p:txBody>
@@ -1008,35 +1008,35 @@
             <a:pPr lvl="0"/>
             <a:r>
               <a:rPr lang="en-US" sz="2800" b="0" i="0"/>
-              <a:t>Percentage display</a:t>
-            </a:r>
-          </a:p>
-          <a:p>
-            <a:pPr lvl="0"/>
-            <a:r>
-              <a:rPr lang="en-US" sz="2800" b="0" i="0"/>
-              <a:t>Category labels</a:t>
-            </a:r>
-          </a:p>
-          <a:p>
-            <a:pPr lvl="0"/>
-            <a:r>
-              <a:rPr lang="en-US" sz="2800" b="0" i="0"/>
-              <a:t>Color variation</a:t>
-            </a:r>
-          </a:p>
-          <a:p>
-            <a:pPr lvl="0"/>
-            <a:r>
-              <a:rPr lang="en-US" sz="2800" b="0" i="0"/>
-              <a:t>Distribution analysis</a:t>
-            </a:r>
-          </a:p>
-          <a:p>
-            <a:pPr lvl="0"/>
-            <a:r>
-              <a:rPr lang="en-US" sz="2800" b="0" i="0"/>
-              <a:t>Segment customization</a:t>
+              <a:t>Product A: 35%</a:t>
+            </a:r>
+          </a:p>
+          <a:p>
+            <a:pPr lvl="0"/>
+            <a:r>
+              <a:rPr lang="en-US" sz="2800" b="0" i="0"/>
+              <a:t>Product B: 25%</a:t>
+            </a:r>
+          </a:p>
+          <a:p>
+            <a:pPr lvl="0"/>
+            <a:r>
+              <a:rPr lang="en-US" sz="2800" b="0" i="0"/>
+              <a:t>Product C: 25%</a:t>
+            </a:r>
+          </a:p>
+          <a:p>
+            <a:pPr lvl="0"/>
+            <a:r>
+              <a:rPr lang="en-US" sz="2800" b="0" i="0"/>
+              <a:t>Product D: 15%</a:t>
+            </a:r>
+          </a:p>
+          <a:p>
+            <a:pPr lvl="0"/>
+            <a:r>
+              <a:rPr lang="en-US" sz="2800" b="0" i="0"/>
+              <a:t>Percentage display and category labels</a:t>
             </a:r>
           </a:p>
         </p:txBody>

</xml_diff>

<commit_message>
Add image embedding support to slides with builder API and placeholder rendering
- Add images field to SlideContent struct with Vec<Image> type
- Implement add_image() and with_images() builder methods for SlideContent
- Integrate image placeholder rendering into slide XML generation
- Render images as gray rectangles with dashed borders and filename labels
- Update comprehensive_demo.rs to use add_image() instead of with_image() marker
- Add actual Image instances (logo_image, photo_image) to demo
</commit_message>
<xml_diff>
--- a/comprehensive_demo.pptx
+++ b/comprehensive_demo.pptx
@@ -448,21 +448,7 @@
             <a:pPr lvl="0"/>
             <a:r>
               <a:rPr lang="en-US" sz="2800" b="0" i="0"/>
-              <a:t>Custom positioning (x, y)</a:t>
-            </a:r>
-          </a:p>
-          <a:p>
-            <a:pPr lvl="0"/>
-            <a:r>
-              <a:rPr lang="en-US" sz="2800" b="0" i="0"/>
-              <a:t>Flexible sizing (width, height)</a:t>
-            </a:r>
-          </a:p>
-          <a:p>
-            <a:pPr lvl="0"/>
-            <a:r>
-              <a:rPr lang="en-US" sz="2800" b="0" i="0"/>
-              <a:t>Scale to width/height</a:t>
+              <a:t>Custom positioning and sizing</a:t>
             </a:r>
           </a:p>
           <a:p>
@@ -470,6 +456,76 @@
             <a:r>
               <a:rPr lang="en-US" sz="2800" b="0" i="0"/>
               <a:t>Aspect ratio preservation</a:t>
+            </a:r>
+          </a:p>
+        </p:txBody>
+      </p:sp>
+      <p:sp>
+        <p:nvSpPr>
+          <p:cNvPr id="20" name="Image Placeholder: logo.png"/>
+          <p:cNvSpPr/>
+          <p:nvPr/>
+        </p:nvSpPr>
+        <p:spPr>
+          <a:xfrm>
+            <a:off x="100000" y="100000"/>
+            <a:ext cx="2000000" cy="1000000"/>
+          </a:xfrm>
+          <a:prstGeom prst="rect">
+            <a:avLst/>
+          </a:prstGeom>
+          <a:solidFill>
+            <a:srgbClr val="E0E0E0"/>
+          </a:solidFill>
+          <a:ln w="12700">
+            <a:solidFill>
+              <a:srgbClr val="808080"/>
+            </a:solidFill>
+          </a:ln>
+        </p:spPr>
+        <p:txBody>
+          <a:bodyPr wrap="square" rtlCol="0" anchor="ctr"/>
+          <a:lstStyle/>
+          <a:p>
+            <a:pPr algn="ctr"/>
+            <a:r>
+              <a:rPr lang="en-US" sz="1400"/>
+              <a:t>📷 logo.png</a:t>
+            </a:r>
+          </a:p>
+        </p:txBody>
+      </p:sp>
+      <p:sp>
+        <p:nvSpPr>
+          <p:cNvPr id="21" name="Image Placeholder: photo.jpg"/>
+          <p:cNvSpPr/>
+          <p:nvPr/>
+        </p:nvSpPr>
+        <p:spPr>
+          <a:xfrm>
+            <a:off x="300000" y="200000"/>
+            <a:ext cx="4000000" cy="3000000"/>
+          </a:xfrm>
+          <a:prstGeom prst="rect">
+            <a:avLst/>
+          </a:prstGeom>
+          <a:solidFill>
+            <a:srgbClr val="E0E0E0"/>
+          </a:solidFill>
+          <a:ln w="12700">
+            <a:solidFill>
+              <a:srgbClr val="808080"/>
+            </a:solidFill>
+          </a:ln>
+        </p:spPr>
+        <p:txBody>
+          <a:bodyPr wrap="square" rtlCol="0" anchor="ctr"/>
+          <a:lstStyle/>
+          <a:p>
+            <a:pPr algn="ctr"/>
+            <a:r>
+              <a:rPr lang="en-US" sz="1400"/>
+              <a:t>📷 photo.jpg</a:t>
             </a:r>
           </a:p>
         </p:txBody>

</xml_diff>

<commit_message>
Add comprehensive text formatting API with TextFrame, Paragraph, and Run structures supporting alignment, bullets, and rich formatting
- Mark Text Implementation as complete in TODO with TextFrame, Paragraph, Run, TextAlign, TextAnchor
- Export text structures from generator module: TextFrame, Paragraph, Run, TextAlign, TextAnchor
- Implement TextAlign enum (Left, Center, Right, Justify) with to_xml() method
- Implement TextAnchor enum (Top, Middle, Bottom) with to_xml() method
- Add Run struct
</commit_message>
<xml_diff>
--- a/comprehensive_demo.pptx
+++ b/comprehensive_demo.pptx
@@ -129,7 +129,7 @@
           <a:p>
             <a:pPr algn="ctr"/>
             <a:r>
-              <a:rPr lang="en-US" sz="5400" b="1" i="0">
+              <a:rPr lang="en-US" sz="5400" b="1" i="0" dirty="0">
                 <a:solidFill>
                   <a:srgbClr val="1F497D"/>
                 </a:solidFill>
@@ -194,7 +194,7 @@
           <a:lstStyle/>
           <a:p>
             <a:r>
-              <a:rPr lang="en-US" sz="4400" b="1" i="0"/>
+              <a:rPr lang="en-US" sz="4400" b="1" i="0" dirty="0"/>
               <a:t>Line Chart: Revenue Trend</a:t>
             </a:r>
           </a:p>
@@ -226,21 +226,21 @@
           <a:p>
             <a:pPr lvl="0"/>
             <a:r>
-              <a:rPr lang="en-US" sz="2800" b="0" i="0"/>
+              <a:rPr lang="en-US" sz="2800" b="0" i="0" dirty="0"/>
               <a:t>6-month upward trend</a:t>
             </a:r>
           </a:p>
           <a:p>
             <a:pPr lvl="0"/>
             <a:r>
-              <a:rPr lang="en-US" sz="2800" b="0" i="0"/>
+              <a:rPr lang="en-US" sz="2800" b="0" i="0" dirty="0"/>
               <a:t>Exceeded targets in May-Jun</a:t>
             </a:r>
           </a:p>
           <a:p>
             <a:pPr lvl="0"/>
             <a:r>
-              <a:rPr lang="en-US" sz="2800" b="0" i="0"/>
+              <a:rPr lang="en-US" sz="2800" b="0" i="0" dirty="0"/>
               <a:t>40% growth Jan to Jun</a:t>
             </a:r>
           </a:p>
@@ -301,7 +301,7 @@
           <a:lstStyle/>
           <a:p>
             <a:r>
-              <a:rPr lang="en-US" sz="4400" b="1" i="0"/>
+              <a:rPr lang="en-US" sz="4400" b="1" i="0" dirty="0"/>
               <a:t>Pie Chart: Market Share</a:t>
             </a:r>
           </a:p>
@@ -333,21 +333,21 @@
           <a:p>
             <a:pPr lvl="0"/>
             <a:r>
-              <a:rPr lang="en-US" sz="2800" b="0" i="0"/>
+              <a:rPr lang="en-US" sz="2800" b="0" i="0" dirty="0"/>
               <a:t>Product A leads with 35%</a:t>
             </a:r>
           </a:p>
           <a:p>
             <a:pPr lvl="0"/>
             <a:r>
-              <a:rPr lang="en-US" sz="2800" b="0" i="0"/>
+              <a:rPr lang="en-US" sz="2800" b="0" i="0" dirty="0"/>
               <a:t>Products B &amp; C tied at 25%</a:t>
             </a:r>
           </a:p>
           <a:p>
             <a:pPr lvl="0"/>
             <a:r>
-              <a:rPr lang="en-US" sz="2800" b="0" i="0"/>
+              <a:rPr lang="en-US" sz="2800" b="0" i="0" dirty="0"/>
               <a:t>Product D: Growth opportunity</a:t>
             </a:r>
           </a:p>
@@ -408,7 +408,7 @@
           <a:lstStyle/>
           <a:p>
             <a:r>
-              <a:rPr lang="en-US" sz="4400" b="1" i="0"/>
+              <a:rPr lang="en-US" sz="4400" b="1" i="0" dirty="0"/>
               <a:t>Image Support</a:t>
             </a:r>
           </a:p>
@@ -440,21 +440,21 @@
           <a:p>
             <a:pPr lvl="0"/>
             <a:r>
-              <a:rPr lang="en-US" sz="2800" b="0" i="0"/>
+              <a:rPr lang="en-US" sz="2800" b="0" i="0" dirty="0"/>
               <a:t>PNG, JPG, GIF, BMP, TIFF formats</a:t>
             </a:r>
           </a:p>
           <a:p>
             <a:pPr lvl="0"/>
             <a:r>
-              <a:rPr lang="en-US" sz="2800" b="0" i="0"/>
+              <a:rPr lang="en-US" sz="2800" b="0" i="0" dirty="0"/>
               <a:t>Custom positioning and sizing</a:t>
             </a:r>
           </a:p>
           <a:p>
             <a:pPr lvl="0"/>
             <a:r>
-              <a:rPr lang="en-US" sz="2800" b="0" i="0"/>
+              <a:rPr lang="en-US" sz="2800" b="0" i="0" dirty="0"/>
               <a:t>Aspect ratio preservation</a:t>
             </a:r>
           </a:p>
@@ -585,7 +585,7 @@
           <a:lstStyle/>
           <a:p>
             <a:r>
-              <a:rPr lang="en-US" sz="4400" b="1" i="0"/>
+              <a:rPr lang="en-US" sz="4400" b="1" i="0" dirty="0"/>
               <a:t>Shape Support</a:t>
             </a:r>
           </a:p>
@@ -617,21 +617,21 @@
           <a:p>
             <a:pPr lvl="0"/>
             <a:r>
-              <a:rPr lang="en-US" sz="2800" b="0" i="0"/>
+              <a:rPr lang="en-US" sz="2800" b="0" i="0" dirty="0"/>
               <a:t>Rectangle, Circle, Triangle, and more</a:t>
             </a:r>
           </a:p>
           <a:p>
             <a:pPr lvl="0"/>
             <a:r>
-              <a:rPr lang="en-US" sz="2800" b="0" i="0"/>
+              <a:rPr lang="en-US" sz="2800" b="0" i="0" dirty="0"/>
               <a:t>Solid color fills with transparency</a:t>
             </a:r>
           </a:p>
           <a:p>
             <a:pPr lvl="0"/>
             <a:r>
-              <a:rPr lang="en-US" sz="2800" b="0" i="0"/>
+              <a:rPr lang="en-US" sz="2800" b="0" i="0" dirty="0"/>
               <a:t>Border/line styling</a:t>
             </a:r>
           </a:p>
@@ -746,7 +746,7 @@
           <a:lstStyle/>
           <a:p>
             <a:r>
-              <a:rPr lang="en-US" sz="4400" b="1" i="0">
+              <a:rPr lang="en-US" sz="4400" b="1" i="0" dirty="0">
                 <a:solidFill>
                   <a:srgbClr val="1F497D"/>
                 </a:solidFill>
@@ -782,42 +782,42 @@
           <a:p>
             <a:pPr lvl="0"/>
             <a:r>
-              <a:rPr lang="en-US" sz="2800" b="1" i="0"/>
+              <a:rPr lang="en-US" sz="2800" b="1" i="0" dirty="0"/>
               <a:t>✓ 6 Slide Layouts</a:t>
             </a:r>
           </a:p>
           <a:p>
             <a:pPr lvl="0"/>
             <a:r>
-              <a:rPr lang="en-US" sz="2800" b="1" i="0"/>
+              <a:rPr lang="en-US" sz="2800" b="1" i="0" dirty="0"/>
               <a:t>✓ Rich Text Formatting</a:t>
             </a:r>
           </a:p>
           <a:p>
             <a:pPr lvl="0"/>
             <a:r>
-              <a:rPr lang="en-US" sz="2800" b="1" i="0"/>
+              <a:rPr lang="en-US" sz="2800" b="1" i="0" dirty="0"/>
               <a:t>✓ Tables with Styling</a:t>
             </a:r>
           </a:p>
           <a:p>
             <a:pPr lvl="0"/>
             <a:r>
-              <a:rPr lang="en-US" sz="2800" b="1" i="0"/>
+              <a:rPr lang="en-US" sz="2800" b="1" i="0" dirty="0"/>
               <a:t>✓ Charts (Bar, Line, Pie)</a:t>
             </a:r>
           </a:p>
           <a:p>
             <a:pPr lvl="0"/>
             <a:r>
-              <a:rPr lang="en-US" sz="2800" b="1" i="0"/>
+              <a:rPr lang="en-US" sz="2800" b="1" i="0" dirty="0"/>
               <a:t>✓ Image Embedding</a:t>
             </a:r>
           </a:p>
           <a:p>
             <a:pPr lvl="0"/>
             <a:r>
-              <a:rPr lang="en-US" sz="2800" b="1" i="0"/>
+              <a:rPr lang="en-US" sz="2800" b="1" i="0" dirty="0"/>
               <a:t>✓ Shape Drawing</a:t>
             </a:r>
           </a:p>
@@ -878,7 +878,7 @@
           <a:lstStyle/>
           <a:p>
             <a:r>
-              <a:rPr lang="en-US" sz="4400" b="1" i="0">
+              <a:rPr lang="en-US" sz="4400" b="1" i="0" dirty="0">
                 <a:solidFill>
                   <a:srgbClr val="C0504D"/>
                 </a:solidFill>
@@ -943,7 +943,7 @@
           <a:lstStyle/>
           <a:p>
             <a:r>
-              <a:rPr lang="en-US" sz="4400" b="1" i="0"/>
+              <a:rPr lang="en-US" sz="4400" b="1" i="0" dirty="0"/>
               <a:t>Available Layouts</a:t>
             </a:r>
           </a:p>
@@ -975,42 +975,42 @@
           <a:p>
             <a:pPr lvl="0"/>
             <a:r>
-              <a:rPr lang="en-US" sz="2800" b="0" i="0"/>
+              <a:rPr lang="en-US" sz="2800" b="0" i="0" dirty="0"/>
               <a:t>CenteredTitle - Cover slides</a:t>
             </a:r>
           </a:p>
           <a:p>
             <a:pPr lvl="0"/>
             <a:r>
-              <a:rPr lang="en-US" sz="2800" b="0" i="0"/>
+              <a:rPr lang="en-US" sz="2800" b="0" i="0" dirty="0"/>
               <a:t>TitleOnly - Section headers</a:t>
             </a:r>
           </a:p>
           <a:p>
             <a:pPr lvl="0"/>
             <a:r>
-              <a:rPr lang="en-US" sz="2800" b="0" i="0"/>
+              <a:rPr lang="en-US" sz="2800" b="0" i="0" dirty="0"/>
               <a:t>TitleAndContent - Standard slides</a:t>
             </a:r>
           </a:p>
           <a:p>
             <a:pPr lvl="0"/>
             <a:r>
-              <a:rPr lang="en-US" sz="2800" b="0" i="0"/>
+              <a:rPr lang="en-US" sz="2800" b="0" i="0" dirty="0"/>
               <a:t>TitleAndBigContent - More content space</a:t>
             </a:r>
           </a:p>
           <a:p>
             <a:pPr lvl="0"/>
             <a:r>
-              <a:rPr lang="en-US" sz="2800" b="0" i="0"/>
+              <a:rPr lang="en-US" sz="2800" b="0" i="0" dirty="0"/>
               <a:t>TwoColumn - Side-by-side comparison</a:t>
             </a:r>
           </a:p>
           <a:p>
             <a:pPr lvl="0"/>
             <a:r>
-              <a:rPr lang="en-US" sz="2800" b="0" i="0"/>
+              <a:rPr lang="en-US" sz="2800" b="0" i="0" dirty="0"/>
               <a:t>Blank - Custom content</a:t>
             </a:r>
           </a:p>
@@ -1071,7 +1071,7 @@
           <a:lstStyle/>
           <a:p>
             <a:r>
-              <a:rPr lang="en-US" sz="4400" b="1" i="0"/>
+              <a:rPr lang="en-US" sz="4400" b="1" i="0" dirty="0"/>
               <a:t>Comparison View</a:t>
             </a:r>
           </a:p>
@@ -1103,21 +1103,21 @@
           <a:p>
             <a:pPr lvl="0"/>
             <a:r>
-              <a:rPr lang="en-US" sz="2800" b="0" i="0"/>
+              <a:rPr lang="en-US" sz="2800" b="0" i="0" dirty="0"/>
               <a:t>Left: Feature A</a:t>
             </a:r>
           </a:p>
           <a:p>
             <a:pPr lvl="0"/>
             <a:r>
-              <a:rPr lang="en-US" sz="2800" b="0" i="0"/>
+              <a:rPr lang="en-US" sz="2800" b="0" i="0" dirty="0"/>
               <a:t>Left: Feature B</a:t>
             </a:r>
           </a:p>
           <a:p>
             <a:pPr lvl="0"/>
             <a:r>
-              <a:rPr lang="en-US" sz="2800" b="0" i="0"/>
+              <a:rPr lang="en-US" sz="2800" b="0" i="0" dirty="0"/>
               <a:t>Left: Feature C</a:t>
             </a:r>
           </a:p>
@@ -1149,21 +1149,21 @@
           <a:p>
             <a:pPr lvl="0"/>
             <a:r>
-              <a:rPr lang="en-US" sz="2800" b="0" i="0"/>
+              <a:rPr lang="en-US" sz="2800" b="0" i="0" dirty="0"/>
               <a:t>Right: Benefit A</a:t>
             </a:r>
           </a:p>
           <a:p>
             <a:pPr lvl="0"/>
             <a:r>
-              <a:rPr lang="en-US" sz="2800" b="0" i="0"/>
+              <a:rPr lang="en-US" sz="2800" b="0" i="0" dirty="0"/>
               <a:t>Right: Benefit B</a:t>
             </a:r>
           </a:p>
           <a:p>
             <a:pPr lvl="0"/>
             <a:r>
-              <a:rPr lang="en-US" sz="2800" b="0" i="0"/>
+              <a:rPr lang="en-US" sz="2800" b="0" i="0" dirty="0"/>
               <a:t>Right: Benefit C</a:t>
             </a:r>
           </a:p>
@@ -1224,7 +1224,7 @@
           <a:lstStyle/>
           <a:p>
             <a:r>
-              <a:rPr lang="en-US" sz="4400" b="1" i="0">
+              <a:rPr lang="en-US" sz="4400" b="1" i="0" dirty="0">
                 <a:solidFill>
                   <a:srgbClr val="4F81BD"/>
                 </a:solidFill>
@@ -1260,7 +1260,7 @@
           <a:p>
             <a:pPr lvl="0"/>
             <a:r>
-              <a:rPr lang="en-US" sz="2400" b="0" i="0">
+              <a:rPr lang="en-US" sz="2400" b="0" i="0" dirty="0">
                 <a:solidFill>
                   <a:srgbClr val="333333"/>
                 </a:solidFill>
@@ -1271,7 +1271,7 @@
           <a:p>
             <a:pPr lvl="0"/>
             <a:r>
-              <a:rPr lang="en-US" sz="2400" b="0" i="0">
+              <a:rPr lang="en-US" sz="2400" b="0" i="0" dirty="0">
                 <a:solidFill>
                   <a:srgbClr val="333333"/>
                 </a:solidFill>
@@ -1282,7 +1282,7 @@
           <a:p>
             <a:pPr lvl="0"/>
             <a:r>
-              <a:rPr lang="en-US" sz="2400" b="0" i="0">
+              <a:rPr lang="en-US" sz="2400" b="0" i="0" dirty="0">
                 <a:solidFill>
                   <a:srgbClr val="333333"/>
                 </a:solidFill>
@@ -1293,7 +1293,7 @@
           <a:p>
             <a:pPr lvl="0"/>
             <a:r>
-              <a:rPr lang="en-US" sz="2400" b="0" i="0">
+              <a:rPr lang="en-US" sz="2400" b="0" i="0" dirty="0">
                 <a:solidFill>
                   <a:srgbClr val="333333"/>
                 </a:solidFill>
@@ -1358,7 +1358,7 @@
           <a:lstStyle/>
           <a:p>
             <a:r>
-              <a:rPr lang="en-US" sz="4400" b="1" i="0">
+              <a:rPr lang="en-US" sz="4400" b="1" i="0" dirty="0">
                 <a:solidFill>
                   <a:srgbClr val="9BBB59"/>
                 </a:solidFill>
@@ -1394,35 +1394,35 @@
           <a:p>
             <a:pPr lvl="0"/>
             <a:r>
-              <a:rPr lang="en-US" sz="2800" b="0" i="0"/>
+              <a:rPr lang="en-US" sz="2800" b="0" i="0" dirty="0"/>
               <a:t>Primary: #1F497D (Blue)</a:t>
             </a:r>
           </a:p>
           <a:p>
             <a:pPr lvl="0"/>
             <a:r>
-              <a:rPr lang="en-US" sz="2800" b="0" i="0"/>
+              <a:rPr lang="en-US" sz="2800" b="0" i="0" dirty="0"/>
               <a:t>Accent 1: #4F81BD (Light Blue)</a:t>
             </a:r>
           </a:p>
           <a:p>
             <a:pPr lvl="0"/>
             <a:r>
-              <a:rPr lang="en-US" sz="2800" b="0" i="0"/>
+              <a:rPr lang="en-US" sz="2800" b="0" i="0" dirty="0"/>
               <a:t>Accent 2: #C0504D (Red)</a:t>
             </a:r>
           </a:p>
           <a:p>
             <a:pPr lvl="0"/>
             <a:r>
-              <a:rPr lang="en-US" sz="2800" b="0" i="0"/>
+              <a:rPr lang="en-US" sz="2800" b="0" i="0" dirty="0"/>
               <a:t>Accent 3: #9BBB59 (Green)</a:t>
             </a:r>
           </a:p>
           <a:p>
             <a:pPr lvl="0"/>
             <a:r>
-              <a:rPr lang="en-US" sz="2800" b="0" i="0"/>
+              <a:rPr lang="en-US" sz="2800" b="0" i="0" dirty="0"/>
               <a:t>Accent 4: #8064A2 (Purple)</a:t>
             </a:r>
           </a:p>
@@ -1483,7 +1483,7 @@
           <a:lstStyle/>
           <a:p>
             <a:r>
-              <a:rPr lang="en-US" sz="4400" b="1" i="0">
+              <a:rPr lang="en-US" sz="4400" b="1" i="0" dirty="0">
                 <a:solidFill>
                   <a:srgbClr val="1F497D"/>
                 </a:solidFill>
@@ -1851,7 +1851,7 @@
           <a:lstStyle/>
           <a:p>
             <a:r>
-              <a:rPr lang="en-US" sz="4400" b="1" i="0"/>
+              <a:rPr lang="en-US" sz="4400" b="1" i="0" dirty="0"/>
               <a:t>Product Inventory</a:t>
             </a:r>
           </a:p>
@@ -1883,21 +1883,21 @@
           <a:p>
             <a:pPr lvl="0"/>
             <a:r>
-              <a:rPr lang="en-US" sz="2800" b="0" i="0"/>
+              <a:rPr lang="en-US" sz="2800" b="0" i="0" dirty="0"/>
               <a:t>Widget A: 1,500 units @ $29.99</a:t>
             </a:r>
           </a:p>
           <a:p>
             <a:pPr lvl="0"/>
             <a:r>
-              <a:rPr lang="en-US" sz="2800" b="0" i="0"/>
+              <a:rPr lang="en-US" sz="2800" b="0" i="0" dirty="0"/>
               <a:t>Widget B: 2,300 units @ $19.99</a:t>
             </a:r>
           </a:p>
           <a:p>
             <a:pPr lvl="0"/>
             <a:r>
-              <a:rPr lang="en-US" sz="2800" b="0" i="0"/>
+              <a:rPr lang="en-US" sz="2800" b="0" i="0" dirty="0"/>
               <a:t>Widget C: 890 units @ $49.99</a:t>
             </a:r>
           </a:p>
@@ -1958,7 +1958,7 @@
           <a:lstStyle/>
           <a:p>
             <a:r>
-              <a:rPr lang="en-US" sz="4400" b="1" i="0"/>
+              <a:rPr lang="en-US" sz="4400" b="1" i="0" dirty="0"/>
               <a:t>Bar Chart: Regional Sales</a:t>
             </a:r>
           </a:p>
@@ -1990,28 +1990,28 @@
           <a:p>
             <a:pPr lvl="0"/>
             <a:r>
-              <a:rPr lang="en-US" sz="2800" b="0" i="0"/>
+              <a:rPr lang="en-US" sz="2800" b="0" i="0" dirty="0"/>
               <a:t>North: Strong Q2 growth (+15%)</a:t>
             </a:r>
           </a:p>
           <a:p>
             <a:pPr lvl="0"/>
             <a:r>
-              <a:rPr lang="en-US" sz="2800" b="0" i="0"/>
+              <a:rPr lang="en-US" sz="2800" b="0" i="0" dirty="0"/>
               <a:t>East: Highest performer</a:t>
             </a:r>
           </a:p>
           <a:p>
             <a:pPr lvl="0"/>
             <a:r>
-              <a:rPr lang="en-US" sz="2800" b="0" i="0"/>
+              <a:rPr lang="en-US" sz="2800" b="0" i="0" dirty="0"/>
               <a:t>South: Steady improvement</a:t>
             </a:r>
           </a:p>
           <a:p>
             <a:pPr lvl="0"/>
             <a:r>
-              <a:rPr lang="en-US" sz="2800" b="0" i="0"/>
+              <a:rPr lang="en-US" sz="2800" b="0" i="0" dirty="0"/>
               <a:t>West: Consistent growth</a:t>
             </a:r>
           </a:p>

</xml_diff>

<commit_message>
Fix syntax highlighting XML element order and add automatic text color contrast for shapes
- Fix code block rendering: move `<a:solidFill>` before `<a:latin>` to match OOXML specification (critical for PowerPoint compatibility)
- Add automatic text color contrast: white text on dark backgrounds, black text on light backgrounds
- Implement `is_dark_color()` using sRGB luminance calculation (threshold 128)
- Implement `get_text_color()` to determine contrasting text color based on fill
- Update `generate_text_xml_with
</commit_message>
<xml_diff>
--- a/comprehensive_demo.pptx
+++ b/comprehensive_demo.pptx
@@ -1615,12 +1615,18 @@
           </a:solidFill>
         </p:spPr>
         <p:txBody>
-          <a:bodyPr wrap="square" rtlCol="0" anchor="ctr"/>
+          <a:bodyPr wrap="square" rtlCol="0" anchor="ctr">
+            <a:normAutofit/>
+          </a:bodyPr>
           <a:lstStyle/>
           <a:p>
             <a:pPr algn="ctr"/>
             <a:r>
-              <a:rPr lang="en-US" sz="1800" dirty="0"/>
+              <a:rPr lang="en-US" sz="2004" dirty="0">
+                <a:solidFill>
+                  <a:srgbClr val="FFFFFF"/>
+                </a:solidFill>
+              </a:rPr>
               <a:t>1. Research</a:t>
             </a:r>
           </a:p>
@@ -1669,12 +1675,18 @@
           </a:solidFill>
         </p:spPr>
         <p:txBody>
-          <a:bodyPr wrap="square" rtlCol="0" anchor="ctr"/>
+          <a:bodyPr wrap="square" rtlCol="0" anchor="ctr">
+            <a:normAutofit/>
+          </a:bodyPr>
           <a:lstStyle/>
           <a:p>
             <a:pPr algn="ctr"/>
             <a:r>
-              <a:rPr lang="en-US" sz="1800" dirty="0"/>
+              <a:rPr lang="en-US" sz="2449" dirty="0">
+                <a:solidFill>
+                  <a:srgbClr val="000000"/>
+                </a:solidFill>
+              </a:rPr>
               <a:t>2. Design</a:t>
             </a:r>
           </a:p>
@@ -1723,12 +1735,18 @@
           </a:solidFill>
         </p:spPr>
         <p:txBody>
-          <a:bodyPr wrap="square" rtlCol="0" anchor="ctr"/>
+          <a:bodyPr wrap="square" rtlCol="0" anchor="ctr">
+            <a:normAutofit/>
+          </a:bodyPr>
           <a:lstStyle/>
           <a:p>
             <a:pPr algn="ctr"/>
             <a:r>
-              <a:rPr lang="en-US" sz="1800" dirty="0"/>
+              <a:rPr lang="en-US" sz="2204" dirty="0">
+                <a:solidFill>
+                  <a:srgbClr val="000000"/>
+                </a:solidFill>
+              </a:rPr>
               <a:t>3. Develop</a:t>
             </a:r>
           </a:p>
@@ -1777,12 +1795,18 @@
           </a:solidFill>
         </p:spPr>
         <p:txBody>
-          <a:bodyPr wrap="square" rtlCol="0" anchor="ctr"/>
+          <a:bodyPr wrap="square" rtlCol="0" anchor="ctr">
+            <a:normAutofit/>
+          </a:bodyPr>
           <a:lstStyle/>
           <a:p>
             <a:pPr algn="ctr"/>
             <a:r>
-              <a:rPr lang="en-US" sz="1800" dirty="0"/>
+              <a:rPr lang="en-US" sz="2449" dirty="0">
+                <a:solidFill>
+                  <a:srgbClr val="000000"/>
+                </a:solidFill>
+              </a:rPr>
               <a:t>4. Deploy</a:t>
             </a:r>
           </a:p>
@@ -1869,12 +1893,18 @@
           </a:solidFill>
         </p:spPr>
         <p:txBody>
-          <a:bodyPr wrap="square" rtlCol="0" anchor="ctr"/>
+          <a:bodyPr wrap="square" rtlCol="0" anchor="ctr">
+            <a:normAutofit/>
+          </a:bodyPr>
           <a:lstStyle/>
           <a:p>
             <a:pPr algn="ctr"/>
             <a:r>
-              <a:rPr lang="en-US" sz="1800" dirty="0"/>
+              <a:rPr lang="en-US" sz="3779" dirty="0">
+                <a:solidFill>
+                  <a:srgbClr val="FFFFFF"/>
+                </a:solidFill>
+              </a:rPr>
               <a:t>CEO</a:t>
             </a:r>
           </a:p>
@@ -1947,12 +1977,18 @@
           </a:solidFill>
         </p:spPr>
         <p:txBody>
-          <a:bodyPr wrap="square" rtlCol="0" anchor="ctr"/>
+          <a:bodyPr wrap="square" rtlCol="0" anchor="ctr">
+            <a:normAutofit/>
+          </a:bodyPr>
           <a:lstStyle/>
           <a:p>
             <a:pPr algn="ctr"/>
             <a:r>
-              <a:rPr lang="en-US" sz="1800" dirty="0"/>
+              <a:rPr lang="en-US" sz="3149" dirty="0">
+                <a:solidFill>
+                  <a:srgbClr val="FFFFFF"/>
+                </a:solidFill>
+              </a:rPr>
               <a:t>CTO</a:t>
             </a:r>
           </a:p>
@@ -1977,12 +2013,18 @@
           </a:solidFill>
         </p:spPr>
         <p:txBody>
-          <a:bodyPr wrap="square" rtlCol="0" anchor="ctr"/>
+          <a:bodyPr wrap="square" rtlCol="0" anchor="ctr">
+            <a:normAutofit/>
+          </a:bodyPr>
           <a:lstStyle/>
           <a:p>
             <a:pPr algn="ctr"/>
             <a:r>
-              <a:rPr lang="en-US" sz="1800" dirty="0"/>
+              <a:rPr lang="en-US" sz="3149" dirty="0">
+                <a:solidFill>
+                  <a:srgbClr val="FFFFFF"/>
+                </a:solidFill>
+              </a:rPr>
               <a:t>CFO</a:t>
             </a:r>
           </a:p>
@@ -2007,12 +2049,18 @@
           </a:solidFill>
         </p:spPr>
         <p:txBody>
-          <a:bodyPr wrap="square" rtlCol="0" anchor="ctr"/>
+          <a:bodyPr wrap="square" rtlCol="0" anchor="ctr">
+            <a:normAutofit/>
+          </a:bodyPr>
           <a:lstStyle/>
           <a:p>
             <a:pPr algn="ctr"/>
             <a:r>
-              <a:rPr lang="en-US" sz="1800" dirty="0"/>
+              <a:rPr lang="en-US" sz="3149" dirty="0">
+                <a:solidFill>
+                  <a:srgbClr val="FFFFFF"/>
+                </a:solidFill>
+              </a:rPr>
               <a:t>COO</a:t>
             </a:r>
           </a:p>
@@ -2109,12 +2157,18 @@
           </a:solidFill>
         </p:spPr>
         <p:txBody>
-          <a:bodyPr wrap="square" rtlCol="0" anchor="ctr"/>
+          <a:bodyPr wrap="square" rtlCol="0" anchor="ctr">
+            <a:normAutofit/>
+          </a:bodyPr>
           <a:lstStyle/>
           <a:p>
             <a:pPr algn="ctr"/>
             <a:r>
-              <a:rPr lang="en-US" sz="1800" dirty="0"/>
+              <a:rPr lang="en-US" sz="1717" dirty="0">
+                <a:solidFill>
+                  <a:srgbClr val="000000"/>
+                </a:solidFill>
+              </a:rPr>
               <a:t>Engineering</a:t>
             </a:r>
           </a:p>
@@ -2139,12 +2193,18 @@
           </a:solidFill>
         </p:spPr>
         <p:txBody>
-          <a:bodyPr wrap="square" rtlCol="0" anchor="ctr"/>
+          <a:bodyPr wrap="square" rtlCol="0" anchor="ctr">
+            <a:normAutofit/>
+          </a:bodyPr>
           <a:lstStyle/>
           <a:p>
             <a:pPr algn="ctr"/>
             <a:r>
-              <a:rPr lang="en-US" sz="1800" dirty="0"/>
+              <a:rPr lang="en-US" sz="2519" dirty="0">
+                <a:solidFill>
+                  <a:srgbClr val="000000"/>
+                </a:solidFill>
+              </a:rPr>
               <a:t>Product</a:t>
             </a:r>
           </a:p>
@@ -2231,12 +2291,18 @@
           </a:solidFill>
         </p:spPr>
         <p:txBody>
-          <a:bodyPr wrap="square" rtlCol="0" anchor="ctr"/>
+          <a:bodyPr wrap="square" rtlCol="0" anchor="ctr">
+            <a:normAutofit/>
+          </a:bodyPr>
           <a:lstStyle/>
           <a:p>
             <a:pPr algn="ctr"/>
             <a:r>
-              <a:rPr lang="en-US" sz="1800" dirty="0"/>
+              <a:rPr lang="en-US" sz="2362" dirty="0">
+                <a:solidFill>
+                  <a:srgbClr val="FFFFFF"/>
+                </a:solidFill>
+              </a:rPr>
               <a:t>PLAN
 Define goals
 and strategy</a:t>
@@ -2263,12 +2329,18 @@
           </a:solidFill>
         </p:spPr>
         <p:txBody>
-          <a:bodyPr wrap="square" rtlCol="0" anchor="ctr"/>
+          <a:bodyPr wrap="square" rtlCol="0" anchor="ctr">
+            <a:normAutofit/>
+          </a:bodyPr>
           <a:lstStyle/>
           <a:p>
             <a:pPr algn="ctr"/>
             <a:r>
-              <a:rPr lang="en-US" sz="1800" dirty="0"/>
+              <a:rPr lang="en-US" sz="2362" dirty="0">
+                <a:solidFill>
+                  <a:srgbClr val="000000"/>
+                </a:solidFill>
+              </a:rPr>
               <a:t>DO
 Implement
 the plan</a:t>
@@ -2295,12 +2367,18 @@
           </a:solidFill>
         </p:spPr>
         <p:txBody>
-          <a:bodyPr wrap="square" rtlCol="0" anchor="ctr"/>
+          <a:bodyPr wrap="square" rtlCol="0" anchor="ctr">
+            <a:normAutofit/>
+          </a:bodyPr>
           <a:lstStyle/>
           <a:p>
             <a:pPr algn="ctr"/>
             <a:r>
-              <a:rPr lang="en-US" sz="1800" dirty="0"/>
+              <a:rPr lang="en-US" sz="2362" dirty="0">
+                <a:solidFill>
+                  <a:srgbClr val="000000"/>
+                </a:solidFill>
+              </a:rPr>
               <a:t>CHECK
 Measure
 results</a:t>
@@ -2327,12 +2405,18 @@
           </a:solidFill>
         </p:spPr>
         <p:txBody>
-          <a:bodyPr wrap="square" rtlCol="0" anchor="ctr"/>
+          <a:bodyPr wrap="square" rtlCol="0" anchor="ctr">
+            <a:normAutofit/>
+          </a:bodyPr>
           <a:lstStyle/>
           <a:p>
             <a:pPr algn="ctr"/>
             <a:r>
-              <a:rPr lang="en-US" sz="1800" dirty="0"/>
+              <a:rPr lang="en-US" sz="2362" dirty="0">
+                <a:solidFill>
+                  <a:srgbClr val="000000"/>
+                </a:solidFill>
+              </a:rPr>
               <a:t>ACT
 Adjust and
 improve</a:t>
@@ -2517,12 +2601,18 @@
           </a:solidFill>
         </p:spPr>
         <p:txBody>
-          <a:bodyPr wrap="square" rtlCol="0" anchor="ctr"/>
+          <a:bodyPr wrap="square" rtlCol="0" anchor="ctr">
+            <a:normAutofit/>
+          </a:bodyPr>
           <a:lstStyle/>
           <a:p>
             <a:pPr algn="ctr"/>
             <a:r>
-              <a:rPr lang="en-US" sz="1800" dirty="0"/>
+              <a:rPr lang="en-US" sz="2999" dirty="0">
+                <a:solidFill>
+                  <a:srgbClr val="FFFFFF"/>
+                </a:solidFill>
+              </a:rPr>
               <a:t>Physiological Needs - Food, Water, Shelter</a:t>
             </a:r>
           </a:p>
@@ -2547,12 +2637,18 @@
           </a:solidFill>
         </p:spPr>
         <p:txBody>
-          <a:bodyPr wrap="square" rtlCol="0" anchor="ctr"/>
+          <a:bodyPr wrap="square" rtlCol="0" anchor="ctr">
+            <a:normAutofit/>
+          </a:bodyPr>
           <a:lstStyle/>
           <a:p>
             <a:pPr algn="ctr"/>
             <a:r>
-              <a:rPr lang="en-US" sz="1800" dirty="0"/>
+              <a:rPr lang="en-US" sz="3242" dirty="0">
+                <a:solidFill>
+                  <a:srgbClr val="000000"/>
+                </a:solidFill>
+              </a:rPr>
               <a:t>Safety Needs - Security, Stability</a:t>
             </a:r>
           </a:p>
@@ -2577,12 +2673,18 @@
           </a:solidFill>
         </p:spPr>
         <p:txBody>
-          <a:bodyPr wrap="square" rtlCol="0" anchor="ctr"/>
+          <a:bodyPr wrap="square" rtlCol="0" anchor="ctr">
+            <a:normAutofit/>
+          </a:bodyPr>
           <a:lstStyle/>
           <a:p>
             <a:pPr algn="ctr"/>
             <a:r>
-              <a:rPr lang="en-US" sz="1800" dirty="0"/>
+              <a:rPr lang="en-US" sz="2952" dirty="0">
+                <a:solidFill>
+                  <a:srgbClr val="000000"/>
+                </a:solidFill>
+              </a:rPr>
               <a:t>Love &amp; Belonging - Relationships</a:t>
             </a:r>
           </a:p>
@@ -2607,12 +2709,18 @@
           </a:solidFill>
         </p:spPr>
         <p:txBody>
-          <a:bodyPr wrap="square" rtlCol="0" anchor="ctr"/>
+          <a:bodyPr wrap="square" rtlCol="0" anchor="ctr">
+            <a:normAutofit/>
+          </a:bodyPr>
           <a:lstStyle/>
           <a:p>
             <a:pPr algn="ctr"/>
             <a:r>
-              <a:rPr lang="en-US" sz="1800" dirty="0"/>
+              <a:rPr lang="en-US" sz="2715" dirty="0">
+                <a:solidFill>
+                  <a:srgbClr val="000000"/>
+                </a:solidFill>
+              </a:rPr>
               <a:t>Esteem - Achievement, Respect</a:t>
             </a:r>
           </a:p>
@@ -2637,12 +2745,18 @@
           </a:solidFill>
         </p:spPr>
         <p:txBody>
-          <a:bodyPr wrap="square" rtlCol="0" anchor="ctr"/>
+          <a:bodyPr wrap="square" rtlCol="0" anchor="ctr">
+            <a:normAutofit/>
+          </a:bodyPr>
           <a:lstStyle/>
           <a:p>
             <a:pPr algn="ctr"/>
             <a:r>
-              <a:rPr lang="en-US" sz="1800" dirty="0"/>
+              <a:rPr lang="en-US" sz="3499" dirty="0">
+                <a:solidFill>
+                  <a:srgbClr val="FFFFFF"/>
+                </a:solidFill>
+              </a:rPr>
               <a:t>Self-Actualization</a:t>
             </a:r>
           </a:p>
@@ -2729,12 +2843,18 @@
           </a:solidFill>
         </p:spPr>
         <p:txBody>
-          <a:bodyPr wrap="square" rtlCol="0" anchor="ctr"/>
+          <a:bodyPr wrap="square" rtlCol="0" anchor="ctr">
+            <a:normAutofit/>
+          </a:bodyPr>
           <a:lstStyle/>
           <a:p>
             <a:pPr algn="ctr"/>
             <a:r>
-              <a:rPr lang="en-US" sz="1800" dirty="0"/>
+              <a:rPr lang="en-US" sz="4400" dirty="0">
+                <a:solidFill>
+                  <a:srgbClr val="FFFFFF"/>
+                </a:solidFill>
+              </a:rPr>
               <a:t>Skills</a:t>
             </a:r>
           </a:p>
@@ -2759,12 +2879,18 @@
           </a:solidFill>
         </p:spPr>
         <p:txBody>
-          <a:bodyPr wrap="square" rtlCol="0" anchor="ctr"/>
+          <a:bodyPr wrap="square" rtlCol="0" anchor="ctr">
+            <a:normAutofit/>
+          </a:bodyPr>
           <a:lstStyle/>
           <a:p>
             <a:pPr algn="ctr"/>
             <a:r>
-              <a:rPr lang="en-US" sz="1800" dirty="0"/>
+              <a:rPr lang="en-US" sz="4400" dirty="0">
+                <a:solidFill>
+                  <a:srgbClr val="000000"/>
+                </a:solidFill>
+              </a:rPr>
               <a:t>Passion</a:t>
             </a:r>
           </a:p>
@@ -2789,12 +2915,18 @@
           </a:solidFill>
         </p:spPr>
         <p:txBody>
-          <a:bodyPr wrap="square" rtlCol="0" anchor="ctr"/>
+          <a:bodyPr wrap="square" rtlCol="0" anchor="ctr">
+            <a:normAutofit/>
+          </a:bodyPr>
           <a:lstStyle/>
           <a:p>
             <a:pPr algn="ctr"/>
             <a:r>
-              <a:rPr lang="en-US" sz="1800" dirty="0"/>
+              <a:rPr lang="en-US" sz="4294" dirty="0">
+                <a:solidFill>
+                  <a:srgbClr val="000000"/>
+                </a:solidFill>
+              </a:rPr>
               <a:t>Market Need</a:t>
             </a:r>
           </a:p>
@@ -2819,12 +2951,18 @@
           </a:solidFill>
         </p:spPr>
         <p:txBody>
-          <a:bodyPr wrap="square" rtlCol="0" anchor="ctr"/>
+          <a:bodyPr wrap="square" rtlCol="0" anchor="ctr">
+            <a:normAutofit/>
+          </a:bodyPr>
           <a:lstStyle/>
           <a:p>
             <a:pPr algn="ctr"/>
             <a:r>
-              <a:rPr lang="en-US" sz="1800" dirty="0"/>
+              <a:rPr lang="en-US" sz="4199" dirty="0">
+                <a:solidFill>
+                  <a:srgbClr val="000000"/>
+                </a:solidFill>
+              </a:rPr>
               <a:t>IKIGAI</a:t>
             </a:r>
           </a:p>
@@ -3304,12 +3442,18 @@
           </a:solidFill>
         </p:spPr>
         <p:txBody>
-          <a:bodyPr wrap="square" rtlCol="0" anchor="ctr"/>
+          <a:bodyPr wrap="square" rtlCol="0" anchor="ctr">
+            <a:normAutofit/>
+          </a:bodyPr>
           <a:lstStyle/>
           <a:p>
             <a:pPr algn="ctr"/>
             <a:r>
-              <a:rPr lang="en-US" sz="1800" dirty="0"/>
+              <a:rPr lang="en-US" sz="1889" dirty="0">
+                <a:solidFill>
+                  <a:srgbClr val="FFFFFF"/>
+                </a:solidFill>
+              </a:rPr>
               <a:t>Revenue
 $2.14M
 +15% YoY</a:t>
@@ -3336,12 +3480,18 @@
           </a:solidFill>
         </p:spPr>
         <p:txBody>
-          <a:bodyPr wrap="square" rtlCol="0" anchor="ctr"/>
+          <a:bodyPr wrap="square" rtlCol="0" anchor="ctr">
+            <a:normAutofit/>
+          </a:bodyPr>
           <a:lstStyle/>
           <a:p>
             <a:pPr algn="ctr"/>
             <a:r>
-              <a:rPr lang="en-US" sz="1800" dirty="0"/>
+              <a:rPr lang="en-US" sz="1889" dirty="0">
+                <a:solidFill>
+                  <a:srgbClr val="000000"/>
+                </a:solidFill>
+              </a:rPr>
               <a:t>Customers
 12,450
 +22% YoY</a:t>
@@ -3368,12 +3518,18 @@
           </a:solidFill>
         </p:spPr>
         <p:txBody>
-          <a:bodyPr wrap="square" rtlCol="0" anchor="ctr"/>
+          <a:bodyPr wrap="square" rtlCol="0" anchor="ctr">
+            <a:normAutofit/>
+          </a:bodyPr>
           <a:lstStyle/>
           <a:p>
             <a:pPr algn="ctr"/>
             <a:r>
-              <a:rPr lang="en-US" sz="1800" dirty="0"/>
+              <a:rPr lang="en-US" sz="1889" dirty="0">
+                <a:solidFill>
+                  <a:srgbClr val="000000"/>
+                </a:solidFill>
+              </a:rPr>
               <a:t>NPS Score
 72
 +8 pts</a:t>
@@ -3400,12 +3556,18 @@
           </a:solidFill>
         </p:spPr>
         <p:txBody>
-          <a:bodyPr wrap="square" rtlCol="0" anchor="ctr"/>
+          <a:bodyPr wrap="square" rtlCol="0" anchor="ctr">
+            <a:normAutofit/>
+          </a:bodyPr>
           <a:lstStyle/>
           <a:p>
             <a:pPr algn="ctr"/>
             <a:r>
-              <a:rPr lang="en-US" sz="1800" dirty="0"/>
+              <a:rPr lang="en-US" sz="1889" dirty="0">
+                <a:solidFill>
+                  <a:srgbClr val="000000"/>
+                </a:solidFill>
+              </a:rPr>
               <a:t>Retention
 94%
 +3% YoY</a:t>
@@ -4584,12 +4746,18 @@
           </a:solidFill>
         </p:spPr>
         <p:txBody>
-          <a:bodyPr wrap="square" rtlCol="0" anchor="ctr"/>
+          <a:bodyPr wrap="square" rtlCol="0" anchor="ctr">
+            <a:normAutofit/>
+          </a:bodyPr>
           <a:lstStyle/>
           <a:p>
             <a:pPr algn="ctr"/>
             <a:r>
-              <a:rPr lang="en-US" sz="1800" dirty="0"/>
+              <a:rPr lang="en-US" sz="3499" dirty="0">
+                <a:solidFill>
+                  <a:srgbClr val="FFFFFF"/>
+                </a:solidFill>
+              </a:rPr>
               <a:t>Rectangle</a:t>
             </a:r>
           </a:p>
@@ -4614,12 +4782,18 @@
           </a:solidFill>
         </p:spPr>
         <p:txBody>
-          <a:bodyPr wrap="square" rtlCol="0" anchor="ctr"/>
+          <a:bodyPr wrap="square" rtlCol="0" anchor="ctr">
+            <a:normAutofit/>
+          </a:bodyPr>
           <a:lstStyle/>
           <a:p>
             <a:pPr algn="ctr"/>
             <a:r>
-              <a:rPr lang="en-US" sz="1800" dirty="0"/>
+              <a:rPr lang="en-US" sz="4400" dirty="0">
+                <a:solidFill>
+                  <a:srgbClr val="000000"/>
+                </a:solidFill>
+              </a:rPr>
               <a:t>Ellipse</a:t>
             </a:r>
           </a:p>
@@ -4644,12 +4818,18 @@
           </a:solidFill>
         </p:spPr>
         <p:txBody>
-          <a:bodyPr wrap="square" rtlCol="0" anchor="ctr"/>
+          <a:bodyPr wrap="square" rtlCol="0" anchor="ctr">
+            <a:normAutofit/>
+          </a:bodyPr>
           <a:lstStyle/>
           <a:p>
             <a:pPr algn="ctr"/>
             <a:r>
-              <a:rPr lang="en-US" sz="1800" dirty="0"/>
+              <a:rPr lang="en-US" sz="4400" dirty="0">
+                <a:solidFill>
+                  <a:srgbClr val="FFFFFF"/>
+                </a:solidFill>
+              </a:rPr>
               <a:t>Rounded</a:t>
             </a:r>
           </a:p>
@@ -4674,12 +4854,18 @@
           </a:solidFill>
         </p:spPr>
         <p:txBody>
-          <a:bodyPr wrap="square" rtlCol="0" anchor="ctr"/>
+          <a:bodyPr wrap="square" rtlCol="0" anchor="ctr">
+            <a:normAutofit/>
+          </a:bodyPr>
           <a:lstStyle/>
           <a:p>
             <a:pPr algn="ctr"/>
             <a:r>
-              <a:rPr lang="en-US" sz="1800" dirty="0"/>
+              <a:rPr lang="en-US" sz="2952" dirty="0">
+                <a:solidFill>
+                  <a:srgbClr val="FFFFFF"/>
+                </a:solidFill>
+              </a:rPr>
               <a:t>Triangle</a:t>
             </a:r>
           </a:p>
@@ -4704,12 +4890,18 @@
           </a:solidFill>
         </p:spPr>
         <p:txBody>
-          <a:bodyPr wrap="square" rtlCol="0" anchor="ctr"/>
+          <a:bodyPr wrap="square" rtlCol="0" anchor="ctr">
+            <a:normAutofit/>
+          </a:bodyPr>
           <a:lstStyle/>
           <a:p>
             <a:pPr algn="ctr"/>
             <a:r>
-              <a:rPr lang="en-US" sz="1800" dirty="0"/>
+              <a:rPr lang="en-US" sz="3374" dirty="0">
+                <a:solidFill>
+                  <a:srgbClr val="000000"/>
+                </a:solidFill>
+              </a:rPr>
               <a:t>Diamond</a:t>
             </a:r>
           </a:p>

</xml_diff>

<commit_message>
Enhance README and TODO with new template and theme features; update demo with bullet styles and image handling
- Added sections for presentation templates and themes in README.md, showcasing usage examples for business proposals, status reports, and various themes.
- Expanded TODO.md to reflect the completion of the template system and layout helpers.
- Updated comprehensive_demo.rs to demonstrate new bullet styles (numbered, lettered, roman, custom) and image loading from base64 and bytes.
- Introduced new image handling capabilities in the generator, allowing images to be created from various sources.
</commit_message>
<xml_diff>
--- a/comprehensive_demo.pptx
+++ b/comprehensive_demo.pptx
@@ -28,6 +28,17 @@
     <p:sldId id="277" r:id="rId23"/>
     <p:sldId id="278" r:id="rId24"/>
     <p:sldId id="279" r:id="rId25"/>
+    <p:sldId id="280" r:id="rId26"/>
+    <p:sldId id="281" r:id="rId27"/>
+    <p:sldId id="282" r:id="rId28"/>
+    <p:sldId id="283" r:id="rId29"/>
+    <p:sldId id="284" r:id="rId30"/>
+    <p:sldId id="285" r:id="rId31"/>
+    <p:sldId id="286" r:id="rId32"/>
+    <p:sldId id="287" r:id="rId33"/>
+    <p:sldId id="288" r:id="rId34"/>
+    <p:sldId id="289" r:id="rId35"/>
+    <p:sldId id="290" r:id="rId36"/>
   </p:sldIdLst>
   <p:sldSz cx="9144000" cy="6858000" type="screen4x3"/>
   <p:notesSz cx="6858000" cy="9144000"/>
@@ -4705,38 +4716,816 @@
           <a:bodyPr wrap="square" rtlCol="0"/>
           <a:lstStyle/>
           <a:p>
-            <a:pPr lvl="0"/>
+            <a:pPr lvl="0" marL="457200" indent="-457200">
+              <a:buChar char="•"/>
+            </a:pPr>
             <a:r>
               <a:rPr lang="en-US" sz="2400" b="0" i="0" dirty="0"/>
               <a:t>Completed: Research, Design, Initial Development</a:t>
             </a:r>
           </a:p>
           <a:p>
-            <a:pPr lvl="0"/>
+            <a:pPr lvl="0" marL="457200" indent="-457200">
+              <a:buChar char="•"/>
+            </a:pPr>
             <a:r>
               <a:rPr lang="en-US" sz="2400" b="0" i="0" dirty="0"/>
               <a:t>In Progress: Sprint 3 Development</a:t>
             </a:r>
           </a:p>
           <a:p>
-            <a:pPr lvl="0"/>
+            <a:pPr lvl="0" marL="457200" indent="-457200">
+              <a:buChar char="•"/>
+            </a:pPr>
             <a:r>
               <a:rPr lang="en-US" sz="2400" b="0" i="0" dirty="0"/>
               <a:t>Next: QA Testing Phase (Q4 2024)</a:t>
             </a:r>
           </a:p>
           <a:p>
-            <a:pPr lvl="0"/>
+            <a:pPr lvl="0" marL="457200" indent="-457200">
+              <a:buChar char="•"/>
+            </a:pPr>
             <a:r>
               <a:rPr lang="en-US" sz="2400" b="0" i="0" dirty="0"/>
               <a:t>Launch Target: Q1 2025</a:t>
             </a:r>
           </a:p>
           <a:p>
-            <a:pPr lvl="0"/>
+            <a:pPr lvl="0" marL="457200" indent="-457200">
+              <a:buChar char="•"/>
+            </a:pPr>
             <a:r>
               <a:rPr lang="en-US" sz="2400" b="0" i="0" dirty="0"/>
               <a:t>Key Risks: Resource constraints, Timeline pressure</a:t>
+            </a:r>
+          </a:p>
+        </p:txBody>
+      </p:sp>
+    </p:spTree>
+  </p:cSld>
+  <p:clrMapOvr>
+    <a:masterClrMapping/>
+  </p:clrMapOvr>
+</p:sld>
+</file>
+
+<file path=ppt/slides/slide24.xml><?xml version="1.0" encoding="utf-8"?>
+<p:sld xmlns:a="http://schemas.openxmlformats.org/drawingml/2006/main" xmlns:r="http://schemas.openxmlformats.org/officeDocument/2006/relationships" xmlns:p="http://schemas.openxmlformats.org/presentationml/2006/main">
+  <p:cSld>
+    <p:bg>
+      <p:bgRef idx="1001">
+        <a:schemeClr val="bg1"/>
+      </p:bgRef>
+    </p:bg>
+    <p:spTree>
+      <p:nvGrpSpPr>
+        <p:cNvPr id="1" name=""/>
+        <p:cNvGrpSpPr/>
+        <p:nvPr/>
+      </p:nvGrpSpPr>
+      <p:grpSpPr>
+        <a:xfrm>
+          <a:off x="0" y="0"/>
+          <a:ext cx="9144000" cy="6858000"/>
+          <a:chOff x="0" y="0"/>
+          <a:chExt cx="9144000" cy="6858000"/>
+        </a:xfrm>
+      </p:grpSpPr>
+      <p:sp>
+        <p:nvSpPr>
+          <p:cNvPr id="2" name="Title"/>
+          <p:cNvSpPr txBox="1"/>
+          <p:nvPr/>
+        </p:nvSpPr>
+        <p:spPr>
+          <a:xfrm>
+            <a:off x="457200" y="274638"/>
+            <a:ext cx="8230200" cy="1143000"/>
+          </a:xfrm>
+          <a:prstGeom prst="rect">
+            <a:avLst/>
+          </a:prstGeom>
+          <a:noFill/>
+        </p:spPr>
+        <p:txBody>
+          <a:bodyPr wrap="square" rtlCol="0" anchor="ctr"/>
+          <a:lstStyle/>
+          <a:p>
+            <a:pPr algn="l"/>
+            <a:r>
+              <a:rPr lang="en-US" sz="4400" b="1" i="0" dirty="0">
+                <a:solidFill>
+                  <a:srgbClr val="1F497D"/>
+                </a:solidFill>
+              </a:rPr>
+              <a:t>Bullet Styles - Numbered List</a:t>
+            </a:r>
+          </a:p>
+        </p:txBody>
+      </p:sp>
+      <p:sp>
+        <p:nvSpPr>
+          <p:cNvPr id="3" name="Content"/>
+          <p:cNvSpPr txBox="1"/>
+          <p:nvPr/>
+        </p:nvSpPr>
+        <p:spPr>
+          <a:xfrm>
+            <a:off x="457200" y="1600200"/>
+            <a:ext cx="8230200" cy="4572000"/>
+          </a:xfrm>
+          <a:prstGeom prst="rect">
+            <a:avLst/>
+          </a:prstGeom>
+          <a:noFill/>
+        </p:spPr>
+        <p:txBody>
+          <a:bodyPr wrap="square" rtlCol="0"/>
+          <a:lstStyle/>
+          <a:p>
+            <a:pPr lvl="0" marL="457200" indent="-457200">
+              <a:buAutoNum type="arabicPeriod"/>
+            </a:pPr>
+            <a:r>
+              <a:rPr lang="en-US" sz="2800" b="0" i="0" dirty="0"/>
+              <a:t>First numbered item</a:t>
+            </a:r>
+          </a:p>
+          <a:p>
+            <a:pPr lvl="0" marL="457200" indent="-457200">
+              <a:buAutoNum type="arabicPeriod"/>
+            </a:pPr>
+            <a:r>
+              <a:rPr lang="en-US" sz="2800" b="0" i="0" dirty="0"/>
+              <a:t>Second numbered item</a:t>
+            </a:r>
+          </a:p>
+          <a:p>
+            <a:pPr lvl="0" marL="457200" indent="-457200">
+              <a:buAutoNum type="arabicPeriod"/>
+            </a:pPr>
+            <a:r>
+              <a:rPr lang="en-US" sz="2800" b="0" i="0" dirty="0"/>
+              <a:t>Third numbered item</a:t>
+            </a:r>
+          </a:p>
+          <a:p>
+            <a:pPr lvl="0" marL="457200" indent="-457200">
+              <a:buAutoNum type="arabicPeriod"/>
+            </a:pPr>
+            <a:r>
+              <a:rPr lang="en-US" sz="2800" b="0" i="0" dirty="0"/>
+              <a:t>Fourth numbered item</a:t>
+            </a:r>
+          </a:p>
+        </p:txBody>
+      </p:sp>
+    </p:spTree>
+  </p:cSld>
+  <p:clrMapOvr>
+    <a:masterClrMapping/>
+  </p:clrMapOvr>
+</p:sld>
+</file>
+
+<file path=ppt/slides/slide25.xml><?xml version="1.0" encoding="utf-8"?>
+<p:sld xmlns:a="http://schemas.openxmlformats.org/drawingml/2006/main" xmlns:r="http://schemas.openxmlformats.org/officeDocument/2006/relationships" xmlns:p="http://schemas.openxmlformats.org/presentationml/2006/main">
+  <p:cSld>
+    <p:bg>
+      <p:bgRef idx="1001">
+        <a:schemeClr val="bg1"/>
+      </p:bgRef>
+    </p:bg>
+    <p:spTree>
+      <p:nvGrpSpPr>
+        <p:cNvPr id="1" name=""/>
+        <p:cNvGrpSpPr/>
+        <p:nvPr/>
+      </p:nvGrpSpPr>
+      <p:grpSpPr>
+        <a:xfrm>
+          <a:off x="0" y="0"/>
+          <a:ext cx="9144000" cy="6858000"/>
+          <a:chOff x="0" y="0"/>
+          <a:chExt cx="9144000" cy="6858000"/>
+        </a:xfrm>
+      </p:grpSpPr>
+      <p:sp>
+        <p:nvSpPr>
+          <p:cNvPr id="2" name="Title"/>
+          <p:cNvSpPr txBox="1"/>
+          <p:nvPr/>
+        </p:nvSpPr>
+        <p:spPr>
+          <a:xfrm>
+            <a:off x="457200" y="274638"/>
+            <a:ext cx="8230200" cy="1143000"/>
+          </a:xfrm>
+          <a:prstGeom prst="rect">
+            <a:avLst/>
+          </a:prstGeom>
+          <a:noFill/>
+        </p:spPr>
+        <p:txBody>
+          <a:bodyPr wrap="square" rtlCol="0" anchor="ctr"/>
+          <a:lstStyle/>
+          <a:p>
+            <a:pPr algn="l"/>
+            <a:r>
+              <a:rPr lang="en-US" sz="4400" b="1" i="0" dirty="0">
+                <a:solidFill>
+                  <a:srgbClr val="1F497D"/>
+                </a:solidFill>
+              </a:rPr>
+              <a:t>Bullet Styles - Lettered Lists</a:t>
+            </a:r>
+          </a:p>
+        </p:txBody>
+      </p:sp>
+      <p:sp>
+        <p:nvSpPr>
+          <p:cNvPr id="3" name="Content"/>
+          <p:cNvSpPr txBox="1"/>
+          <p:nvPr/>
+        </p:nvSpPr>
+        <p:spPr>
+          <a:xfrm>
+            <a:off x="457200" y="1600200"/>
+            <a:ext cx="8230200" cy="4572000"/>
+          </a:xfrm>
+          <a:prstGeom prst="rect">
+            <a:avLst/>
+          </a:prstGeom>
+          <a:noFill/>
+        </p:spPr>
+        <p:txBody>
+          <a:bodyPr wrap="square" rtlCol="0"/>
+          <a:lstStyle/>
+          <a:p>
+            <a:pPr lvl="0" marL="457200" indent="-457200">
+              <a:buAutoNum type="alphaLcPeriod"/>
+            </a:pPr>
+            <a:r>
+              <a:rPr lang="en-US" sz="2800" b="0" i="0" dirty="0"/>
+              <a:t>Option A - First choice</a:t>
+            </a:r>
+          </a:p>
+          <a:p>
+            <a:pPr lvl="0" marL="457200" indent="-457200">
+              <a:buAutoNum type="alphaLcPeriod"/>
+            </a:pPr>
+            <a:r>
+              <a:rPr lang="en-US" sz="2800" b="0" i="0" dirty="0"/>
+              <a:t>Option B - Second choice</a:t>
+            </a:r>
+          </a:p>
+          <a:p>
+            <a:pPr lvl="0" marL="457200" indent="-457200">
+              <a:buAutoNum type="alphaLcPeriod"/>
+            </a:pPr>
+            <a:r>
+              <a:rPr lang="en-US" sz="2800" b="0" i="0" dirty="0"/>
+              <a:t>Option C - Third choice</a:t>
+            </a:r>
+          </a:p>
+          <a:p>
+            <a:pPr lvl="0" marL="457200" indent="-457200">
+              <a:buAutoNum type="alphaLcPeriod"/>
+            </a:pPr>
+            <a:r>
+              <a:rPr lang="en-US" sz="2800" b="0" i="0" dirty="0"/>
+              <a:t>Option D - Fourth choice</a:t>
+            </a:r>
+          </a:p>
+        </p:txBody>
+      </p:sp>
+    </p:spTree>
+  </p:cSld>
+  <p:clrMapOvr>
+    <a:masterClrMapping/>
+  </p:clrMapOvr>
+</p:sld>
+</file>
+
+<file path=ppt/slides/slide26.xml><?xml version="1.0" encoding="utf-8"?>
+<p:sld xmlns:a="http://schemas.openxmlformats.org/drawingml/2006/main" xmlns:r="http://schemas.openxmlformats.org/officeDocument/2006/relationships" xmlns:p="http://schemas.openxmlformats.org/presentationml/2006/main">
+  <p:cSld>
+    <p:bg>
+      <p:bgRef idx="1001">
+        <a:schemeClr val="bg1"/>
+      </p:bgRef>
+    </p:bg>
+    <p:spTree>
+      <p:nvGrpSpPr>
+        <p:cNvPr id="1" name=""/>
+        <p:cNvGrpSpPr/>
+        <p:nvPr/>
+      </p:nvGrpSpPr>
+      <p:grpSpPr>
+        <a:xfrm>
+          <a:off x="0" y="0"/>
+          <a:ext cx="9144000" cy="6858000"/>
+          <a:chOff x="0" y="0"/>
+          <a:chExt cx="9144000" cy="6858000"/>
+        </a:xfrm>
+      </p:grpSpPr>
+      <p:sp>
+        <p:nvSpPr>
+          <p:cNvPr id="2" name="Title"/>
+          <p:cNvSpPr txBox="1"/>
+          <p:nvPr/>
+        </p:nvSpPr>
+        <p:spPr>
+          <a:xfrm>
+            <a:off x="457200" y="274638"/>
+            <a:ext cx="8230200" cy="1143000"/>
+          </a:xfrm>
+          <a:prstGeom prst="rect">
+            <a:avLst/>
+          </a:prstGeom>
+          <a:noFill/>
+        </p:spPr>
+        <p:txBody>
+          <a:bodyPr wrap="square" rtlCol="0" anchor="ctr"/>
+          <a:lstStyle/>
+          <a:p>
+            <a:pPr algn="l"/>
+            <a:r>
+              <a:rPr lang="en-US" sz="4400" b="1" i="0" dirty="0">
+                <a:solidFill>
+                  <a:srgbClr val="1F497D"/>
+                </a:solidFill>
+              </a:rPr>
+              <a:t>Bullet Styles - Roman Numerals</a:t>
+            </a:r>
+          </a:p>
+        </p:txBody>
+      </p:sp>
+      <p:sp>
+        <p:nvSpPr>
+          <p:cNvPr id="3" name="Content"/>
+          <p:cNvSpPr txBox="1"/>
+          <p:nvPr/>
+        </p:nvSpPr>
+        <p:spPr>
+          <a:xfrm>
+            <a:off x="457200" y="1600200"/>
+            <a:ext cx="8230200" cy="4572000"/>
+          </a:xfrm>
+          <a:prstGeom prst="rect">
+            <a:avLst/>
+          </a:prstGeom>
+          <a:noFill/>
+        </p:spPr>
+        <p:txBody>
+          <a:bodyPr wrap="square" rtlCol="0"/>
+          <a:lstStyle/>
+          <a:p>
+            <a:pPr lvl="0" marL="457200" indent="-457200">
+              <a:buAutoNum type="romanUcPeriod"/>
+            </a:pPr>
+            <a:r>
+              <a:rPr lang="en-US" sz="2800" b="0" i="0" dirty="0"/>
+              <a:t>Chapter I - Introduction</a:t>
+            </a:r>
+          </a:p>
+          <a:p>
+            <a:pPr lvl="0" marL="457200" indent="-457200">
+              <a:buAutoNum type="romanUcPeriod"/>
+            </a:pPr>
+            <a:r>
+              <a:rPr lang="en-US" sz="2800" b="0" i="0" dirty="0"/>
+              <a:t>Chapter II - Background</a:t>
+            </a:r>
+          </a:p>
+          <a:p>
+            <a:pPr lvl="0" marL="457200" indent="-457200">
+              <a:buAutoNum type="romanUcPeriod"/>
+            </a:pPr>
+            <a:r>
+              <a:rPr lang="en-US" sz="2800" b="0" i="0" dirty="0"/>
+              <a:t>Chapter III - Methodology</a:t>
+            </a:r>
+          </a:p>
+          <a:p>
+            <a:pPr lvl="0" marL="457200" indent="-457200">
+              <a:buAutoNum type="romanUcPeriod"/>
+            </a:pPr>
+            <a:r>
+              <a:rPr lang="en-US" sz="2800" b="0" i="0" dirty="0"/>
+              <a:t>Chapter IV - Results</a:t>
+            </a:r>
+          </a:p>
+          <a:p>
+            <a:pPr lvl="0" marL="457200" indent="-457200">
+              <a:buAutoNum type="romanUcPeriod"/>
+            </a:pPr>
+            <a:r>
+              <a:rPr lang="en-US" sz="2800" b="0" i="0" dirty="0"/>
+              <a:t>Chapter V - Conclusion</a:t>
+            </a:r>
+          </a:p>
+        </p:txBody>
+      </p:sp>
+    </p:spTree>
+  </p:cSld>
+  <p:clrMapOvr>
+    <a:masterClrMapping/>
+  </p:clrMapOvr>
+</p:sld>
+</file>
+
+<file path=ppt/slides/slide27.xml><?xml version="1.0" encoding="utf-8"?>
+<p:sld xmlns:a="http://schemas.openxmlformats.org/drawingml/2006/main" xmlns:r="http://schemas.openxmlformats.org/officeDocument/2006/relationships" xmlns:p="http://schemas.openxmlformats.org/presentationml/2006/main">
+  <p:cSld>
+    <p:bg>
+      <p:bgRef idx="1001">
+        <a:schemeClr val="bg1"/>
+      </p:bgRef>
+    </p:bg>
+    <p:spTree>
+      <p:nvGrpSpPr>
+        <p:cNvPr id="1" name=""/>
+        <p:cNvGrpSpPr/>
+        <p:nvPr/>
+      </p:nvGrpSpPr>
+      <p:grpSpPr>
+        <a:xfrm>
+          <a:off x="0" y="0"/>
+          <a:ext cx="9144000" cy="6858000"/>
+          <a:chOff x="0" y="0"/>
+          <a:chExt cx="9144000" cy="6858000"/>
+        </a:xfrm>
+      </p:grpSpPr>
+      <p:sp>
+        <p:nvSpPr>
+          <p:cNvPr id="2" name="Title"/>
+          <p:cNvSpPr txBox="1"/>
+          <p:nvPr/>
+        </p:nvSpPr>
+        <p:spPr>
+          <a:xfrm>
+            <a:off x="457200" y="274638"/>
+            <a:ext cx="8230200" cy="1143000"/>
+          </a:xfrm>
+          <a:prstGeom prst="rect">
+            <a:avLst/>
+          </a:prstGeom>
+          <a:noFill/>
+        </p:spPr>
+        <p:txBody>
+          <a:bodyPr wrap="square" rtlCol="0" anchor="ctr"/>
+          <a:lstStyle/>
+          <a:p>
+            <a:pPr algn="l"/>
+            <a:r>
+              <a:rPr lang="en-US" sz="4400" b="1" i="0" dirty="0">
+                <a:solidFill>
+                  <a:srgbClr val="1F497D"/>
+                </a:solidFill>
+              </a:rPr>
+              <a:t>Bullet Styles - Custom Characters</a:t>
+            </a:r>
+          </a:p>
+        </p:txBody>
+      </p:sp>
+      <p:sp>
+        <p:nvSpPr>
+          <p:cNvPr id="3" name="Content"/>
+          <p:cNvSpPr txBox="1"/>
+          <p:nvPr/>
+        </p:nvSpPr>
+        <p:spPr>
+          <a:xfrm>
+            <a:off x="457200" y="1600200"/>
+            <a:ext cx="8230200" cy="4572000"/>
+          </a:xfrm>
+          <a:prstGeom prst="rect">
+            <a:avLst/>
+          </a:prstGeom>
+          <a:noFill/>
+        </p:spPr>
+        <p:txBody>
+          <a:bodyPr wrap="square" rtlCol="0"/>
+          <a:lstStyle/>
+          <a:p>
+            <a:pPr lvl="0" marL="457200" indent="-457200">
+              <a:buChar char="★"/>
+            </a:pPr>
+            <a:r>
+              <a:rPr lang="en-US" sz="2800" b="0" i="0" dirty="0"/>
+              <a:t>Star bullet point</a:t>
+            </a:r>
+          </a:p>
+          <a:p>
+            <a:pPr lvl="0" marL="457200" indent="-457200">
+              <a:buChar char="→"/>
+            </a:pPr>
+            <a:r>
+              <a:rPr lang="en-US" sz="2800" b="0" i="0" dirty="0"/>
+              <a:t>Arrow bullet point</a:t>
+            </a:r>
+          </a:p>
+          <a:p>
+            <a:pPr lvl="0" marL="457200" indent="-457200">
+              <a:buChar char="✓"/>
+            </a:pPr>
+            <a:r>
+              <a:rPr lang="en-US" sz="2800" b="0" i="0" dirty="0"/>
+              <a:t>Check bullet point</a:t>
+            </a:r>
+          </a:p>
+          <a:p>
+            <a:pPr lvl="0" marL="457200" indent="-457200">
+              <a:buChar char="◆"/>
+            </a:pPr>
+            <a:r>
+              <a:rPr lang="en-US" sz="2800" b="0" i="0" dirty="0"/>
+              <a:t>Diamond bullet point</a:t>
+            </a:r>
+          </a:p>
+          <a:p>
+            <a:pPr lvl="0" marL="457200" indent="-457200">
+              <a:buChar char="♥"/>
+            </a:pPr>
+            <a:r>
+              <a:rPr lang="en-US" sz="2800" b="0" i="0" dirty="0"/>
+              <a:t>Heart bullet point</a:t>
+            </a:r>
+          </a:p>
+        </p:txBody>
+      </p:sp>
+    </p:spTree>
+  </p:cSld>
+  <p:clrMapOvr>
+    <a:masterClrMapping/>
+  </p:clrMapOvr>
+</p:sld>
+</file>
+
+<file path=ppt/slides/slide28.xml><?xml version="1.0" encoding="utf-8"?>
+<p:sld xmlns:a="http://schemas.openxmlformats.org/drawingml/2006/main" xmlns:r="http://schemas.openxmlformats.org/officeDocument/2006/relationships" xmlns:p="http://schemas.openxmlformats.org/presentationml/2006/main">
+  <p:cSld>
+    <p:bg>
+      <p:bgRef idx="1001">
+        <a:schemeClr val="bg1"/>
+      </p:bgRef>
+    </p:bg>
+    <p:spTree>
+      <p:nvGrpSpPr>
+        <p:cNvPr id="1" name=""/>
+        <p:cNvGrpSpPr/>
+        <p:nvPr/>
+      </p:nvGrpSpPr>
+      <p:grpSpPr>
+        <a:xfrm>
+          <a:off x="0" y="0"/>
+          <a:ext cx="9144000" cy="6858000"/>
+          <a:chOff x="0" y="0"/>
+          <a:chExt cx="9144000" cy="6858000"/>
+        </a:xfrm>
+      </p:grpSpPr>
+      <p:sp>
+        <p:nvSpPr>
+          <p:cNvPr id="2" name="Title"/>
+          <p:cNvSpPr txBox="1"/>
+          <p:nvPr/>
+        </p:nvSpPr>
+        <p:spPr>
+          <a:xfrm>
+            <a:off x="457200" y="274638"/>
+            <a:ext cx="8230200" cy="1143000"/>
+          </a:xfrm>
+          <a:prstGeom prst="rect">
+            <a:avLst/>
+          </a:prstGeom>
+          <a:noFill/>
+        </p:spPr>
+        <p:txBody>
+          <a:bodyPr wrap="square" rtlCol="0" anchor="ctr"/>
+          <a:lstStyle/>
+          <a:p>
+            <a:pPr algn="l"/>
+            <a:r>
+              <a:rPr lang="en-US" sz="4400" b="1" i="0" dirty="0">
+                <a:solidFill>
+                  <a:srgbClr val="1F497D"/>
+                </a:solidFill>
+              </a:rPr>
+              <a:t>Bullet Styles - Hierarchical Lists</a:t>
+            </a:r>
+          </a:p>
+        </p:txBody>
+      </p:sp>
+      <p:sp>
+        <p:nvSpPr>
+          <p:cNvPr id="3" name="Content"/>
+          <p:cNvSpPr txBox="1"/>
+          <p:nvPr/>
+        </p:nvSpPr>
+        <p:spPr>
+          <a:xfrm>
+            <a:off x="457200" y="1600200"/>
+            <a:ext cx="8230200" cy="4572000"/>
+          </a:xfrm>
+          <a:prstGeom prst="rect">
+            <a:avLst/>
+          </a:prstGeom>
+          <a:noFill/>
+        </p:spPr>
+        <p:txBody>
+          <a:bodyPr wrap="square" rtlCol="0"/>
+          <a:lstStyle/>
+          <a:p>
+            <a:pPr lvl="0" marL="457200" indent="-457200">
+              <a:buChar char="•"/>
+            </a:pPr>
+            <a:r>
+              <a:rPr lang="en-US" sz="2400" b="0" i="0" dirty="0"/>
+              <a:t>Main Topic 1</a:t>
+            </a:r>
+          </a:p>
+          <a:p>
+            <a:pPr lvl="1" marL="1371600" indent="-914400">
+              <a:buChar char="•"/>
+            </a:pPr>
+            <a:r>
+              <a:rPr lang="en-US" sz="2400" b="0" i="0" dirty="0"/>
+              <a:t>Supporting detail A</a:t>
+            </a:r>
+          </a:p>
+          <a:p>
+            <a:pPr lvl="1" marL="1371600" indent="-914400">
+              <a:buChar char="•"/>
+            </a:pPr>
+            <a:r>
+              <a:rPr lang="en-US" sz="2400" b="0" i="0" dirty="0"/>
+              <a:t>Supporting detail B</a:t>
+            </a:r>
+          </a:p>
+          <a:p>
+            <a:pPr lvl="0" marL="457200" indent="-457200">
+              <a:buChar char="•"/>
+            </a:pPr>
+            <a:r>
+              <a:rPr lang="en-US" sz="2400" b="0" i="0" dirty="0"/>
+              <a:t>Main Topic 2</a:t>
+            </a:r>
+          </a:p>
+          <a:p>
+            <a:pPr lvl="1" marL="1371600" indent="-914400">
+              <a:buChar char="•"/>
+            </a:pPr>
+            <a:r>
+              <a:rPr lang="en-US" sz="2400" b="0" i="0" dirty="0"/>
+              <a:t>Supporting detail C</a:t>
+            </a:r>
+          </a:p>
+          <a:p>
+            <a:pPr lvl="1" marL="1371600" indent="-914400">
+              <a:buChar char="•"/>
+            </a:pPr>
+            <a:r>
+              <a:rPr lang="en-US" sz="2400" b="0" i="0" dirty="0"/>
+              <a:t>Supporting detail D</a:t>
+            </a:r>
+          </a:p>
+          <a:p>
+            <a:pPr lvl="0" marL="457200" indent="-457200">
+              <a:buChar char="•"/>
+            </a:pPr>
+            <a:r>
+              <a:rPr lang="en-US" sz="2400" b="0" i="0" dirty="0"/>
+              <a:t>Main Topic 3</a:t>
+            </a:r>
+          </a:p>
+        </p:txBody>
+      </p:sp>
+    </p:spTree>
+  </p:cSld>
+  <p:clrMapOvr>
+    <a:masterClrMapping/>
+  </p:clrMapOvr>
+</p:sld>
+</file>
+
+<file path=ppt/slides/slide29.xml><?xml version="1.0" encoding="utf-8"?>
+<p:sld xmlns:a="http://schemas.openxmlformats.org/drawingml/2006/main" xmlns:r="http://schemas.openxmlformats.org/officeDocument/2006/relationships" xmlns:p="http://schemas.openxmlformats.org/presentationml/2006/main">
+  <p:cSld>
+    <p:bg>
+      <p:bgRef idx="1001">
+        <a:schemeClr val="bg1"/>
+      </p:bgRef>
+    </p:bg>
+    <p:spTree>
+      <p:nvGrpSpPr>
+        <p:cNvPr id="1" name=""/>
+        <p:cNvGrpSpPr/>
+        <p:nvPr/>
+      </p:nvGrpSpPr>
+      <p:grpSpPr>
+        <a:xfrm>
+          <a:off x="0" y="0"/>
+          <a:ext cx="9144000" cy="6858000"/>
+          <a:chOff x="0" y="0"/>
+          <a:chExt cx="9144000" cy="6858000"/>
+        </a:xfrm>
+      </p:grpSpPr>
+      <p:sp>
+        <p:nvSpPr>
+          <p:cNvPr id="2" name="Title"/>
+          <p:cNvSpPr txBox="1"/>
+          <p:nvPr/>
+        </p:nvSpPr>
+        <p:spPr>
+          <a:xfrm>
+            <a:off x="457200" y="274638"/>
+            <a:ext cx="8230200" cy="1143000"/>
+          </a:xfrm>
+          <a:prstGeom prst="rect">
+            <a:avLst/>
+          </a:prstGeom>
+          <a:noFill/>
+        </p:spPr>
+        <p:txBody>
+          <a:bodyPr wrap="square" rtlCol="0" anchor="ctr"/>
+          <a:lstStyle/>
+          <a:p>
+            <a:pPr algn="l"/>
+            <a:r>
+              <a:rPr lang="en-US" sz="4400" b="1" i="0" dirty="0">
+                <a:solidFill>
+                  <a:srgbClr val="1F497D"/>
+                </a:solidFill>
+              </a:rPr>
+              <a:t>Text Enhancements - New Formatting</a:t>
+            </a:r>
+          </a:p>
+        </p:txBody>
+      </p:sp>
+      <p:sp>
+        <p:nvSpPr>
+          <p:cNvPr id="3" name="Content"/>
+          <p:cNvSpPr txBox="1"/>
+          <p:nvPr/>
+        </p:nvSpPr>
+        <p:spPr>
+          <a:xfrm>
+            <a:off x="457200" y="1600200"/>
+            <a:ext cx="8230200" cy="4572000"/>
+          </a:xfrm>
+          <a:prstGeom prst="rect">
+            <a:avLst/>
+          </a:prstGeom>
+          <a:noFill/>
+        </p:spPr>
+        <p:txBody>
+          <a:bodyPr wrap="square" rtlCol="0"/>
+          <a:lstStyle/>
+          <a:p>
+            <a:pPr lvl="0" marL="457200" indent="-457200">
+              <a:buChar char="•"/>
+            </a:pPr>
+            <a:r>
+              <a:rPr lang="en-US" sz="2400" b="0" i="0" dirty="0"/>
+              <a:t>Strikethrough: For deleted or deprecated text</a:t>
+            </a:r>
+          </a:p>
+          <a:p>
+            <a:pPr lvl="0" marL="457200" indent="-457200">
+              <a:buChar char="•"/>
+            </a:pPr>
+            <a:r>
+              <a:rPr lang="en-US" sz="2400" b="0" i="0" dirty="0"/>
+              <a:t>Highlight: Yellow background for emphasis</a:t>
+            </a:r>
+          </a:p>
+          <a:p>
+            <a:pPr lvl="0" marL="457200" indent="-457200">
+              <a:buChar char="•"/>
+            </a:pPr>
+            <a:r>
+              <a:rPr lang="en-US" sz="2400" b="0" i="0" dirty="0"/>
+              <a:t>Subscript: H₂O chemical formulas</a:t>
+            </a:r>
+          </a:p>
+          <a:p>
+            <a:pPr lvl="0" marL="457200" indent="-457200">
+              <a:buChar char="•"/>
+            </a:pPr>
+            <a:r>
+              <a:rPr lang="en-US" sz="2400" b="0" i="0" dirty="0"/>
+              <a:t>Superscript: x² mathematical expressions</a:t>
+            </a:r>
+          </a:p>
+          <a:p>
+            <a:pPr lvl="0" marL="457200" indent="-457200">
+              <a:buChar char="•"/>
+            </a:pPr>
+            <a:r>
+              <a:rPr lang="en-US" sz="2400" b="0" i="0" dirty="0"/>
+              <a:t>Combined: Bold + Italic + Underline + Color</a:t>
             </a:r>
           </a:p>
         </p:txBody>
@@ -4823,7 +5612,9 @@
           <a:bodyPr wrap="square" rtlCol="0"/>
           <a:lstStyle/>
           <a:p>
-            <a:pPr lvl="0"/>
+            <a:pPr lvl="0" marL="457200" indent="-457200">
+              <a:buChar char="•"/>
+            </a:pPr>
             <a:r>
               <a:rPr lang="en-US" sz="2800" b="1" i="1" dirty="0">
                 <a:solidFill>
@@ -4834,7 +5625,9 @@
             </a:r>
           </a:p>
           <a:p>
-            <a:pPr lvl="0"/>
+            <a:pPr lvl="0" marL="457200" indent="-457200">
+              <a:buChar char="•"/>
+            </a:pPr>
             <a:r>
               <a:rPr lang="en-US" sz="2800" b="1" i="1" dirty="0">
                 <a:solidFill>
@@ -4845,7 +5638,9 @@
             </a:r>
           </a:p>
           <a:p>
-            <a:pPr lvl="0"/>
+            <a:pPr lvl="0" marL="457200" indent="-457200">
+              <a:buChar char="•"/>
+            </a:pPr>
             <a:r>
               <a:rPr lang="en-US" sz="2800" b="1" i="1" dirty="0">
                 <a:solidFill>
@@ -4856,7 +5651,9 @@
             </a:r>
           </a:p>
           <a:p>
-            <a:pPr lvl="0"/>
+            <a:pPr lvl="0" marL="457200" indent="-457200">
+              <a:buChar char="•"/>
+            </a:pPr>
             <a:r>
               <a:rPr lang="en-US" sz="2800" b="1" i="1" dirty="0">
                 <a:solidFill>
@@ -4867,7 +5664,9 @@
             </a:r>
           </a:p>
           <a:p>
-            <a:pPr lvl="0"/>
+            <a:pPr lvl="0" marL="457200" indent="-457200">
+              <a:buChar char="•"/>
+            </a:pPr>
             <a:r>
               <a:rPr lang="en-US" sz="2800" b="1" i="1" dirty="0">
                 <a:solidFill>
@@ -4878,7 +5677,9 @@
             </a:r>
           </a:p>
           <a:p>
-            <a:pPr lvl="0"/>
+            <a:pPr lvl="0" marL="457200" indent="-457200">
+              <a:buChar char="•"/>
+            </a:pPr>
             <a:r>
               <a:rPr lang="en-US" sz="2800" b="1" i="1" dirty="0">
                 <a:solidFill>
@@ -4886,6 +5687,1153 @@
                 </a:solidFill>
               </a:rPr>
               <a:t>Custom color (#4F81BD)</a:t>
+            </a:r>
+          </a:p>
+        </p:txBody>
+      </p:sp>
+    </p:spTree>
+  </p:cSld>
+  <p:clrMapOvr>
+    <a:masterClrMapping/>
+  </p:clrMapOvr>
+</p:sld>
+</file>
+
+<file path=ppt/slides/slide30.xml><?xml version="1.0" encoding="utf-8"?>
+<p:sld xmlns:a="http://schemas.openxmlformats.org/drawingml/2006/main" xmlns:r="http://schemas.openxmlformats.org/officeDocument/2006/relationships" xmlns:p="http://schemas.openxmlformats.org/presentationml/2006/main">
+  <p:cSld>
+    <p:bg>
+      <p:bgRef idx="1001">
+        <a:schemeClr val="bg1"/>
+      </p:bgRef>
+    </p:bg>
+    <p:spTree>
+      <p:nvGrpSpPr>
+        <p:cNvPr id="1" name=""/>
+        <p:cNvGrpSpPr/>
+        <p:nvPr/>
+      </p:nvGrpSpPr>
+      <p:grpSpPr>
+        <a:xfrm>
+          <a:off x="0" y="0"/>
+          <a:ext cx="9144000" cy="6858000"/>
+          <a:chOff x="0" y="0"/>
+          <a:chExt cx="9144000" cy="6858000"/>
+        </a:xfrm>
+      </p:grpSpPr>
+      <p:sp>
+        <p:nvSpPr>
+          <p:cNvPr id="2" name="Title"/>
+          <p:cNvSpPr txBox="1"/>
+          <p:nvPr/>
+        </p:nvSpPr>
+        <p:spPr>
+          <a:xfrm>
+            <a:off x="457200" y="274638"/>
+            <a:ext cx="8230200" cy="1143000"/>
+          </a:xfrm>
+          <a:prstGeom prst="rect">
+            <a:avLst/>
+          </a:prstGeom>
+          <a:noFill/>
+        </p:spPr>
+        <p:txBody>
+          <a:bodyPr wrap="square" rtlCol="0" anchor="ctr"/>
+          <a:lstStyle/>
+          <a:p>
+            <a:pPr algn="l"/>
+            <a:r>
+              <a:rPr lang="en-US" sz="4400" b="1" i="0" dirty="0">
+                <a:solidFill>
+                  <a:srgbClr val="1F497D"/>
+                </a:solidFill>
+              </a:rPr>
+              <a:t>Font Size Presets</a:t>
+            </a:r>
+          </a:p>
+        </p:txBody>
+      </p:sp>
+      <p:sp>
+        <p:nvSpPr>
+          <p:cNvPr id="3" name="Content"/>
+          <p:cNvSpPr txBox="1"/>
+          <p:nvPr/>
+        </p:nvSpPr>
+        <p:spPr>
+          <a:xfrm>
+            <a:off x="457200" y="1600200"/>
+            <a:ext cx="8230200" cy="4572000"/>
+          </a:xfrm>
+          <a:prstGeom prst="rect">
+            <a:avLst/>
+          </a:prstGeom>
+          <a:noFill/>
+        </p:spPr>
+        <p:txBody>
+          <a:bodyPr wrap="square" rtlCol="0"/>
+          <a:lstStyle/>
+          <a:p>
+            <a:pPr lvl="0" marL="457200" indent="-457200">
+              <a:buChar char="•"/>
+            </a:pPr>
+            <a:r>
+              <a:rPr lang="en-US" sz="2400" b="0" i="0" dirty="0"/>
+              <a:t>TITLE: 44 (44pt)</a:t>
+            </a:r>
+          </a:p>
+          <a:p>
+            <a:pPr lvl="0" marL="457200" indent="-457200">
+              <a:buChar char="•"/>
+            </a:pPr>
+            <a:r>
+              <a:rPr lang="en-US" sz="2400" b="0" i="0" dirty="0"/>
+              <a:t>SUBTITLE: 32 (32pt)</a:t>
+            </a:r>
+          </a:p>
+          <a:p>
+            <a:pPr lvl="0" marL="457200" indent="-457200">
+              <a:buChar char="•"/>
+            </a:pPr>
+            <a:r>
+              <a:rPr lang="en-US" sz="2400" b="0" i="0" dirty="0"/>
+              <a:t>HEADING: 28 (28pt)</a:t>
+            </a:r>
+          </a:p>
+          <a:p>
+            <a:pPr lvl="0" marL="457200" indent="-457200">
+              <a:buChar char="•"/>
+            </a:pPr>
+            <a:r>
+              <a:rPr lang="en-US" sz="2400" b="0" i="0" dirty="0"/>
+              <a:t>BODY: 18 (18pt)</a:t>
+            </a:r>
+          </a:p>
+          <a:p>
+            <a:pPr lvl="0" marL="457200" indent="-457200">
+              <a:buChar char="•"/>
+            </a:pPr>
+            <a:r>
+              <a:rPr lang="en-US" sz="2400" b="0" i="0" dirty="0"/>
+              <a:t>SMALL: 14 (14pt)</a:t>
+            </a:r>
+          </a:p>
+          <a:p>
+            <a:pPr lvl="0" marL="457200" indent="-457200">
+              <a:buChar char="•"/>
+            </a:pPr>
+            <a:r>
+              <a:rPr lang="en-US" sz="2400" b="0" i="0" dirty="0"/>
+              <a:t>CAPTION: 12 (12pt)</a:t>
+            </a:r>
+          </a:p>
+        </p:txBody>
+      </p:sp>
+    </p:spTree>
+  </p:cSld>
+  <p:clrMapOvr>
+    <a:masterClrMapping/>
+  </p:clrMapOvr>
+</p:sld>
+</file>
+
+<file path=ppt/slides/slide31.xml><?xml version="1.0" encoding="utf-8"?>
+<p:sld xmlns:a="http://schemas.openxmlformats.org/drawingml/2006/main" xmlns:r="http://schemas.openxmlformats.org/officeDocument/2006/relationships" xmlns:p="http://schemas.openxmlformats.org/presentationml/2006/main">
+  <p:cSld>
+    <p:bg>
+      <p:bgRef idx="1001">
+        <a:schemeClr val="bg1"/>
+      </p:bgRef>
+    </p:bg>
+    <p:spTree>
+      <p:nvGrpSpPr>
+        <p:cNvPr id="1" name=""/>
+        <p:cNvGrpSpPr/>
+        <p:nvPr/>
+      </p:nvGrpSpPr>
+      <p:grpSpPr>
+        <a:xfrm>
+          <a:off x="0" y="0"/>
+          <a:ext cx="9144000" cy="6858000"/>
+          <a:chOff x="0" y="0"/>
+          <a:chExt cx="9144000" cy="6858000"/>
+        </a:xfrm>
+      </p:grpSpPr>
+      <p:sp>
+        <p:nvSpPr>
+          <p:cNvPr id="2" name="Title"/>
+          <p:cNvSpPr txBox="1"/>
+          <p:nvPr/>
+        </p:nvSpPr>
+        <p:spPr>
+          <a:xfrm>
+            <a:off x="457200" y="274638"/>
+            <a:ext cx="8230200" cy="1143000"/>
+          </a:xfrm>
+          <a:prstGeom prst="rect">
+            <a:avLst/>
+          </a:prstGeom>
+          <a:noFill/>
+        </p:spPr>
+        <p:txBody>
+          <a:bodyPr wrap="square" rtlCol="0" anchor="ctr"/>
+          <a:lstStyle/>
+          <a:p>
+            <a:pPr algn="l"/>
+            <a:r>
+              <a:rPr lang="en-US" sz="4400" b="1" i="0" dirty="0">
+                <a:solidFill>
+                  <a:srgbClr val="1F497D"/>
+                </a:solidFill>
+              </a:rPr>
+              <a:t>Theme Color Palettes</a:t>
+            </a:r>
+          </a:p>
+        </p:txBody>
+      </p:sp>
+      <p:sp>
+        <p:nvSpPr>
+          <p:cNvPr id="10" name="Shape 10"/>
+          <p:cNvSpPr/>
+          <p:nvPr/>
+        </p:nvSpPr>
+        <p:spPr>
+          <a:xfrm>
+            <a:off x="500000" y="1600000"/>
+            <a:ext cx="1800000" cy="800000"/>
+          </a:xfrm>
+          <a:prstGeom prst="rect">
+            <a:avLst/>
+          </a:prstGeom>
+          <a:solidFill>
+            <a:srgbClr val="1565C0"/>
+          </a:solidFill>
+        </p:spPr>
+        <p:txBody>
+          <a:bodyPr wrap="square" rtlCol="0" anchor="ctr">
+            <a:normAutofit/>
+          </a:bodyPr>
+          <a:lstStyle/>
+          <a:p>
+            <a:pPr algn="ctr"/>
+            <a:r>
+              <a:rPr lang="en-US" sz="3149" dirty="0">
+                <a:solidFill>
+                  <a:srgbClr val="FFFFFF"/>
+                </a:solidFill>
+              </a:rPr>
+              <a:t>Corporate</a:t>
+            </a:r>
+          </a:p>
+        </p:txBody>
+      </p:sp>
+      <p:sp>
+        <p:nvSpPr>
+          <p:cNvPr id="11" name="Shape 11"/>
+          <p:cNvSpPr/>
+          <p:nvPr/>
+        </p:nvSpPr>
+        <p:spPr>
+          <a:xfrm>
+            <a:off x="2500000" y="1600000"/>
+            <a:ext cx="1800000" cy="800000"/>
+          </a:xfrm>
+          <a:prstGeom prst="rect">
+            <a:avLst/>
+          </a:prstGeom>
+          <a:solidFill>
+            <a:srgbClr val="212121"/>
+          </a:solidFill>
+        </p:spPr>
+        <p:txBody>
+          <a:bodyPr wrap="square" rtlCol="0" anchor="ctr">
+            <a:normAutofit/>
+          </a:bodyPr>
+          <a:lstStyle/>
+          <a:p>
+            <a:pPr algn="ctr"/>
+            <a:r>
+              <a:rPr lang="en-US" sz="4400" dirty="0">
+                <a:solidFill>
+                  <a:srgbClr val="FFFFFF"/>
+                </a:solidFill>
+              </a:rPr>
+              <a:t>Modern</a:t>
+            </a:r>
+          </a:p>
+        </p:txBody>
+      </p:sp>
+      <p:sp>
+        <p:nvSpPr>
+          <p:cNvPr id="12" name="Shape 12"/>
+          <p:cNvSpPr/>
+          <p:nvPr/>
+        </p:nvSpPr>
+        <p:spPr>
+          <a:xfrm>
+            <a:off x="4500000" y="1600000"/>
+            <a:ext cx="1800000" cy="800000"/>
+          </a:xfrm>
+          <a:prstGeom prst="rect">
+            <a:avLst/>
+          </a:prstGeom>
+          <a:solidFill>
+            <a:srgbClr val="E91E63"/>
+          </a:solidFill>
+        </p:spPr>
+        <p:txBody>
+          <a:bodyPr wrap="square" rtlCol="0" anchor="ctr">
+            <a:normAutofit/>
+          </a:bodyPr>
+          <a:lstStyle/>
+          <a:p>
+            <a:pPr algn="ctr"/>
+            <a:r>
+              <a:rPr lang="en-US" sz="4049" dirty="0">
+                <a:solidFill>
+                  <a:srgbClr val="FFFFFF"/>
+                </a:solidFill>
+              </a:rPr>
+              <a:t>Vibrant</a:t>
+            </a:r>
+          </a:p>
+        </p:txBody>
+      </p:sp>
+      <p:sp>
+        <p:nvSpPr>
+          <p:cNvPr id="13" name="Shape 13"/>
+          <p:cNvSpPr/>
+          <p:nvPr/>
+        </p:nvSpPr>
+        <p:spPr>
+          <a:xfrm>
+            <a:off x="6500000" y="1600000"/>
+            <a:ext cx="1800000" cy="800000"/>
+          </a:xfrm>
+          <a:prstGeom prst="rect">
+            <a:avLst/>
+          </a:prstGeom>
+          <a:solidFill>
+            <a:srgbClr val="BB86FC"/>
+          </a:solidFill>
+        </p:spPr>
+        <p:txBody>
+          <a:bodyPr wrap="square" rtlCol="0" anchor="ctr">
+            <a:normAutofit/>
+          </a:bodyPr>
+          <a:lstStyle/>
+          <a:p>
+            <a:pPr algn="ctr"/>
+            <a:r>
+              <a:rPr lang="en-US" sz="4400" dirty="0">
+                <a:solidFill>
+                  <a:srgbClr val="000000"/>
+                </a:solidFill>
+              </a:rPr>
+              <a:t>Dark</a:t>
+            </a:r>
+          </a:p>
+        </p:txBody>
+      </p:sp>
+      <p:sp>
+        <p:nvSpPr>
+          <p:cNvPr id="14" name="Shape 14"/>
+          <p:cNvSpPr/>
+          <p:nvPr/>
+        </p:nvSpPr>
+        <p:spPr>
+          <a:xfrm>
+            <a:off x="500000" y="2700000"/>
+            <a:ext cx="1800000" cy="800000"/>
+          </a:xfrm>
+          <a:prstGeom prst="rect">
+            <a:avLst/>
+          </a:prstGeom>
+          <a:solidFill>
+            <a:srgbClr val="2E7D32"/>
+          </a:solidFill>
+        </p:spPr>
+        <p:txBody>
+          <a:bodyPr wrap="square" rtlCol="0" anchor="ctr">
+            <a:normAutofit/>
+          </a:bodyPr>
+          <a:lstStyle/>
+          <a:p>
+            <a:pPr algn="ctr"/>
+            <a:r>
+              <a:rPr lang="en-US" sz="4400" dirty="0">
+                <a:solidFill>
+                  <a:srgbClr val="FFFFFF"/>
+                </a:solidFill>
+              </a:rPr>
+              <a:t>Nature</a:t>
+            </a:r>
+          </a:p>
+        </p:txBody>
+      </p:sp>
+      <p:sp>
+        <p:nvSpPr>
+          <p:cNvPr id="15" name="Shape 15"/>
+          <p:cNvSpPr/>
+          <p:nvPr/>
+        </p:nvSpPr>
+        <p:spPr>
+          <a:xfrm>
+            <a:off x="2500000" y="2700000"/>
+            <a:ext cx="1800000" cy="800000"/>
+          </a:xfrm>
+          <a:prstGeom prst="rect">
+            <a:avLst/>
+          </a:prstGeom>
+          <a:solidFill>
+            <a:srgbClr val="0D47A1"/>
+          </a:solidFill>
+        </p:spPr>
+        <p:txBody>
+          <a:bodyPr wrap="square" rtlCol="0" anchor="ctr">
+            <a:normAutofit/>
+          </a:bodyPr>
+          <a:lstStyle/>
+          <a:p>
+            <a:pPr algn="ctr"/>
+            <a:r>
+              <a:rPr lang="en-US" sz="4400" dirty="0">
+                <a:solidFill>
+                  <a:srgbClr val="FFFFFF"/>
+                </a:solidFill>
+              </a:rPr>
+              <a:t>Tech</a:t>
+            </a:r>
+          </a:p>
+        </p:txBody>
+      </p:sp>
+      <p:sp>
+        <p:nvSpPr>
+          <p:cNvPr id="16" name="Shape 16"/>
+          <p:cNvSpPr/>
+          <p:nvPr/>
+        </p:nvSpPr>
+        <p:spPr>
+          <a:xfrm>
+            <a:off x="4500000" y="2700000"/>
+            <a:ext cx="1800000" cy="800000"/>
+          </a:xfrm>
+          <a:prstGeom prst="rect">
+            <a:avLst/>
+          </a:prstGeom>
+          <a:solidFill>
+            <a:srgbClr val="0043CE"/>
+          </a:solidFill>
+        </p:spPr>
+        <p:txBody>
+          <a:bodyPr wrap="square" rtlCol="0" anchor="ctr">
+            <a:normAutofit/>
+          </a:bodyPr>
+          <a:lstStyle/>
+          <a:p>
+            <a:pPr algn="ctr"/>
+            <a:r>
+              <a:rPr lang="en-US" sz="4400" dirty="0">
+                <a:solidFill>
+                  <a:srgbClr val="FFFFFF"/>
+                </a:solidFill>
+              </a:rPr>
+              <a:t>Carbon</a:t>
+            </a:r>
+          </a:p>
+        </p:txBody>
+      </p:sp>
+    </p:spTree>
+  </p:cSld>
+  <p:clrMapOvr>
+    <a:masterClrMapping/>
+  </p:clrMapOvr>
+</p:sld>
+</file>
+
+<file path=ppt/slides/slide32.xml><?xml version="1.0" encoding="utf-8"?>
+<p:sld xmlns:a="http://schemas.openxmlformats.org/drawingml/2006/main" xmlns:r="http://schemas.openxmlformats.org/officeDocument/2006/relationships" xmlns:p="http://schemas.openxmlformats.org/presentationml/2006/main">
+  <p:cSld>
+    <p:bg>
+      <p:bgRef idx="1001">
+        <a:schemeClr val="bg1"/>
+      </p:bgRef>
+    </p:bg>
+    <p:spTree>
+      <p:nvGrpSpPr>
+        <p:cNvPr id="1" name=""/>
+        <p:cNvGrpSpPr/>
+        <p:nvPr/>
+      </p:nvGrpSpPr>
+      <p:grpSpPr>
+        <a:xfrm>
+          <a:off x="0" y="0"/>
+          <a:ext cx="9144000" cy="6858000"/>
+          <a:chOff x="0" y="0"/>
+          <a:chExt cx="9144000" cy="6858000"/>
+        </a:xfrm>
+      </p:grpSpPr>
+      <p:sp>
+        <p:nvSpPr>
+          <p:cNvPr id="2" name="Title"/>
+          <p:cNvSpPr txBox="1"/>
+          <p:nvPr/>
+        </p:nvSpPr>
+        <p:spPr>
+          <a:xfrm>
+            <a:off x="457200" y="274638"/>
+            <a:ext cx="8230200" cy="1143000"/>
+          </a:xfrm>
+          <a:prstGeom prst="rect">
+            <a:avLst/>
+          </a:prstGeom>
+          <a:noFill/>
+        </p:spPr>
+        <p:txBody>
+          <a:bodyPr wrap="square" rtlCol="0" anchor="ctr"/>
+          <a:lstStyle/>
+          <a:p>
+            <a:pPr algn="l"/>
+            <a:r>
+              <a:rPr lang="en-US" sz="4400" b="1" i="0" dirty="0">
+                <a:solidFill>
+                  <a:srgbClr val="1F497D"/>
+                </a:solidFill>
+              </a:rPr>
+              <a:t>Material &amp; Carbon Design Colors</a:t>
+            </a:r>
+          </a:p>
+        </p:txBody>
+      </p:sp>
+      <p:sp>
+        <p:nvSpPr>
+          <p:cNvPr id="10" name="Shape 10"/>
+          <p:cNvSpPr/>
+          <p:nvPr/>
+        </p:nvSpPr>
+        <p:spPr>
+          <a:xfrm>
+            <a:off x="500000" y="1600000"/>
+            <a:ext cx="1200000" cy="600000"/>
+          </a:xfrm>
+          <a:prstGeom prst="rect">
+            <a:avLst/>
+          </a:prstGeom>
+          <a:solidFill>
+            <a:srgbClr val="F44336"/>
+          </a:solidFill>
+        </p:spPr>
+        <p:txBody>
+          <a:bodyPr wrap="square" rtlCol="0" anchor="ctr">
+            <a:normAutofit/>
+          </a:bodyPr>
+          <a:lstStyle/>
+          <a:p>
+            <a:pPr algn="ctr"/>
+            <a:r>
+              <a:rPr lang="en-US" sz="3779" dirty="0">
+                <a:solidFill>
+                  <a:srgbClr val="FFFFFF"/>
+                </a:solidFill>
+              </a:rPr>
+              <a:t>M-Red</a:t>
+            </a:r>
+          </a:p>
+        </p:txBody>
+      </p:sp>
+      <p:sp>
+        <p:nvSpPr>
+          <p:cNvPr id="11" name="Shape 11"/>
+          <p:cNvSpPr/>
+          <p:nvPr/>
+        </p:nvSpPr>
+        <p:spPr>
+          <a:xfrm>
+            <a:off x="1900000" y="1600000"/>
+            <a:ext cx="1200000" cy="600000"/>
+          </a:xfrm>
+          <a:prstGeom prst="rect">
+            <a:avLst/>
+          </a:prstGeom>
+          <a:solidFill>
+            <a:srgbClr val="2196F3"/>
+          </a:solidFill>
+        </p:spPr>
+        <p:txBody>
+          <a:bodyPr wrap="square" rtlCol="0" anchor="ctr">
+            <a:normAutofit/>
+          </a:bodyPr>
+          <a:lstStyle/>
+          <a:p>
+            <a:pPr algn="ctr"/>
+            <a:r>
+              <a:rPr lang="en-US" sz="3149" dirty="0">
+                <a:solidFill>
+                  <a:srgbClr val="FFFFFF"/>
+                </a:solidFill>
+              </a:rPr>
+              <a:t>M-Blue</a:t>
+            </a:r>
+          </a:p>
+        </p:txBody>
+      </p:sp>
+      <p:sp>
+        <p:nvSpPr>
+          <p:cNvPr id="12" name="Shape 12"/>
+          <p:cNvSpPr/>
+          <p:nvPr/>
+        </p:nvSpPr>
+        <p:spPr>
+          <a:xfrm>
+            <a:off x="3300000" y="1600000"/>
+            <a:ext cx="1200000" cy="600000"/>
+          </a:xfrm>
+          <a:prstGeom prst="rect">
+            <a:avLst/>
+          </a:prstGeom>
+          <a:solidFill>
+            <a:srgbClr val="4CAF50"/>
+          </a:solidFill>
+        </p:spPr>
+        <p:txBody>
+          <a:bodyPr wrap="square" rtlCol="0" anchor="ctr">
+            <a:normAutofit/>
+          </a:bodyPr>
+          <a:lstStyle/>
+          <a:p>
+            <a:pPr algn="ctr"/>
+            <a:r>
+              <a:rPr lang="en-US" sz="2699" dirty="0">
+                <a:solidFill>
+                  <a:srgbClr val="000000"/>
+                </a:solidFill>
+              </a:rPr>
+              <a:t>M-Green</a:t>
+            </a:r>
+          </a:p>
+        </p:txBody>
+      </p:sp>
+      <p:sp>
+        <p:nvSpPr>
+          <p:cNvPr id="13" name="Shape 13"/>
+          <p:cNvSpPr/>
+          <p:nvPr/>
+        </p:nvSpPr>
+        <p:spPr>
+          <a:xfrm>
+            <a:off x="4700000" y="1600000"/>
+            <a:ext cx="1200000" cy="600000"/>
+          </a:xfrm>
+          <a:prstGeom prst="rect">
+            <a:avLst/>
+          </a:prstGeom>
+          <a:solidFill>
+            <a:srgbClr val="FF9800"/>
+          </a:solidFill>
+        </p:spPr>
+        <p:txBody>
+          <a:bodyPr wrap="square" rtlCol="0" anchor="ctr">
+            <a:normAutofit/>
+          </a:bodyPr>
+          <a:lstStyle/>
+          <a:p>
+            <a:pPr algn="ctr"/>
+            <a:r>
+              <a:rPr lang="en-US" sz="2362" dirty="0">
+                <a:solidFill>
+                  <a:srgbClr val="000000"/>
+                </a:solidFill>
+              </a:rPr>
+              <a:t>M-Orange</a:t>
+            </a:r>
+          </a:p>
+        </p:txBody>
+      </p:sp>
+      <p:sp>
+        <p:nvSpPr>
+          <p:cNvPr id="14" name="Shape 14"/>
+          <p:cNvSpPr/>
+          <p:nvPr/>
+        </p:nvSpPr>
+        <p:spPr>
+          <a:xfrm>
+            <a:off x="6100000" y="1600000"/>
+            <a:ext cx="1200000" cy="600000"/>
+          </a:xfrm>
+          <a:prstGeom prst="rect">
+            <a:avLst/>
+          </a:prstGeom>
+          <a:solidFill>
+            <a:srgbClr val="9C27B0"/>
+          </a:solidFill>
+        </p:spPr>
+        <p:txBody>
+          <a:bodyPr wrap="square" rtlCol="0" anchor="ctr">
+            <a:normAutofit/>
+          </a:bodyPr>
+          <a:lstStyle/>
+          <a:p>
+            <a:pPr algn="ctr"/>
+            <a:r>
+              <a:rPr lang="en-US" sz="2362" dirty="0">
+                <a:solidFill>
+                  <a:srgbClr val="FFFFFF"/>
+                </a:solidFill>
+              </a:rPr>
+              <a:t>M-Purple</a:t>
+            </a:r>
+          </a:p>
+        </p:txBody>
+      </p:sp>
+      <p:sp>
+        <p:nvSpPr>
+          <p:cNvPr id="15" name="Shape 15"/>
+          <p:cNvSpPr/>
+          <p:nvPr/>
+        </p:nvSpPr>
+        <p:spPr>
+          <a:xfrm>
+            <a:off x="500000" y="2500000"/>
+            <a:ext cx="1200000" cy="600000"/>
+          </a:xfrm>
+          <a:prstGeom prst="rect">
+            <a:avLst/>
+          </a:prstGeom>
+          <a:solidFill>
+            <a:srgbClr val="0043CE"/>
+          </a:solidFill>
+        </p:spPr>
+        <p:txBody>
+          <a:bodyPr wrap="square" rtlCol="0" anchor="ctr">
+            <a:normAutofit/>
+          </a:bodyPr>
+          <a:lstStyle/>
+          <a:p>
+            <a:pPr algn="ctr"/>
+            <a:r>
+              <a:rPr lang="en-US" sz="3149" dirty="0">
+                <a:solidFill>
+                  <a:srgbClr val="FFFFFF"/>
+                </a:solidFill>
+              </a:rPr>
+              <a:t>C-Blue</a:t>
+            </a:r>
+          </a:p>
+        </p:txBody>
+      </p:sp>
+      <p:sp>
+        <p:nvSpPr>
+          <p:cNvPr id="16" name="Shape 16"/>
+          <p:cNvSpPr/>
+          <p:nvPr/>
+        </p:nvSpPr>
+        <p:spPr>
+          <a:xfrm>
+            <a:off x="1900000" y="2500000"/>
+            <a:ext cx="1200000" cy="600000"/>
+          </a:xfrm>
+          <a:prstGeom prst="rect">
+            <a:avLst/>
+          </a:prstGeom>
+          <a:solidFill>
+            <a:srgbClr val="24A148"/>
+          </a:solidFill>
+        </p:spPr>
+        <p:txBody>
+          <a:bodyPr wrap="square" rtlCol="0" anchor="ctr">
+            <a:normAutofit/>
+          </a:bodyPr>
+          <a:lstStyle/>
+          <a:p>
+            <a:pPr algn="ctr"/>
+            <a:r>
+              <a:rPr lang="en-US" sz="2699" dirty="0">
+                <a:solidFill>
+                  <a:srgbClr val="FFFFFF"/>
+                </a:solidFill>
+              </a:rPr>
+              <a:t>C-Green</a:t>
+            </a:r>
+          </a:p>
+        </p:txBody>
+      </p:sp>
+      <p:sp>
+        <p:nvSpPr>
+          <p:cNvPr id="17" name="Shape 17"/>
+          <p:cNvSpPr/>
+          <p:nvPr/>
+        </p:nvSpPr>
+        <p:spPr>
+          <a:xfrm>
+            <a:off x="3300000" y="2500000"/>
+            <a:ext cx="1200000" cy="600000"/>
+          </a:xfrm>
+          <a:prstGeom prst="rect">
+            <a:avLst/>
+          </a:prstGeom>
+          <a:solidFill>
+            <a:srgbClr val="DA1E28"/>
+          </a:solidFill>
+        </p:spPr>
+        <p:txBody>
+          <a:bodyPr wrap="square" rtlCol="0" anchor="ctr">
+            <a:normAutofit/>
+          </a:bodyPr>
+          <a:lstStyle/>
+          <a:p>
+            <a:pPr algn="ctr"/>
+            <a:r>
+              <a:rPr lang="en-US" sz="3779" dirty="0">
+                <a:solidFill>
+                  <a:srgbClr val="FFFFFF"/>
+                </a:solidFill>
+              </a:rPr>
+              <a:t>C-Red</a:t>
+            </a:r>
+          </a:p>
+        </p:txBody>
+      </p:sp>
+      <p:sp>
+        <p:nvSpPr>
+          <p:cNvPr id="18" name="Shape 18"/>
+          <p:cNvSpPr/>
+          <p:nvPr/>
+        </p:nvSpPr>
+        <p:spPr>
+          <a:xfrm>
+            <a:off x="4700000" y="2500000"/>
+            <a:ext cx="1200000" cy="600000"/>
+          </a:xfrm>
+          <a:prstGeom prst="rect">
+            <a:avLst/>
+          </a:prstGeom>
+          <a:solidFill>
+            <a:srgbClr val="8A3FFC"/>
+          </a:solidFill>
+        </p:spPr>
+        <p:txBody>
+          <a:bodyPr wrap="square" rtlCol="0" anchor="ctr">
+            <a:normAutofit/>
+          </a:bodyPr>
+          <a:lstStyle/>
+          <a:p>
+            <a:pPr algn="ctr"/>
+            <a:r>
+              <a:rPr lang="en-US" sz="2362" dirty="0">
+                <a:solidFill>
+                  <a:srgbClr val="FFFFFF"/>
+                </a:solidFill>
+              </a:rPr>
+              <a:t>C-Purple</a:t>
+            </a:r>
+          </a:p>
+        </p:txBody>
+      </p:sp>
+      <p:sp>
+        <p:nvSpPr>
+          <p:cNvPr id="19" name="Shape 19"/>
+          <p:cNvSpPr/>
+          <p:nvPr/>
+        </p:nvSpPr>
+        <p:spPr>
+          <a:xfrm>
+            <a:off x="6100000" y="2500000"/>
+            <a:ext cx="1200000" cy="600000"/>
+          </a:xfrm>
+          <a:prstGeom prst="rect">
+            <a:avLst/>
+          </a:prstGeom>
+          <a:solidFill>
+            <a:srgbClr val="161616"/>
+          </a:solidFill>
+        </p:spPr>
+        <p:txBody>
+          <a:bodyPr wrap="square" rtlCol="0" anchor="ctr">
+            <a:normAutofit/>
+          </a:bodyPr>
+          <a:lstStyle/>
+          <a:p>
+            <a:pPr algn="ctr"/>
+            <a:r>
+              <a:rPr lang="en-US" sz="3149" dirty="0">
+                <a:solidFill>
+                  <a:srgbClr val="FFFFFF"/>
+                </a:solidFill>
+              </a:rPr>
+              <a:t>C-Gray</a:t>
+            </a:r>
+          </a:p>
+        </p:txBody>
+      </p:sp>
+    </p:spTree>
+  </p:cSld>
+  <p:clrMapOvr>
+    <a:masterClrMapping/>
+  </p:clrMapOvr>
+</p:sld>
+</file>
+
+<file path=ppt/slides/slide33.xml><?xml version="1.0" encoding="utf-8"?>
+<p:sld xmlns:a="http://schemas.openxmlformats.org/drawingml/2006/main" xmlns:r="http://schemas.openxmlformats.org/officeDocument/2006/relationships" xmlns:p="http://schemas.openxmlformats.org/presentationml/2006/main">
+  <p:cSld>
+    <p:bg>
+      <p:bgRef idx="1001">
+        <a:schemeClr val="bg1"/>
+      </p:bgRef>
+    </p:bg>
+    <p:spTree>
+      <p:nvGrpSpPr>
+        <p:cNvPr id="1" name=""/>
+        <p:cNvGrpSpPr/>
+        <p:nvPr/>
+      </p:nvGrpSpPr>
+      <p:grpSpPr>
+        <a:xfrm>
+          <a:off x="0" y="0"/>
+          <a:ext cx="9144000" cy="6858000"/>
+          <a:chOff x="0" y="0"/>
+          <a:chExt cx="9144000" cy="6858000"/>
+        </a:xfrm>
+      </p:grpSpPr>
+      <p:sp>
+        <p:nvSpPr>
+          <p:cNvPr id="2" name="Title"/>
+          <p:cNvSpPr txBox="1"/>
+          <p:nvPr/>
+        </p:nvSpPr>
+        <p:spPr>
+          <a:xfrm>
+            <a:off x="457200" y="274638"/>
+            <a:ext cx="8230200" cy="1143000"/>
+          </a:xfrm>
+          <a:prstGeom prst="rect">
+            <a:avLst/>
+          </a:prstGeom>
+          <a:noFill/>
+        </p:spPr>
+        <p:txBody>
+          <a:bodyPr wrap="square" rtlCol="0" anchor="ctr"/>
+          <a:lstStyle/>
+          <a:p>
+            <a:pPr algn="l"/>
+            <a:r>
+              <a:rPr lang="en-US" sz="4400" b="1" i="0" dirty="0">
+                <a:solidFill>
+                  <a:srgbClr val="1F497D"/>
+                </a:solidFill>
+              </a:rPr>
+              <a:t>Image Loading - New Methods</a:t>
+            </a:r>
+          </a:p>
+        </p:txBody>
+      </p:sp>
+      <p:sp>
+        <p:nvSpPr>
+          <p:cNvPr id="3" name="Content"/>
+          <p:cNvSpPr txBox="1"/>
+          <p:nvPr/>
+        </p:nvSpPr>
+        <p:spPr>
+          <a:xfrm>
+            <a:off x="457200" y="1600200"/>
+            <a:ext cx="8230200" cy="4572000"/>
+          </a:xfrm>
+          <a:prstGeom prst="rect">
+            <a:avLst/>
+          </a:prstGeom>
+          <a:noFill/>
+        </p:spPr>
+        <p:txBody>
+          <a:bodyPr wrap="square" rtlCol="0"/>
+          <a:lstStyle/>
+          <a:p>
+            <a:pPr lvl="0" marL="457200" indent="-457200">
+              <a:buChar char="•"/>
+            </a:pPr>
+            <a:r>
+              <a:rPr lang="en-US" sz="2400" b="0" i="0" dirty="0"/>
+              <a:t>Image::new(path) - Load from file path</a:t>
+            </a:r>
+          </a:p>
+          <a:p>
+            <a:pPr lvl="0" marL="457200" indent="-457200">
+              <a:buChar char="•"/>
+            </a:pPr>
+            <a:r>
+              <a:rPr lang="en-US" sz="2400" b="0" i="0" dirty="0"/>
+              <a:t>Image::from_base64(data) - Load from base64 string</a:t>
+            </a:r>
+          </a:p>
+          <a:p>
+            <a:pPr lvl="0" marL="457200" indent="-457200">
+              <a:buChar char="•"/>
+            </a:pPr>
+            <a:r>
+              <a:rPr lang="en-US" sz="2400" b="0" i="0" dirty="0"/>
+              <a:t>Image::from_bytes(data) - Load from raw bytes</a:t>
+            </a:r>
+          </a:p>
+          <a:p>
+            <a:pPr lvl="0" marL="457200" indent="-457200">
+              <a:buChar char="•"/>
+            </a:pPr>
+            <a:r>
+              <a:rPr lang="en-US" sz="2400" b="0" i="0" dirty="0"/>
+              <a:t>ImageBuilder for fluent API configuration</a:t>
+            </a:r>
+          </a:p>
+          <a:p>
+            <a:pPr lvl="0" marL="457200" indent="-457200">
+              <a:buChar char="•"/>
+            </a:pPr>
+            <a:r>
+              <a:rPr lang="en-US" sz="2400" b="0" i="0" dirty="0"/>
+              <a:t>Built-in base64 decoder (no external deps)</a:t>
+            </a:r>
+          </a:p>
+        </p:txBody>
+      </p:sp>
+    </p:spTree>
+  </p:cSld>
+  <p:clrMapOvr>
+    <a:masterClrMapping/>
+  </p:clrMapOvr>
+</p:sld>
+</file>
+
+<file path=ppt/slides/slide34.xml><?xml version="1.0" encoding="utf-8"?>
+<p:sld xmlns:a="http://schemas.openxmlformats.org/drawingml/2006/main" xmlns:r="http://schemas.openxmlformats.org/officeDocument/2006/relationships" xmlns:p="http://schemas.openxmlformats.org/presentationml/2006/main">
+  <p:cSld>
+    <p:bg>
+      <p:bgRef idx="1001">
+        <a:schemeClr val="bg1"/>
+      </p:bgRef>
+    </p:bg>
+    <p:spTree>
+      <p:nvGrpSpPr>
+        <p:cNvPr id="1" name=""/>
+        <p:cNvGrpSpPr/>
+        <p:nvPr/>
+      </p:nvGrpSpPr>
+      <p:grpSpPr>
+        <a:xfrm>
+          <a:off x="0" y="0"/>
+          <a:ext cx="9144000" cy="6858000"/>
+          <a:chOff x="0" y="0"/>
+          <a:chExt cx="9144000" cy="6858000"/>
+        </a:xfrm>
+      </p:grpSpPr>
+      <p:sp>
+        <p:nvSpPr>
+          <p:cNvPr id="2" name="Title"/>
+          <p:cNvSpPr txBox="1"/>
+          <p:nvPr/>
+        </p:nvSpPr>
+        <p:spPr>
+          <a:xfrm>
+            <a:off x="457200" y="274638"/>
+            <a:ext cx="8230200" cy="1143000"/>
+          </a:xfrm>
+          <a:prstGeom prst="rect">
+            <a:avLst/>
+          </a:prstGeom>
+          <a:noFill/>
+        </p:spPr>
+        <p:txBody>
+          <a:bodyPr wrap="square" rtlCol="0" anchor="ctr"/>
+          <a:lstStyle/>
+          <a:p>
+            <a:pPr algn="l"/>
+            <a:r>
+              <a:rPr lang="en-US" sz="4400" b="1" i="0" dirty="0">
+                <a:solidFill>
+                  <a:srgbClr val="1F497D"/>
+                </a:solidFill>
+              </a:rPr>
+              <a:t>New Features in v0.2.1</a:t>
+            </a:r>
+          </a:p>
+        </p:txBody>
+      </p:sp>
+      <p:sp>
+        <p:nvSpPr>
+          <p:cNvPr id="3" name="Content"/>
+          <p:cNvSpPr txBox="1"/>
+          <p:nvPr/>
+        </p:nvSpPr>
+        <p:spPr>
+          <a:xfrm>
+            <a:off x="457200" y="1600200"/>
+            <a:ext cx="8230200" cy="4572000"/>
+          </a:xfrm>
+          <a:prstGeom prst="rect">
+            <a:avLst/>
+          </a:prstGeom>
+          <a:noFill/>
+        </p:spPr>
+        <p:txBody>
+          <a:bodyPr wrap="square" rtlCol="0"/>
+          <a:lstStyle/>
+          <a:p>
+            <a:pPr lvl="0" marL="457200" indent="-457200">
+              <a:buAutoNum type="arabicPeriod"/>
+            </a:pPr>
+            <a:r>
+              <a:rPr lang="en-US" sz="2400" b="0" i="0" dirty="0"/>
+              <a:t>BulletStyle: Number, Letter, Roman, Custom</a:t>
+            </a:r>
+          </a:p>
+          <a:p>
+            <a:pPr lvl="0" marL="457200" indent="-457200">
+              <a:buAutoNum type="arabicPeriod"/>
+            </a:pPr>
+            <a:r>
+              <a:rPr lang="en-US" sz="2400" b="0" i="0" dirty="0"/>
+              <a:t>TextFormat: Strikethrough, Highlight</a:t>
+            </a:r>
+          </a:p>
+          <a:p>
+            <a:pPr lvl="0" marL="457200" indent="-457200">
+              <a:buAutoNum type="arabicPeriod"/>
+            </a:pPr>
+            <a:r>
+              <a:rPr lang="en-US" sz="2400" b="0" i="0" dirty="0"/>
+              <a:t>TextFormat: Subscript, Superscript</a:t>
+            </a:r>
+          </a:p>
+          <a:p>
+            <a:pPr lvl="0" marL="457200" indent="-457200">
+              <a:buAutoNum type="arabicPeriod"/>
+            </a:pPr>
+            <a:r>
+              <a:rPr lang="en-US" sz="2400" b="0" i="0" dirty="0"/>
+              <a:t>Font size presets in prelude</a:t>
+            </a:r>
+          </a:p>
+          <a:p>
+            <a:pPr lvl="0" marL="457200" indent="-457200">
+              <a:buAutoNum type="arabicPeriod"/>
+            </a:pPr>
+            <a:r>
+              <a:rPr lang="en-US" sz="2400" b="0" i="0" dirty="0"/>
+              <a:t>Image::from_base64 and from_bytes</a:t>
+            </a:r>
+          </a:p>
+          <a:p>
+            <a:pPr lvl="0" marL="457200" indent="-457200">
+              <a:buAutoNum type="arabicPeriod"/>
+            </a:pPr>
+            <a:r>
+              <a:rPr lang="en-US" sz="2400" b="0" i="0" dirty="0"/>
+              <a:t>Theme color palettes (7 themes)</a:t>
+            </a:r>
+          </a:p>
+          <a:p>
+            <a:pPr lvl="0" marL="457200" indent="-457200">
+              <a:buAutoNum type="arabicPeriod"/>
+            </a:pPr>
+            <a:r>
+              <a:rPr lang="en-US" sz="2400" b="0" i="0" dirty="0"/>
+              <a:t>Material &amp; Carbon Design colors</a:t>
             </a:r>
           </a:p>
         </p:txBody>
@@ -4972,21 +6920,27 @@
           <a:bodyPr wrap="square" rtlCol="0"/>
           <a:lstStyle/>
           <a:p>
-            <a:pPr lvl="0"/>
+            <a:pPr lvl="0" marL="457200" indent="-457200">
+              <a:buChar char="•"/>
+            </a:pPr>
             <a:r>
               <a:rPr lang="en-US" sz="3200" b="1" i="0" dirty="0"/>
               <a:t>Large content area for emphasis</a:t>
             </a:r>
           </a:p>
           <a:p>
-            <a:pPr lvl="0"/>
+            <a:pPr lvl="0" marL="457200" indent="-457200">
+              <a:buChar char="•"/>
+            </a:pPr>
             <a:r>
               <a:rPr lang="en-US" sz="3200" b="1" i="0" dirty="0"/>
               <a:t>Perfect for key messages</a:t>
             </a:r>
           </a:p>
           <a:p>
-            <a:pPr lvl="0"/>
+            <a:pPr lvl="0" marL="457200" indent="-457200">
+              <a:buChar char="•"/>
+            </a:pPr>
             <a:r>
               <a:rPr lang="en-US" sz="3200" b="1" i="0" dirty="0"/>
               <a:t>Smaller title, bigger content</a:t>
@@ -5076,21 +7030,27 @@
           <a:bodyPr wrap="square" rtlCol="0"/>
           <a:lstStyle/>
           <a:p>
-            <a:pPr lvl="0"/>
+            <a:pPr lvl="0" marL="457200" indent="-457200">
+              <a:buChar char="•"/>
+            </a:pPr>
             <a:r>
               <a:rPr lang="en-US" sz="2400" b="0" i="0" dirty="0"/>
               <a:t>Left Column Item 1</a:t>
             </a:r>
           </a:p>
           <a:p>
-            <a:pPr lvl="0"/>
+            <a:pPr lvl="0" marL="457200" indent="-457200">
+              <a:buChar char="•"/>
+            </a:pPr>
             <a:r>
               <a:rPr lang="en-US" sz="2400" b="0" i="0" dirty="0"/>
               <a:t>Left Column Item 2</a:t>
             </a:r>
           </a:p>
           <a:p>
-            <a:pPr lvl="0"/>
+            <a:pPr lvl="0" marL="457200" indent="-457200">
+              <a:buChar char="•"/>
+            </a:pPr>
             <a:r>
               <a:rPr lang="en-US" sz="2400" b="0" i="0" dirty="0"/>
               <a:t>Left Column Item 3</a:t>
@@ -5118,21 +7078,27 @@
           <a:bodyPr wrap="square" rtlCol="0"/>
           <a:lstStyle/>
           <a:p>
-            <a:pPr lvl="0"/>
+            <a:pPr lvl="0" marL="457200" indent="-457200">
+              <a:buChar char="•"/>
+            </a:pPr>
             <a:r>
               <a:rPr lang="en-US" sz="2400" b="0" i="0" dirty="0"/>
               <a:t>Right Column Item 1</a:t>
             </a:r>
           </a:p>
           <a:p>
-            <a:pPr lvl="0"/>
+            <a:pPr lvl="0" marL="457200" indent="-457200">
+              <a:buChar char="•"/>
+            </a:pPr>
             <a:r>
               <a:rPr lang="en-US" sz="2400" b="0" i="0" dirty="0"/>
               <a:t>Right Column Item 2</a:t>
             </a:r>
           </a:p>
           <a:p>
-            <a:pPr lvl="0"/>
+            <a:pPr lvl="0" marL="457200" indent="-457200">
+              <a:buChar char="•"/>
+            </a:pPr>
             <a:r>
               <a:rPr lang="en-US" sz="2400" b="0" i="0" dirty="0"/>
               <a:t>Right Column Item 3</a:t>
@@ -5533,21 +7499,27 @@
           <a:bodyPr wrap="square" rtlCol="0"/>
           <a:lstStyle/>
           <a:p>
-            <a:pPr lvl="0"/>
+            <a:pPr lvl="0" marL="457200" indent="-457200">
+              <a:buChar char="•"/>
+            </a:pPr>
             <a:r>
               <a:rPr lang="en-US" sz="2400" b="0" i="0" dirty="0"/>
               <a:t>Bar Chart: Compare categories</a:t>
             </a:r>
           </a:p>
           <a:p>
-            <a:pPr lvl="0"/>
+            <a:pPr lvl="0" marL="457200" indent="-457200">
+              <a:buChar char="•"/>
+            </a:pPr>
             <a:r>
               <a:rPr lang="en-US" sz="2400" b="0" i="0" dirty="0"/>
               <a:t>Line Chart: Show trends over time</a:t>
             </a:r>
           </a:p>
           <a:p>
-            <a:pPr lvl="0"/>
+            <a:pPr lvl="0" marL="457200" indent="-457200">
+              <a:buChar char="•"/>
+            </a:pPr>
             <a:r>
               <a:rPr lang="en-US" sz="2400" b="0" i="0" dirty="0"/>
               <a:t>Pie Chart: Show proportions</a:t>

</xml_diff>

<commit_message>
chore: remove insta dev-dependency and update test count to 800+
- Remove unused `insta` dev-dependency from Cargo.toml
- Update README.md test coverage references from 700+ to 800+ tests
- Mark advanced features as completed in TODO.md: RTL text, comments, slide sections, slide show settings, print settings, advanced table merging
- Note remaining work for digital signatures, ink annotations, and embedded fonts (XML generation done, needs full pipeline)
- Add comprehensive demo slides for slide
</commit_message>
<xml_diff>
--- a/comprehensive_demo.pptx
+++ b/comprehensive_demo.pptx
@@ -39,6 +39,9 @@
     <p:sldId id="288" r:id="rId34"/>
     <p:sldId id="289" r:id="rId35"/>
     <p:sldId id="290" r:id="rId36"/>
+    <p:sldId id="291" r:id="rId37"/>
+    <p:sldId id="292" r:id="rId38"/>
+    <p:sldId id="293" r:id="rId39"/>
   </p:sldIdLst>
   <p:sldSz cx="9144000" cy="6858000" type="screen4x3"/>
   <p:notesSz cx="6858000" cy="9144000"/>
@@ -6833,6 +6836,1821 @@
             <a:r>
               <a:rPr lang="en-US" sz="2400" b="0" i="0" dirty="0"/>
               <a:t>Material &amp; Carbon Design colors</a:t>
+            </a:r>
+          </a:p>
+        </p:txBody>
+      </p:sp>
+    </p:spTree>
+  </p:cSld>
+  <p:clrMapOvr>
+    <a:masterClrMapping/>
+  </p:clrMapOvr>
+</p:sld>
+</file>
+
+<file path=ppt/slides/slide35.xml><?xml version="1.0" encoding="utf-8"?>
+<p:sld xmlns:a="http://schemas.openxmlformats.org/drawingml/2006/main" xmlns:r="http://schemas.openxmlformats.org/officeDocument/2006/relationships" xmlns:p="http://schemas.openxmlformats.org/presentationml/2006/main">
+  <p:cSld>
+    <p:bg>
+      <p:bgRef idx="1001">
+        <a:schemeClr val="bg1"/>
+      </p:bgRef>
+    </p:bg>
+    <p:spTree>
+      <p:nvGrpSpPr>
+        <p:cNvPr id="1" name=""/>
+        <p:cNvGrpSpPr/>
+        <p:nvPr/>
+      </p:nvGrpSpPr>
+      <p:grpSpPr>
+        <a:xfrm>
+          <a:off x="0" y="0"/>
+          <a:ext cx="9144000" cy="6858000"/>
+          <a:chOff x="0" y="0"/>
+          <a:chExt cx="9144000" cy="6858000"/>
+        </a:xfrm>
+      </p:grpSpPr>
+      <p:sp>
+        <p:nvSpPr>
+          <p:cNvPr id="2" name="Title"/>
+          <p:cNvSpPr txBox="1"/>
+          <p:nvPr/>
+        </p:nvSpPr>
+        <p:spPr>
+          <a:xfrm>
+            <a:off x="457200" y="274638"/>
+            <a:ext cx="8230200" cy="1143000"/>
+          </a:xfrm>
+          <a:prstGeom prst="rect">
+            <a:avLst/>
+          </a:prstGeom>
+          <a:noFill/>
+        </p:spPr>
+        <p:txBody>
+          <a:bodyPr wrap="square" rtlCol="0" anchor="ctr"/>
+          <a:lstStyle/>
+          <a:p>
+            <a:pPr algn="l"/>
+            <a:r>
+              <a:rPr lang="en-US" sz="4400" b="1" i="0" dirty="0">
+                <a:solidFill>
+                  <a:srgbClr val="1F497D"/>
+                </a:solidFill>
+              </a:rPr>
+              <a:t>Slide Show Settings - Mode Comparison</a:t>
+            </a:r>
+          </a:p>
+        </p:txBody>
+      </p:sp>
+      <p:graphicFrame>
+        <p:nvGraphicFramePr>
+          <p:cNvPr id="3" name="Table 3"/>
+          <p:cNvGraphicFramePr/>
+          <p:nvPr/>
+        </p:nvGraphicFramePr>
+        <p:xfrm>
+          <a:off x="300000" y="1600000"/>
+          <a:ext cx="8000000" cy="2800000"/>
+        </p:xfrm>
+        <a:graphic>
+          <a:graphicData uri="http://schemas.openxmlformats.org/drawingml/2006/table">
+            <a:tbl>
+              <a:tblPr firstRow="1" bandHVals="1"/>
+              <a:tblGrid>
+                <a:gridCol w="2000000"/>
+                <a:gridCol w="2000000"/>
+                <a:gridCol w="2000000"/>
+                <a:gridCol w="2000000"/>
+              </a:tblGrid>
+              <a:tr h="400000">
+                <a:tc>
+                  <a:txBody>
+                    <a:bodyPr/>
+                    <a:lstStyle/>
+                    <a:p>
+                      <a:r>
+                        <a:rPr lang="en-US" dirty="0" b="1">
+                          <a:solidFill>
+                            <a:srgbClr val="FFFFFF"/>
+                          </a:solidFill>
+                        </a:rPr>
+                        <a:t>Setting</a:t>
+                      </a:r>
+                    </a:p>
+                  </a:txBody>
+                  <a:tcPr>
+                    <a:solidFill>
+                      <a:srgbClr val="1F4E79"/>
+                    </a:solidFill>
+                  </a:tcPr>
+                </a:tc>
+                <a:tc>
+                  <a:txBody>
+                    <a:bodyPr/>
+                    <a:lstStyle/>
+                    <a:p>
+                      <a:r>
+                        <a:rPr lang="en-US" dirty="0" b="1">
+                          <a:solidFill>
+                            <a:srgbClr val="FFFFFF"/>
+                          </a:solidFill>
+                        </a:rPr>
+                        <a:t>Speaker</a:t>
+                      </a:r>
+                    </a:p>
+                  </a:txBody>
+                  <a:tcPr>
+                    <a:solidFill>
+                      <a:srgbClr val="4472C4"/>
+                    </a:solidFill>
+                  </a:tcPr>
+                </a:tc>
+                <a:tc>
+                  <a:txBody>
+                    <a:bodyPr/>
+                    <a:lstStyle/>
+                    <a:p>
+                      <a:r>
+                        <a:rPr lang="en-US" dirty="0" b="1">
+                          <a:solidFill>
+                            <a:srgbClr val="FFFFFF"/>
+                          </a:solidFill>
+                        </a:rPr>
+                        <a:t>Kiosk</a:t>
+                      </a:r>
+                    </a:p>
+                  </a:txBody>
+                  <a:tcPr>
+                    <a:solidFill>
+                      <a:srgbClr val="ED7D31"/>
+                    </a:solidFill>
+                  </a:tcPr>
+                </a:tc>
+                <a:tc>
+                  <a:txBody>
+                    <a:bodyPr/>
+                    <a:lstStyle/>
+                    <a:p>
+                      <a:r>
+                        <a:rPr lang="en-US" dirty="0" b="1">
+                          <a:solidFill>
+                            <a:srgbClr val="FFFFFF"/>
+                          </a:solidFill>
+                        </a:rPr>
+                        <a:t>Browsed</a:t>
+                      </a:r>
+                    </a:p>
+                  </a:txBody>
+                  <a:tcPr>
+                    <a:solidFill>
+                      <a:srgbClr val="70AD47"/>
+                    </a:solidFill>
+                  </a:tcPr>
+                </a:tc>
+              </a:tr>
+              <a:tr h="400000">
+                <a:tc>
+                  <a:txBody>
+                    <a:bodyPr/>
+                    <a:lstStyle/>
+                    <a:p>
+                      <a:r>
+                        <a:rPr lang="en-US" dirty="0" b="1"/>
+                        <a:t>Loop</a:t>
+                      </a:r>
+                    </a:p>
+                  </a:txBody>
+                  <a:tcPr>
+                    <a:solidFill>
+                      <a:srgbClr val="D6E4F0"/>
+                    </a:solidFill>
+                  </a:tcPr>
+                </a:tc>
+                <a:tc>
+                  <a:txBody>
+                    <a:bodyPr/>
+                    <a:lstStyle/>
+                    <a:p>
+                      <a:r>
+                        <a:rPr lang="en-US" dirty="0"/>
+                        <a:t>No</a:t>
+                      </a:r>
+                    </a:p>
+                  </a:txBody>
+                  <a:tcPr/>
+                </a:tc>
+                <a:tc>
+                  <a:txBody>
+                    <a:bodyPr/>
+                    <a:lstStyle/>
+                    <a:p>
+                      <a:r>
+                        <a:rPr lang="en-US" dirty="0" b="1">
+                          <a:solidFill>
+                            <a:srgbClr val="2E7D32"/>
+                          </a:solidFill>
+                        </a:rPr>
+                        <a:t>Yes</a:t>
+                      </a:r>
+                    </a:p>
+                  </a:txBody>
+                  <a:tcPr/>
+                </a:tc>
+                <a:tc>
+                  <a:txBody>
+                    <a:bodyPr/>
+                    <a:lstStyle/>
+                    <a:p>
+                      <a:r>
+                        <a:rPr lang="en-US" dirty="0"/>
+                        <a:t>No</a:t>
+                      </a:r>
+                    </a:p>
+                  </a:txBody>
+                  <a:tcPr/>
+                </a:tc>
+              </a:tr>
+              <a:tr h="400000">
+                <a:tc>
+                  <a:txBody>
+                    <a:bodyPr/>
+                    <a:lstStyle/>
+                    <a:p>
+                      <a:r>
+                        <a:rPr lang="en-US" dirty="0" b="1"/>
+                        <a:t>Narration</a:t>
+                      </a:r>
+                    </a:p>
+                  </a:txBody>
+                  <a:tcPr>
+                    <a:solidFill>
+                      <a:srgbClr val="D6E4F0"/>
+                    </a:solidFill>
+                  </a:tcPr>
+                </a:tc>
+                <a:tc>
+                  <a:txBody>
+                    <a:bodyPr/>
+                    <a:lstStyle/>
+                    <a:p>
+                      <a:r>
+                        <a:rPr lang="en-US" dirty="0"/>
+                        <a:t>Yes</a:t>
+                      </a:r>
+                    </a:p>
+                  </a:txBody>
+                  <a:tcPr/>
+                </a:tc>
+                <a:tc>
+                  <a:txBody>
+                    <a:bodyPr/>
+                    <a:lstStyle/>
+                    <a:p>
+                      <a:r>
+                        <a:rPr lang="en-US" dirty="0">
+                          <a:solidFill>
+                            <a:srgbClr val="C62828"/>
+                          </a:solidFill>
+                        </a:rPr>
+                        <a:t>No</a:t>
+                      </a:r>
+                    </a:p>
+                  </a:txBody>
+                  <a:tcPr/>
+                </a:tc>
+                <a:tc>
+                  <a:txBody>
+                    <a:bodyPr/>
+                    <a:lstStyle/>
+                    <a:p>
+                      <a:r>
+                        <a:rPr lang="en-US" dirty="0"/>
+                        <a:t>Yes</a:t>
+                      </a:r>
+                    </a:p>
+                  </a:txBody>
+                  <a:tcPr/>
+                </a:tc>
+              </a:tr>
+              <a:tr h="400000">
+                <a:tc>
+                  <a:txBody>
+                    <a:bodyPr/>
+                    <a:lstStyle/>
+                    <a:p>
+                      <a:r>
+                        <a:rPr lang="en-US" dirty="0" b="1"/>
+                        <a:t>Animation</a:t>
+                      </a:r>
+                    </a:p>
+                  </a:txBody>
+                  <a:tcPr>
+                    <a:solidFill>
+                      <a:srgbClr val="D6E4F0"/>
+                    </a:solidFill>
+                  </a:tcPr>
+                </a:tc>
+                <a:tc>
+                  <a:txBody>
+                    <a:bodyPr/>
+                    <a:lstStyle/>
+                    <a:p>
+                      <a:r>
+                        <a:rPr lang="en-US" dirty="0"/>
+                        <a:t>Yes</a:t>
+                      </a:r>
+                    </a:p>
+                  </a:txBody>
+                  <a:tcPr/>
+                </a:tc>
+                <a:tc>
+                  <a:txBody>
+                    <a:bodyPr/>
+                    <a:lstStyle/>
+                    <a:p>
+                      <a:r>
+                        <a:rPr lang="en-US" dirty="0"/>
+                        <a:t>Yes</a:t>
+                      </a:r>
+                    </a:p>
+                  </a:txBody>
+                  <a:tcPr/>
+                </a:tc>
+                <a:tc>
+                  <a:txBody>
+                    <a:bodyPr/>
+                    <a:lstStyle/>
+                    <a:p>
+                      <a:r>
+                        <a:rPr lang="en-US" dirty="0">
+                          <a:solidFill>
+                            <a:srgbClr val="C62828"/>
+                          </a:solidFill>
+                        </a:rPr>
+                        <a:t>No</a:t>
+                      </a:r>
+                    </a:p>
+                  </a:txBody>
+                  <a:tcPr/>
+                </a:tc>
+              </a:tr>
+              <a:tr h="400000">
+                <a:tc>
+                  <a:txBody>
+                    <a:bodyPr/>
+                    <a:lstStyle/>
+                    <a:p>
+                      <a:r>
+                        <a:rPr lang="en-US" dirty="0" b="1"/>
+                        <a:t>Timings</a:t>
+                      </a:r>
+                    </a:p>
+                  </a:txBody>
+                  <a:tcPr>
+                    <a:solidFill>
+                      <a:srgbClr val="D6E4F0"/>
+                    </a:solidFill>
+                  </a:tcPr>
+                </a:tc>
+                <a:tc>
+                  <a:txBody>
+                    <a:bodyPr/>
+                    <a:lstStyle/>
+                    <a:p>
+                      <a:r>
+                        <a:rPr lang="en-US" dirty="0"/>
+                        <a:t>Yes</a:t>
+                      </a:r>
+                    </a:p>
+                  </a:txBody>
+                  <a:tcPr/>
+                </a:tc>
+                <a:tc>
+                  <a:txBody>
+                    <a:bodyPr/>
+                    <a:lstStyle/>
+                    <a:p>
+                      <a:r>
+                        <a:rPr lang="en-US" dirty="0"/>
+                        <a:t>Auto</a:t>
+                      </a:r>
+                    </a:p>
+                  </a:txBody>
+                  <a:tcPr/>
+                </a:tc>
+                <a:tc>
+                  <a:txBody>
+                    <a:bodyPr/>
+                    <a:lstStyle/>
+                    <a:p>
+                      <a:r>
+                        <a:rPr lang="en-US" dirty="0"/>
+                        <a:t>Yes</a:t>
+                      </a:r>
+                    </a:p>
+                  </a:txBody>
+                  <a:tcPr/>
+                </a:tc>
+              </a:tr>
+              <a:tr h="400000">
+                <a:tc>
+                  <a:txBody>
+                    <a:bodyPr/>
+                    <a:lstStyle/>
+                    <a:p>
+                      <a:r>
+                        <a:rPr lang="en-US" dirty="0" b="1"/>
+                        <a:t>Slide Range</a:t>
+                      </a:r>
+                    </a:p>
+                  </a:txBody>
+                  <a:tcPr>
+                    <a:solidFill>
+                      <a:srgbClr val="D6E4F0"/>
+                    </a:solidFill>
+                  </a:tcPr>
+                </a:tc>
+                <a:tc>
+                  <a:txBody>
+                    <a:bodyPr/>
+                    <a:lstStyle/>
+                    <a:p>
+                      <a:r>
+                        <a:rPr lang="en-US" dirty="0"/>
+                        <a:t>All</a:t>
+                      </a:r>
+                    </a:p>
+                  </a:txBody>
+                  <a:tcPr/>
+                </a:tc>
+                <a:tc>
+                  <a:txBody>
+                    <a:bodyPr/>
+                    <a:lstStyle/>
+                    <a:p>
+                      <a:r>
+                        <a:rPr lang="en-US" dirty="0"/>
+                        <a:t>All</a:t>
+                      </a:r>
+                    </a:p>
+                  </a:txBody>
+                  <a:tcPr/>
+                </a:tc>
+                <a:tc>
+                  <a:txBody>
+                    <a:bodyPr/>
+                    <a:lstStyle/>
+                    <a:p>
+                      <a:r>
+                        <a:rPr lang="en-US" dirty="0"/>
+                        <a:t>1-10</a:t>
+                      </a:r>
+                    </a:p>
+                  </a:txBody>
+                  <a:tcPr/>
+                </a:tc>
+              </a:tr>
+              <a:tr h="400000">
+                <a:tc>
+                  <a:txBody>
+                    <a:bodyPr/>
+                    <a:lstStyle/>
+                    <a:p>
+                      <a:r>
+                        <a:rPr lang="en-US" dirty="0" b="1"/>
+                        <a:t>Pen Color</a:t>
+                      </a:r>
+                    </a:p>
+                  </a:txBody>
+                  <a:tcPr>
+                    <a:solidFill>
+                      <a:srgbClr val="D6E4F0"/>
+                    </a:solidFill>
+                  </a:tcPr>
+                </a:tc>
+                <a:tc>
+                  <a:txBody>
+                    <a:bodyPr/>
+                    <a:lstStyle/>
+                    <a:p>
+                      <a:r>
+                        <a:rPr lang="en-US" dirty="0">
+                          <a:solidFill>
+                            <a:srgbClr val="FF0000"/>
+                          </a:solidFill>
+                        </a:rPr>
+                        <a:t>Red</a:t>
+                      </a:r>
+                    </a:p>
+                  </a:txBody>
+                  <a:tcPr/>
+                </a:tc>
+                <a:tc>
+                  <a:txBody>
+                    <a:bodyPr/>
+                    <a:lstStyle/>
+                    <a:p>
+                      <a:r>
+                        <a:rPr lang="en-US" dirty="0">
+                          <a:solidFill>
+                            <a:srgbClr val="FF0000"/>
+                          </a:solidFill>
+                        </a:rPr>
+                        <a:t>Red</a:t>
+                      </a:r>
+                    </a:p>
+                  </a:txBody>
+                  <a:tcPr/>
+                </a:tc>
+                <a:tc>
+                  <a:txBody>
+                    <a:bodyPr/>
+                    <a:lstStyle/>
+                    <a:p>
+                      <a:r>
+                        <a:rPr lang="en-US" dirty="0">
+                          <a:solidFill>
+                            <a:srgbClr val="FF0000"/>
+                          </a:solidFill>
+                        </a:rPr>
+                        <a:t>Red</a:t>
+                      </a:r>
+                    </a:p>
+                  </a:txBody>
+                  <a:tcPr/>
+                </a:tc>
+              </a:tr>
+            </a:tbl>
+          </a:graphicData>
+        </a:graphic>
+      </p:graphicFrame>
+      <p:sp>
+        <p:nvSpPr>
+          <p:cNvPr id="10" name="Shape 10"/>
+          <p:cNvSpPr/>
+          <p:nvPr/>
+        </p:nvSpPr>
+        <p:spPr>
+          <a:xfrm>
+            <a:off x="300000" y="4200000"/>
+            <a:ext cx="2500000" cy="600000"/>
+          </a:xfrm>
+          <a:prstGeom prst="roundRect">
+            <a:avLst/>
+          </a:prstGeom>
+          <a:solidFill>
+            <a:srgbClr val="4472C4"/>
+          </a:solidFill>
+        </p:spPr>
+        <p:txBody>
+          <a:bodyPr wrap="square" rtlCol="0" anchor="ctr">
+            <a:normAutofit/>
+          </a:bodyPr>
+          <a:lstStyle/>
+          <a:p>
+            <a:pPr algn="ctr"/>
+            <a:r>
+              <a:rPr lang="en-US" sz="1874" dirty="0">
+                <a:solidFill>
+                  <a:srgbClr val="FFFFFF"/>
+                </a:solidFill>
+              </a:rPr>
+              <a:t>Speaker: Full control</a:t>
+            </a:r>
+          </a:p>
+        </p:txBody>
+      </p:sp>
+      <p:sp>
+        <p:nvSpPr>
+          <p:cNvPr id="11" name="Shape 11"/>
+          <p:cNvSpPr/>
+          <p:nvPr/>
+        </p:nvSpPr>
+        <p:spPr>
+          <a:xfrm>
+            <a:off x="3100000" y="4200000"/>
+            <a:ext cx="2500000" cy="600000"/>
+          </a:xfrm>
+          <a:prstGeom prst="roundRect">
+            <a:avLst/>
+          </a:prstGeom>
+          <a:solidFill>
+            <a:srgbClr val="ED7D31"/>
+          </a:solidFill>
+        </p:spPr>
+        <p:txBody>
+          <a:bodyPr wrap="square" rtlCol="0" anchor="ctr">
+            <a:normAutofit/>
+          </a:bodyPr>
+          <a:lstStyle/>
+          <a:p>
+            <a:pPr algn="ctr"/>
+            <a:r>
+              <a:rPr lang="en-US" sz="2460" dirty="0">
+                <a:solidFill>
+                  <a:srgbClr val="000000"/>
+                </a:solidFill>
+              </a:rPr>
+              <a:t>Kiosk: Auto-loop</a:t>
+            </a:r>
+          </a:p>
+        </p:txBody>
+      </p:sp>
+      <p:sp>
+        <p:nvSpPr>
+          <p:cNvPr id="12" name="Shape 12"/>
+          <p:cNvSpPr/>
+          <p:nvPr/>
+        </p:nvSpPr>
+        <p:spPr>
+          <a:xfrm>
+            <a:off x="5900000" y="4200000"/>
+            <a:ext cx="2500000" cy="600000"/>
+          </a:xfrm>
+          <a:prstGeom prst="roundRect">
+            <a:avLst/>
+          </a:prstGeom>
+          <a:solidFill>
+            <a:srgbClr val="70AD47"/>
+          </a:solidFill>
+        </p:spPr>
+        <p:txBody>
+          <a:bodyPr wrap="square" rtlCol="0" anchor="ctr">
+            <a:normAutofit/>
+          </a:bodyPr>
+          <a:lstStyle/>
+          <a:p>
+            <a:pPr algn="ctr"/>
+            <a:r>
+              <a:rPr lang="en-US" sz="2187" dirty="0">
+                <a:solidFill>
+                  <a:srgbClr val="000000"/>
+                </a:solidFill>
+              </a:rPr>
+              <a:t>Browsed: Scrollbar</a:t>
+            </a:r>
+          </a:p>
+        </p:txBody>
+      </p:sp>
+    </p:spTree>
+  </p:cSld>
+  <p:clrMapOvr>
+    <a:masterClrMapping/>
+  </p:clrMapOvr>
+</p:sld>
+</file>
+
+<file path=ppt/slides/slide36.xml><?xml version="1.0" encoding="utf-8"?>
+<p:sld xmlns:a="http://schemas.openxmlformats.org/drawingml/2006/main" xmlns:r="http://schemas.openxmlformats.org/officeDocument/2006/relationships" xmlns:p="http://schemas.openxmlformats.org/presentationml/2006/main">
+  <p:cSld>
+    <p:bg>
+      <p:bgRef idx="1001">
+        <a:schemeClr val="bg1"/>
+      </p:bgRef>
+    </p:bg>
+    <p:spTree>
+      <p:nvGrpSpPr>
+        <p:cNvPr id="1" name=""/>
+        <p:cNvGrpSpPr/>
+        <p:nvPr/>
+      </p:nvGrpSpPr>
+      <p:grpSpPr>
+        <a:xfrm>
+          <a:off x="0" y="0"/>
+          <a:ext cx="9144000" cy="6858000"/>
+          <a:chOff x="0" y="0"/>
+          <a:chExt cx="9144000" cy="6858000"/>
+        </a:xfrm>
+      </p:grpSpPr>
+      <p:sp>
+        <p:nvSpPr>
+          <p:cNvPr id="2" name="Title"/>
+          <p:cNvSpPr txBox="1"/>
+          <p:nvPr/>
+        </p:nvSpPr>
+        <p:spPr>
+          <a:xfrm>
+            <a:off x="457200" y="274638"/>
+            <a:ext cx="8230200" cy="1143000"/>
+          </a:xfrm>
+          <a:prstGeom prst="rect">
+            <a:avLst/>
+          </a:prstGeom>
+          <a:noFill/>
+        </p:spPr>
+        <p:txBody>
+          <a:bodyPr wrap="square" rtlCol="0" anchor="ctr"/>
+          <a:lstStyle/>
+          <a:p>
+            <a:pPr algn="l"/>
+            <a:r>
+              <a:rPr lang="en-US" sz="4400" b="1" i="0" dirty="0">
+                <a:solidFill>
+                  <a:srgbClr val="1F497D"/>
+                </a:solidFill>
+              </a:rPr>
+              <a:t>Print Handout - 6 Slides Per Page</a:t>
+            </a:r>
+          </a:p>
+        </p:txBody>
+      </p:sp>
+      <p:graphicFrame>
+        <p:nvGraphicFramePr>
+          <p:cNvPr id="3" name="Table 3"/>
+          <p:cNvGraphicFramePr/>
+          <p:nvPr/>
+        </p:nvGraphicFramePr>
+        <p:xfrm>
+          <a:off x="5000000" y="1800000"/>
+          <a:ext cx="3800000" cy="2800000"/>
+        </p:xfrm>
+        <a:graphic>
+          <a:graphicData uri="http://schemas.openxmlformats.org/drawingml/2006/table">
+            <a:tbl>
+              <a:tblPr firstRow="1" bandHVals="1"/>
+              <a:tblGrid>
+                <a:gridCol w="1800000"/>
+                <a:gridCol w="2000000"/>
+              </a:tblGrid>
+              <a:tr h="400000">
+                <a:tc>
+                  <a:txBody>
+                    <a:bodyPr/>
+                    <a:lstStyle/>
+                    <a:p>
+                      <a:r>
+                        <a:rPr lang="en-US" dirty="0" b="1">
+                          <a:solidFill>
+                            <a:srgbClr val="FFFFFF"/>
+                          </a:solidFill>
+                        </a:rPr>
+                        <a:t>Print Settings</a:t>
+                      </a:r>
+                    </a:p>
+                  </a:txBody>
+                  <a:tcPr>
+                    <a:solidFill>
+                      <a:srgbClr val="1F4E79"/>
+                    </a:solidFill>
+                  </a:tcPr>
+                </a:tc>
+                <a:tc>
+                  <a:txBody>
+                    <a:bodyPr/>
+                    <a:lstStyle/>
+                    <a:p>
+                      <a:r>
+                        <a:rPr lang="en-US" dirty="0"/>
+                        <a:t/>
+                      </a:r>
+                    </a:p>
+                  </a:txBody>
+                  <a:tcPr>
+                    <a:solidFill>
+                      <a:srgbClr val="1F4E79"/>
+                    </a:solidFill>
+                  </a:tcPr>
+                </a:tc>
+              </a:tr>
+              <a:tr h="400000">
+                <a:tc>
+                  <a:txBody>
+                    <a:bodyPr/>
+                    <a:lstStyle/>
+                    <a:p>
+                      <a:r>
+                        <a:rPr lang="en-US" dirty="0" b="1"/>
+                        <a:t>Print What</a:t>
+                      </a:r>
+                    </a:p>
+                  </a:txBody>
+                  <a:tcPr>
+                    <a:solidFill>
+                      <a:srgbClr val="D6E4F0"/>
+                    </a:solidFill>
+                  </a:tcPr>
+                </a:tc>
+                <a:tc>
+                  <a:txBody>
+                    <a:bodyPr/>
+                    <a:lstStyle/>
+                    <a:p>
+                      <a:r>
+                        <a:rPr lang="en-US" dirty="0"/>
+                        <a:t>Handouts</a:t>
+                      </a:r>
+                    </a:p>
+                  </a:txBody>
+                  <a:tcPr/>
+                </a:tc>
+              </a:tr>
+              <a:tr h="400000">
+                <a:tc>
+                  <a:txBody>
+                    <a:bodyPr/>
+                    <a:lstStyle/>
+                    <a:p>
+                      <a:r>
+                        <a:rPr lang="en-US" dirty="0" b="1"/>
+                        <a:t>Color Mode</a:t>
+                      </a:r>
+                    </a:p>
+                  </a:txBody>
+                  <a:tcPr>
+                    <a:solidFill>
+                      <a:srgbClr val="D6E4F0"/>
+                    </a:solidFill>
+                  </a:tcPr>
+                </a:tc>
+                <a:tc>
+                  <a:txBody>
+                    <a:bodyPr/>
+                    <a:lstStyle/>
+                    <a:p>
+                      <a:r>
+                        <a:rPr lang="en-US" dirty="0"/>
+                        <a:t>Grayscale</a:t>
+                      </a:r>
+                    </a:p>
+                  </a:txBody>
+                  <a:tcPr/>
+                </a:tc>
+              </a:tr>
+              <a:tr h="400000">
+                <a:tc>
+                  <a:txBody>
+                    <a:bodyPr/>
+                    <a:lstStyle/>
+                    <a:p>
+                      <a:r>
+                        <a:rPr lang="en-US" dirty="0" b="1"/>
+                        <a:t>Layout</a:t>
+                      </a:r>
+                    </a:p>
+                  </a:txBody>
+                  <a:tcPr>
+                    <a:solidFill>
+                      <a:srgbClr val="D6E4F0"/>
+                    </a:solidFill>
+                  </a:tcPr>
+                </a:tc>
+                <a:tc>
+                  <a:txBody>
+                    <a:bodyPr/>
+                    <a:lstStyle/>
+                    <a:p>
+                      <a:r>
+                        <a:rPr lang="en-US" dirty="0"/>
+                        <a:t>6 slides/page</a:t>
+                      </a:r>
+                    </a:p>
+                  </a:txBody>
+                  <a:tcPr/>
+                </a:tc>
+              </a:tr>
+              <a:tr h="400000">
+                <a:tc>
+                  <a:txBody>
+                    <a:bodyPr/>
+                    <a:lstStyle/>
+                    <a:p>
+                      <a:r>
+                        <a:rPr lang="en-US" dirty="0" b="1"/>
+                        <a:t>Frame Slides</a:t>
+                      </a:r>
+                    </a:p>
+                  </a:txBody>
+                  <a:tcPr>
+                    <a:solidFill>
+                      <a:srgbClr val="D6E4F0"/>
+                    </a:solidFill>
+                  </a:tcPr>
+                </a:tc>
+                <a:tc>
+                  <a:txBody>
+                    <a:bodyPr/>
+                    <a:lstStyle/>
+                    <a:p>
+                      <a:r>
+                        <a:rPr lang="en-US" dirty="0"/>
+                        <a:t>Yes</a:t>
+                      </a:r>
+                    </a:p>
+                  </a:txBody>
+                  <a:tcPr/>
+                </a:tc>
+              </a:tr>
+              <a:tr h="400000">
+                <a:tc>
+                  <a:txBody>
+                    <a:bodyPr/>
+                    <a:lstStyle/>
+                    <a:p>
+                      <a:r>
+                        <a:rPr lang="en-US" dirty="0" b="1"/>
+                        <a:t>Date</a:t>
+                      </a:r>
+                    </a:p>
+                  </a:txBody>
+                  <a:tcPr>
+                    <a:solidFill>
+                      <a:srgbClr val="D6E4F0"/>
+                    </a:solidFill>
+                  </a:tcPr>
+                </a:tc>
+                <a:tc>
+                  <a:txBody>
+                    <a:bodyPr/>
+                    <a:lstStyle/>
+                    <a:p>
+                      <a:r>
+                        <a:rPr lang="en-US" dirty="0"/>
+                        <a:t>Yes</a:t>
+                      </a:r>
+                    </a:p>
+                  </a:txBody>
+                  <a:tcPr/>
+                </a:tc>
+              </a:tr>
+              <a:tr h="400000">
+                <a:tc>
+                  <a:txBody>
+                    <a:bodyPr/>
+                    <a:lstStyle/>
+                    <a:p>
+                      <a:r>
+                        <a:rPr lang="en-US" dirty="0" b="1"/>
+                        <a:t>Page Numbers</a:t>
+                      </a:r>
+                    </a:p>
+                  </a:txBody>
+                  <a:tcPr>
+                    <a:solidFill>
+                      <a:srgbClr val="D6E4F0"/>
+                    </a:solidFill>
+                  </a:tcPr>
+                </a:tc>
+                <a:tc>
+                  <a:txBody>
+                    <a:bodyPr/>
+                    <a:lstStyle/>
+                    <a:p>
+                      <a:r>
+                        <a:rPr lang="en-US" dirty="0"/>
+                        <a:t>Yes</a:t>
+                      </a:r>
+                    </a:p>
+                  </a:txBody>
+                  <a:tcPr/>
+                </a:tc>
+              </a:tr>
+            </a:tbl>
+          </a:graphicData>
+        </a:graphic>
+      </p:graphicFrame>
+      <p:sp>
+        <p:nvSpPr>
+          <p:cNvPr id="10" name="Shape 10"/>
+          <p:cNvSpPr/>
+          <p:nvPr/>
+        </p:nvSpPr>
+        <p:spPr>
+          <a:xfrm>
+            <a:off x="300000" y="1500000"/>
+            <a:ext cx="4200000" cy="300000"/>
+          </a:xfrm>
+          <a:prstGeom prst="rect">
+            <a:avLst/>
+          </a:prstGeom>
+          <a:solidFill>
+            <a:srgbClr val="E7E6E6"/>
+          </a:solidFill>
+        </p:spPr>
+        <p:txBody>
+          <a:bodyPr wrap="square" rtlCol="0" anchor="ctr">
+            <a:normAutofit/>
+          </a:bodyPr>
+          <a:lstStyle/>
+          <a:p>
+            <a:pPr algn="ctr"/>
+            <a:r>
+              <a:rPr lang="en-US" sz="1889" dirty="0">
+                <a:solidFill>
+                  <a:srgbClr val="000000"/>
+                </a:solidFill>
+              </a:rPr>
+              <a:t>Q1 2025 Strategy Review</a:t>
+            </a:r>
+          </a:p>
+        </p:txBody>
+      </p:sp>
+      <p:sp>
+        <p:nvSpPr>
+          <p:cNvPr id="11" name="Shape 11"/>
+          <p:cNvSpPr/>
+          <p:nvPr/>
+        </p:nvSpPr>
+        <p:spPr>
+          <a:xfrm>
+            <a:off x="400000" y="2000000"/>
+            <a:ext cx="1800000" cy="1100000"/>
+          </a:xfrm>
+          <a:prstGeom prst="rect">
+            <a:avLst/>
+          </a:prstGeom>
+          <a:ln w="12700">
+            <a:solidFill>
+              <a:srgbClr val="999999"/>
+            </a:solidFill>
+          </a:ln>
+        </p:spPr>
+        <p:txBody>
+          <a:bodyPr wrap="square" rtlCol="0" anchor="ctr">
+            <a:normAutofit/>
+          </a:bodyPr>
+          <a:lstStyle/>
+          <a:p>
+            <a:pPr algn="ctr"/>
+            <a:r>
+              <a:rPr lang="en-US" sz="4049" dirty="0">
+                <a:solidFill>
+                  <a:srgbClr val="000000"/>
+                </a:solidFill>
+              </a:rPr>
+              <a:t>Slide 1</a:t>
+            </a:r>
+          </a:p>
+        </p:txBody>
+      </p:sp>
+      <p:sp>
+        <p:nvSpPr>
+          <p:cNvPr id="12" name="Shape 12"/>
+          <p:cNvSpPr/>
+          <p:nvPr/>
+        </p:nvSpPr>
+        <p:spPr>
+          <a:xfrm>
+            <a:off x="2500000" y="2000000"/>
+            <a:ext cx="1800000" cy="1100000"/>
+          </a:xfrm>
+          <a:prstGeom prst="rect">
+            <a:avLst/>
+          </a:prstGeom>
+          <a:ln w="12700">
+            <a:solidFill>
+              <a:srgbClr val="999999"/>
+            </a:solidFill>
+          </a:ln>
+        </p:spPr>
+        <p:txBody>
+          <a:bodyPr wrap="square" rtlCol="0" anchor="ctr">
+            <a:normAutofit/>
+          </a:bodyPr>
+          <a:lstStyle/>
+          <a:p>
+            <a:pPr algn="ctr"/>
+            <a:r>
+              <a:rPr lang="en-US" sz="4049" dirty="0">
+                <a:solidFill>
+                  <a:srgbClr val="000000"/>
+                </a:solidFill>
+              </a:rPr>
+              <a:t>Slide 2</a:t>
+            </a:r>
+          </a:p>
+        </p:txBody>
+      </p:sp>
+      <p:sp>
+        <p:nvSpPr>
+          <p:cNvPr id="13" name="Shape 13"/>
+          <p:cNvSpPr/>
+          <p:nvPr/>
+        </p:nvSpPr>
+        <p:spPr>
+          <a:xfrm>
+            <a:off x="400000" y="3200000"/>
+            <a:ext cx="1800000" cy="1100000"/>
+          </a:xfrm>
+          <a:prstGeom prst="rect">
+            <a:avLst/>
+          </a:prstGeom>
+          <a:ln w="12700">
+            <a:solidFill>
+              <a:srgbClr val="999999"/>
+            </a:solidFill>
+          </a:ln>
+        </p:spPr>
+        <p:txBody>
+          <a:bodyPr wrap="square" rtlCol="0" anchor="ctr">
+            <a:normAutofit/>
+          </a:bodyPr>
+          <a:lstStyle/>
+          <a:p>
+            <a:pPr algn="ctr"/>
+            <a:r>
+              <a:rPr lang="en-US" sz="4049" dirty="0">
+                <a:solidFill>
+                  <a:srgbClr val="000000"/>
+                </a:solidFill>
+              </a:rPr>
+              <a:t>Slide 3</a:t>
+            </a:r>
+          </a:p>
+        </p:txBody>
+      </p:sp>
+      <p:sp>
+        <p:nvSpPr>
+          <p:cNvPr id="14" name="Shape 14"/>
+          <p:cNvSpPr/>
+          <p:nvPr/>
+        </p:nvSpPr>
+        <p:spPr>
+          <a:xfrm>
+            <a:off x="2500000" y="3200000"/>
+            <a:ext cx="1800000" cy="1100000"/>
+          </a:xfrm>
+          <a:prstGeom prst="rect">
+            <a:avLst/>
+          </a:prstGeom>
+          <a:ln w="12700">
+            <a:solidFill>
+              <a:srgbClr val="999999"/>
+            </a:solidFill>
+          </a:ln>
+        </p:spPr>
+        <p:txBody>
+          <a:bodyPr wrap="square" rtlCol="0" anchor="ctr">
+            <a:normAutofit/>
+          </a:bodyPr>
+          <a:lstStyle/>
+          <a:p>
+            <a:pPr algn="ctr"/>
+            <a:r>
+              <a:rPr lang="en-US" sz="4049" dirty="0">
+                <a:solidFill>
+                  <a:srgbClr val="000000"/>
+                </a:solidFill>
+              </a:rPr>
+              <a:t>Slide 4</a:t>
+            </a:r>
+          </a:p>
+        </p:txBody>
+      </p:sp>
+      <p:sp>
+        <p:nvSpPr>
+          <p:cNvPr id="15" name="Shape 15"/>
+          <p:cNvSpPr/>
+          <p:nvPr/>
+        </p:nvSpPr>
+        <p:spPr>
+          <a:xfrm>
+            <a:off x="400000" y="4400000"/>
+            <a:ext cx="1800000" cy="1100000"/>
+          </a:xfrm>
+          <a:prstGeom prst="rect">
+            <a:avLst/>
+          </a:prstGeom>
+          <a:ln w="12700">
+            <a:solidFill>
+              <a:srgbClr val="999999"/>
+            </a:solidFill>
+          </a:ln>
+        </p:spPr>
+        <p:txBody>
+          <a:bodyPr wrap="square" rtlCol="0" anchor="ctr">
+            <a:normAutofit/>
+          </a:bodyPr>
+          <a:lstStyle/>
+          <a:p>
+            <a:pPr algn="ctr"/>
+            <a:r>
+              <a:rPr lang="en-US" sz="4049" dirty="0">
+                <a:solidFill>
+                  <a:srgbClr val="000000"/>
+                </a:solidFill>
+              </a:rPr>
+              <a:t>Slide 5</a:t>
+            </a:r>
+          </a:p>
+        </p:txBody>
+      </p:sp>
+      <p:sp>
+        <p:nvSpPr>
+          <p:cNvPr id="16" name="Shape 16"/>
+          <p:cNvSpPr/>
+          <p:nvPr/>
+        </p:nvSpPr>
+        <p:spPr>
+          <a:xfrm>
+            <a:off x="2500000" y="4400000"/>
+            <a:ext cx="1800000" cy="1100000"/>
+          </a:xfrm>
+          <a:prstGeom prst="rect">
+            <a:avLst/>
+          </a:prstGeom>
+          <a:ln w="12700">
+            <a:solidFill>
+              <a:srgbClr val="999999"/>
+            </a:solidFill>
+          </a:ln>
+        </p:spPr>
+        <p:txBody>
+          <a:bodyPr wrap="square" rtlCol="0" anchor="ctr">
+            <a:normAutofit/>
+          </a:bodyPr>
+          <a:lstStyle/>
+          <a:p>
+            <a:pPr algn="ctr"/>
+            <a:r>
+              <a:rPr lang="en-US" sz="4049" dirty="0">
+                <a:solidFill>
+                  <a:srgbClr val="000000"/>
+                </a:solidFill>
+              </a:rPr>
+              <a:t>Slide 6</a:t>
+            </a:r>
+          </a:p>
+        </p:txBody>
+      </p:sp>
+      <p:sp>
+        <p:nvSpPr>
+          <p:cNvPr id="17" name="Shape 17"/>
+          <p:cNvSpPr/>
+          <p:nvPr/>
+        </p:nvSpPr>
+        <p:spPr>
+          <a:xfrm>
+            <a:off x="300000" y="5600000"/>
+            <a:ext cx="4200000" cy="300000"/>
+          </a:xfrm>
+          <a:prstGeom prst="rect">
+            <a:avLst/>
+          </a:prstGeom>
+          <a:solidFill>
+            <a:srgbClr val="E7E6E6"/>
+          </a:solidFill>
+        </p:spPr>
+        <p:txBody>
+          <a:bodyPr wrap="square" rtlCol="0" anchor="ctr">
+            <a:normAutofit/>
+          </a:bodyPr>
+          <a:lstStyle/>
+          <a:p>
+            <a:pPr algn="ctr"/>
+            <a:r>
+              <a:rPr lang="en-US" sz="1889" dirty="0">
+                <a:solidFill>
+                  <a:srgbClr val="000000"/>
+                </a:solidFill>
+              </a:rPr>
+              <a:t>Confidential - Internal Use Only</a:t>
+            </a:r>
+          </a:p>
+        </p:txBody>
+      </p:sp>
+    </p:spTree>
+  </p:cSld>
+  <p:clrMapOvr>
+    <a:masterClrMapping/>
+  </p:clrMapOvr>
+</p:sld>
+</file>
+
+<file path=ppt/slides/slide37.xml><?xml version="1.0" encoding="utf-8"?>
+<p:sld xmlns:a="http://schemas.openxmlformats.org/drawingml/2006/main" xmlns:r="http://schemas.openxmlformats.org/officeDocument/2006/relationships" xmlns:p="http://schemas.openxmlformats.org/presentationml/2006/main">
+  <p:cSld>
+    <p:bg>
+      <p:bgRef idx="1001">
+        <a:schemeClr val="bg1"/>
+      </p:bgRef>
+    </p:bg>
+    <p:spTree>
+      <p:nvGrpSpPr>
+        <p:cNvPr id="1" name=""/>
+        <p:cNvGrpSpPr/>
+        <p:nvPr/>
+      </p:nvGrpSpPr>
+      <p:grpSpPr>
+        <a:xfrm>
+          <a:off x="0" y="0"/>
+          <a:ext cx="9144000" cy="6858000"/>
+          <a:chOff x="0" y="0"/>
+          <a:chExt cx="9144000" cy="6858000"/>
+        </a:xfrm>
+      </p:grpSpPr>
+      <p:sp>
+        <p:nvSpPr>
+          <p:cNvPr id="2" name="Title"/>
+          <p:cNvSpPr txBox="1"/>
+          <p:nvPr/>
+        </p:nvSpPr>
+        <p:spPr>
+          <a:xfrm>
+            <a:off x="457200" y="274638"/>
+            <a:ext cx="8230200" cy="1143000"/>
+          </a:xfrm>
+          <a:prstGeom prst="rect">
+            <a:avLst/>
+          </a:prstGeom>
+          <a:noFill/>
+        </p:spPr>
+        <p:txBody>
+          <a:bodyPr wrap="square" rtlCol="0" anchor="ctr"/>
+          <a:lstStyle/>
+          <a:p>
+            <a:pPr algn="l"/>
+            <a:r>
+              <a:rPr lang="en-US" sz="4400" b="1" i="0" dirty="0">
+                <a:solidFill>
+                  <a:srgbClr val="1F497D"/>
+                </a:solidFill>
+              </a:rPr>
+              <a:t>Advanced Table Merging - Merged Cells</a:t>
+            </a:r>
+          </a:p>
+        </p:txBody>
+      </p:sp>
+      <p:graphicFrame>
+        <p:nvGraphicFramePr>
+          <p:cNvPr id="3" name="Table 3"/>
+          <p:cNvGraphicFramePr/>
+          <p:nvPr/>
+        </p:nvGraphicFramePr>
+        <p:xfrm>
+          <a:off x="300000" y="1600000"/>
+          <a:ext cx="7500000" cy="2000000"/>
+        </p:xfrm>
+        <a:graphic>
+          <a:graphicData uri="http://schemas.openxmlformats.org/drawingml/2006/table">
+            <a:tbl>
+              <a:tblPr firstRow="1" bandHVals="1"/>
+              <a:tblGrid>
+                <a:gridCol w="1500000"/>
+                <a:gridCol w="2000000"/>
+                <a:gridCol w="2000000"/>
+                <a:gridCol w="2000000"/>
+              </a:tblGrid>
+              <a:tr h="400000">
+                <a:tc gridSpan="4">
+                  <a:txBody>
+                    <a:bodyPr/>
+                    <a:lstStyle/>
+                    <a:p>
+                      <a:r>
+                        <a:rPr lang="en-US" dirty="0" b="1">
+                          <a:solidFill>
+                            <a:srgbClr val="FFFFFF"/>
+                          </a:solidFill>
+                        </a:rPr>
+                        <a:t>Q1 2025 Revenue Report</a:t>
+                      </a:r>
+                    </a:p>
+                  </a:txBody>
+                  <a:tcPr>
+                    <a:solidFill>
+                      <a:srgbClr val="1F4E79"/>
+                    </a:solidFill>
+                  </a:tcPr>
+                </a:tc>
+                <a:tc hMerge="1">
+                  <a:txBody>
+                    <a:bodyPr/>
+                    <a:lstStyle/>
+                    <a:p/>
+                  </a:txBody>
+                  <a:tcPr/>
+                </a:tc>
+                <a:tc hMerge="1">
+                  <a:txBody>
+                    <a:bodyPr/>
+                    <a:lstStyle/>
+                    <a:p/>
+                  </a:txBody>
+                  <a:tcPr/>
+                </a:tc>
+                <a:tc hMerge="1">
+                  <a:txBody>
+                    <a:bodyPr/>
+                    <a:lstStyle/>
+                    <a:p/>
+                  </a:txBody>
+                  <a:tcPr/>
+                </a:tc>
+              </a:tr>
+              <a:tr h="400000">
+                <a:tc rowSpan="2">
+                  <a:txBody>
+                    <a:bodyPr/>
+                    <a:lstStyle/>
+                    <a:p>
+                      <a:r>
+                        <a:rPr lang="en-US" dirty="0" b="1">
+                          <a:solidFill>
+                            <a:srgbClr val="1F497D"/>
+                          </a:solidFill>
+                        </a:rPr>
+                        <a:t>Products</a:t>
+                      </a:r>
+                    </a:p>
+                  </a:txBody>
+                  <a:tcPr>
+                    <a:solidFill>
+                      <a:srgbClr val="BDD7EE"/>
+                    </a:solidFill>
+                  </a:tcPr>
+                </a:tc>
+                <a:tc>
+                  <a:txBody>
+                    <a:bodyPr/>
+                    <a:lstStyle/>
+                    <a:p>
+                      <a:r>
+                        <a:rPr lang="en-US" dirty="0"/>
+                        <a:t>Hardware</a:t>
+                      </a:r>
+                    </a:p>
+                  </a:txBody>
+                  <a:tcPr>
+                    <a:solidFill>
+                      <a:srgbClr val="E2EFDA"/>
+                    </a:solidFill>
+                  </a:tcPr>
+                </a:tc>
+                <a:tc>
+                  <a:txBody>
+                    <a:bodyPr/>
+                    <a:lstStyle/>
+                    <a:p>
+                      <a:r>
+                        <a:rPr lang="en-US" dirty="0">
+                          <a:solidFill>
+                            <a:srgbClr val="2E7D32"/>
+                          </a:solidFill>
+                        </a:rPr>
+                        <a:t>$450,000</a:t>
+                      </a:r>
+                    </a:p>
+                  </a:txBody>
+                  <a:tcPr/>
+                </a:tc>
+                <a:tc>
+                  <a:txBody>
+                    <a:bodyPr/>
+                    <a:lstStyle/>
+                    <a:p>
+                      <a:r>
+                        <a:rPr lang="en-US" dirty="0" b="1">
+                          <a:solidFill>
+                            <a:srgbClr val="2E7D32"/>
+                          </a:solidFill>
+                        </a:rPr>
+                        <a:t>+12%</a:t>
+                      </a:r>
+                    </a:p>
+                  </a:txBody>
+                  <a:tcPr/>
+                </a:tc>
+              </a:tr>
+              <a:tr h="400000">
+                <a:tc vMerge="1">
+                  <a:txBody>
+                    <a:bodyPr/>
+                    <a:lstStyle/>
+                    <a:p/>
+                  </a:txBody>
+                  <a:tcPr/>
+                </a:tc>
+                <a:tc>
+                  <a:txBody>
+                    <a:bodyPr/>
+                    <a:lstStyle/>
+                    <a:p>
+                      <a:r>
+                        <a:rPr lang="en-US" dirty="0"/>
+                        <a:t>Software</a:t>
+                      </a:r>
+                    </a:p>
+                  </a:txBody>
+                  <a:tcPr>
+                    <a:solidFill>
+                      <a:srgbClr val="E2EFDA"/>
+                    </a:solidFill>
+                  </a:tcPr>
+                </a:tc>
+                <a:tc>
+                  <a:txBody>
+                    <a:bodyPr/>
+                    <a:lstStyle/>
+                    <a:p>
+                      <a:r>
+                        <a:rPr lang="en-US" dirty="0">
+                          <a:solidFill>
+                            <a:srgbClr val="2E7D32"/>
+                          </a:solidFill>
+                        </a:rPr>
+                        <a:t>$680,000</a:t>
+                      </a:r>
+                    </a:p>
+                  </a:txBody>
+                  <a:tcPr/>
+                </a:tc>
+                <a:tc>
+                  <a:txBody>
+                    <a:bodyPr/>
+                    <a:lstStyle/>
+                    <a:p>
+                      <a:r>
+                        <a:rPr lang="en-US" dirty="0" b="1">
+                          <a:solidFill>
+                            <a:srgbClr val="2E7D32"/>
+                          </a:solidFill>
+                        </a:rPr>
+                        <a:t>+25%</a:t>
+                      </a:r>
+                    </a:p>
+                  </a:txBody>
+                  <a:tcPr/>
+                </a:tc>
+              </a:tr>
+              <a:tr h="400000">
+                <a:tc rowSpan="2">
+                  <a:txBody>
+                    <a:bodyPr/>
+                    <a:lstStyle/>
+                    <a:p>
+                      <a:r>
+                        <a:rPr lang="en-US" dirty="0" b="1">
+                          <a:solidFill>
+                            <a:srgbClr val="C65911"/>
+                          </a:solidFill>
+                        </a:rPr>
+                        <a:t>Services</a:t>
+                      </a:r>
+                    </a:p>
+                  </a:txBody>
+                  <a:tcPr>
+                    <a:solidFill>
+                      <a:srgbClr val="FCE4D6"/>
+                    </a:solidFill>
+                  </a:tcPr>
+                </a:tc>
+                <a:tc>
+                  <a:txBody>
+                    <a:bodyPr/>
+                    <a:lstStyle/>
+                    <a:p>
+                      <a:r>
+                        <a:rPr lang="en-US" dirty="0"/>
+                        <a:t>Consulting</a:t>
+                      </a:r>
+                    </a:p>
+                  </a:txBody>
+                  <a:tcPr>
+                    <a:solidFill>
+                      <a:srgbClr val="FFF2CC"/>
+                    </a:solidFill>
+                  </a:tcPr>
+                </a:tc>
+                <a:tc>
+                  <a:txBody>
+                    <a:bodyPr/>
+                    <a:lstStyle/>
+                    <a:p>
+                      <a:r>
+                        <a:rPr lang="en-US" dirty="0">
+                          <a:solidFill>
+                            <a:srgbClr val="2E7D32"/>
+                          </a:solidFill>
+                        </a:rPr>
+                        <a:t>$320,000</a:t>
+                      </a:r>
+                    </a:p>
+                  </a:txBody>
+                  <a:tcPr/>
+                </a:tc>
+                <a:tc>
+                  <a:txBody>
+                    <a:bodyPr/>
+                    <a:lstStyle/>
+                    <a:p>
+                      <a:r>
+                        <a:rPr lang="en-US" dirty="0" b="1">
+                          <a:solidFill>
+                            <a:srgbClr val="2E7D32"/>
+                          </a:solidFill>
+                        </a:rPr>
+                        <a:t>+8%</a:t>
+                      </a:r>
+                    </a:p>
+                  </a:txBody>
+                  <a:tcPr/>
+                </a:tc>
+              </a:tr>
+              <a:tr h="400000">
+                <a:tc vMerge="1">
+                  <a:txBody>
+                    <a:bodyPr/>
+                    <a:lstStyle/>
+                    <a:p/>
+                  </a:txBody>
+                  <a:tcPr/>
+                </a:tc>
+                <a:tc>
+                  <a:txBody>
+                    <a:bodyPr/>
+                    <a:lstStyle/>
+                    <a:p>
+                      <a:r>
+                        <a:rPr lang="en-US" dirty="0"/>
+                        <a:t>Support</a:t>
+                      </a:r>
+                    </a:p>
+                  </a:txBody>
+                  <a:tcPr>
+                    <a:solidFill>
+                      <a:srgbClr val="FFF2CC"/>
+                    </a:solidFill>
+                  </a:tcPr>
+                </a:tc>
+                <a:tc>
+                  <a:txBody>
+                    <a:bodyPr/>
+                    <a:lstStyle/>
+                    <a:p>
+                      <a:r>
+                        <a:rPr lang="en-US" dirty="0">
+                          <a:solidFill>
+                            <a:srgbClr val="2E7D32"/>
+                          </a:solidFill>
+                        </a:rPr>
+                        <a:t>$190,000</a:t>
+                      </a:r>
+                    </a:p>
+                  </a:txBody>
+                  <a:tcPr/>
+                </a:tc>
+                <a:tc>
+                  <a:txBody>
+                    <a:bodyPr/>
+                    <a:lstStyle/>
+                    <a:p>
+                      <a:r>
+                        <a:rPr lang="en-US" dirty="0" b="1">
+                          <a:solidFill>
+                            <a:srgbClr val="2E7D32"/>
+                          </a:solidFill>
+                        </a:rPr>
+                        <a:t>+5%</a:t>
+                      </a:r>
+                    </a:p>
+                  </a:txBody>
+                  <a:tcPr/>
+                </a:tc>
+              </a:tr>
+            </a:tbl>
+          </a:graphicData>
+        </a:graphic>
+      </p:graphicFrame>
+      <p:sp>
+        <p:nvSpPr>
+          <p:cNvPr id="10" name="Shape 10"/>
+          <p:cNvSpPr/>
+          <p:nvPr/>
+        </p:nvSpPr>
+        <p:spPr>
+          <a:xfrm>
+            <a:off x="300000" y="4400000"/>
+            <a:ext cx="2000000" cy="400000"/>
+          </a:xfrm>
+          <a:prstGeom prst="roundRect">
+            <a:avLst/>
+          </a:prstGeom>
+          <a:solidFill>
+            <a:srgbClr val="4472C4"/>
+          </a:solidFill>
+        </p:spPr>
+        <p:txBody>
+          <a:bodyPr wrap="square" rtlCol="0" anchor="ctr">
+            <a:normAutofit/>
+          </a:bodyPr>
+          <a:lstStyle/>
+          <a:p>
+            <a:pPr algn="ctr"/>
+            <a:r>
+              <a:rPr lang="en-US" sz="1259" dirty="0">
+                <a:solidFill>
+                  <a:srgbClr val="FFFFFF"/>
+                </a:solidFill>
+              </a:rPr>
+              <a:t>Anchor (gridSpan/rowSpan)</a:t>
+            </a:r>
+          </a:p>
+        </p:txBody>
+      </p:sp>
+      <p:sp>
+        <p:nvSpPr>
+          <p:cNvPr id="11" name="Shape 11"/>
+          <p:cNvSpPr/>
+          <p:nvPr/>
+        </p:nvSpPr>
+        <p:spPr>
+          <a:xfrm>
+            <a:off x="2500000" y="4400000"/>
+            <a:ext cx="2000000" cy="400000"/>
+          </a:xfrm>
+          <a:prstGeom prst="roundRect">
+            <a:avLst/>
+          </a:prstGeom>
+          <a:solidFill>
+            <a:srgbClr val="ED7D31"/>
+          </a:solidFill>
+        </p:spPr>
+        <p:txBody>
+          <a:bodyPr wrap="square" rtlCol="0" anchor="ctr">
+            <a:normAutofit/>
+          </a:bodyPr>
+          <a:lstStyle/>
+          <a:p>
+            <a:pPr algn="ctr"/>
+            <a:r>
+              <a:rPr lang="en-US" sz="1574" dirty="0">
+                <a:solidFill>
+                  <a:srgbClr val="000000"/>
+                </a:solidFill>
+              </a:rPr>
+              <a:t>hMerge (col covered)</a:t>
+            </a:r>
+          </a:p>
+        </p:txBody>
+      </p:sp>
+      <p:sp>
+        <p:nvSpPr>
+          <p:cNvPr id="12" name="Shape 12"/>
+          <p:cNvSpPr/>
+          <p:nvPr/>
+        </p:nvSpPr>
+        <p:spPr>
+          <a:xfrm>
+            <a:off x="4700000" y="4400000"/>
+            <a:ext cx="2000000" cy="400000"/>
+          </a:xfrm>
+          <a:prstGeom prst="roundRect">
+            <a:avLst/>
+          </a:prstGeom>
+          <a:solidFill>
+            <a:srgbClr val="70AD47"/>
+          </a:solidFill>
+        </p:spPr>
+        <p:txBody>
+          <a:bodyPr wrap="square" rtlCol="0" anchor="ctr">
+            <a:normAutofit/>
+          </a:bodyPr>
+          <a:lstStyle/>
+          <a:p>
+            <a:pPr algn="ctr"/>
+            <a:r>
+              <a:rPr lang="en-US" sz="1574" dirty="0">
+                <a:solidFill>
+                  <a:srgbClr val="000000"/>
+                </a:solidFill>
+              </a:rPr>
+              <a:t>vMerge (row covered)</a:t>
+            </a:r>
+          </a:p>
+        </p:txBody>
+      </p:sp>
+      <p:sp>
+        <p:nvSpPr>
+          <p:cNvPr id="13" name="Shape 13"/>
+          <p:cNvSpPr/>
+          <p:nvPr/>
+        </p:nvSpPr>
+        <p:spPr>
+          <a:xfrm>
+            <a:off x="6900000" y="4400000"/>
+            <a:ext cx="2000000" cy="400000"/>
+          </a:xfrm>
+          <a:prstGeom prst="roundRect">
+            <a:avLst/>
+          </a:prstGeom>
+          <a:solidFill>
+            <a:srgbClr val="A5A5A5"/>
+          </a:solidFill>
+        </p:spPr>
+        <p:txBody>
+          <a:bodyPr wrap="square" rtlCol="0" anchor="ctr">
+            <a:normAutofit/>
+          </a:bodyPr>
+          <a:lstStyle/>
+          <a:p>
+            <a:pPr algn="ctr"/>
+            <a:r>
+              <a:rPr lang="en-US" sz="1852" dirty="0">
+                <a:solidFill>
+                  <a:srgbClr val="000000"/>
+                </a:solidFill>
+              </a:rPr>
+              <a:t>Normal (no merge)</a:t>
             </a:r>
           </a:p>
         </p:txBody>

</xml_diff>

<commit_message>
chore: clean up project structure and bump version to 0.2.5
- Remove .DS_Store and add to .gitignore
- Enhance .gitignore with IDE, OS, and output file patterns
- Remove obsolete LEARNING_ANALYSIS.md documentation
- Update ARCHITECTURE.md to remove deleted xml.rs reference
- Consolidate TODO.md from 717 to 96 lines, focusing on active tasks
- Update README.md alignment testing reference path
- Bump version from 0.2.4 to 0.2.5 in Cargo.toml
</commit_message>
<xml_diff>
--- a/comprehensive_demo.pptx
+++ b/comprehensive_demo.pptx
@@ -1503,7 +1503,7 @@
         <a:graphic>
           <a:graphicData uri="http://schemas.openxmlformats.org/drawingml/2006/table">
             <a:tbl>
-              <a:tblPr firstRow="1" bandHVals="1"/>
+              <a:tblPr firstRow="1" bandRow="1"/>
               <a:tblGrid>
                 <a:gridCol w="2000000"/>
                 <a:gridCol w="2000000"/>
@@ -1975,7 +1975,7 @@
         <a:graphic>
           <a:graphicData uri="http://schemas.openxmlformats.org/drawingml/2006/table">
             <a:tbl>
-              <a:tblPr firstRow="1" bandHVals="1"/>
+              <a:tblPr firstRow="1" bandRow="1"/>
               <a:tblGrid>
                 <a:gridCol w="2000000"/>
                 <a:gridCol w="1500000"/>
@@ -4009,7 +4009,7 @@
         <a:graphic>
           <a:graphicData uri="http://schemas.openxmlformats.org/drawingml/2006/table">
             <a:tbl>
-              <a:tblPr firstRow="1" bandHVals="1"/>
+              <a:tblPr firstRow="1" bandRow="1"/>
               <a:tblGrid>
                 <a:gridCol w="1500000"/>
                 <a:gridCol w="1500000"/>
@@ -4397,8 +4397,8 @@
         </p:nvSpPr>
         <p:spPr>
           <a:xfrm>
-            <a:off x="300000" y="1600000"/>
-            <a:ext cx="2000000" cy="1200000"/>
+            <a:off x="274320" y="1577340"/>
+            <a:ext cx="2011680" cy="1234440"/>
           </a:xfrm>
           <a:prstGeom prst="roundRect">
             <a:avLst/>
@@ -4415,7 +4415,7 @@
           <a:p>
             <a:pPr algn="l"/>
             <a:r>
-              <a:rPr lang="en-US" sz="1889" dirty="0">
+              <a:rPr lang="en-US" sz="1944" dirty="0">
                 <a:solidFill>
                   <a:srgbClr val="FFFFFF"/>
                 </a:solidFill>
@@ -4435,8 +4435,8 @@
         </p:nvSpPr>
         <p:spPr>
           <a:xfrm>
-            <a:off x="2500000" y="1600000"/>
-            <a:ext cx="2000000" cy="1200000"/>
+            <a:off x="2468880" y="1577340"/>
+            <a:ext cx="2011680" cy="1234440"/>
           </a:xfrm>
           <a:prstGeom prst="roundRect">
             <a:avLst/>
@@ -4453,7 +4453,7 @@
           <a:p>
             <a:pPr algn="l"/>
             <a:r>
-              <a:rPr lang="en-US" sz="1889" dirty="0">
+              <a:rPr lang="en-US" sz="1944" dirty="0">
                 <a:solidFill>
                   <a:srgbClr val="000000"/>
                 </a:solidFill>
@@ -4473,8 +4473,8 @@
         </p:nvSpPr>
         <p:spPr>
           <a:xfrm>
-            <a:off x="4700000" y="1600000"/>
-            <a:ext cx="2000000" cy="1200000"/>
+            <a:off x="4663440" y="1577340"/>
+            <a:ext cx="2011680" cy="1234440"/>
           </a:xfrm>
           <a:prstGeom prst="roundRect">
             <a:avLst/>
@@ -4491,7 +4491,7 @@
           <a:p>
             <a:pPr algn="l"/>
             <a:r>
-              <a:rPr lang="en-US" sz="1889" dirty="0">
+              <a:rPr lang="en-US" sz="1944" dirty="0">
                 <a:solidFill>
                   <a:srgbClr val="000000"/>
                 </a:solidFill>
@@ -4511,8 +4511,8 @@
         </p:nvSpPr>
         <p:spPr>
           <a:xfrm>
-            <a:off x="6900000" y="1600000"/>
-            <a:ext cx="2000000" cy="1200000"/>
+            <a:off x="6858000" y="1577340"/>
+            <a:ext cx="2011680" cy="1234440"/>
           </a:xfrm>
           <a:prstGeom prst="roundRect">
             <a:avLst/>
@@ -4529,7 +4529,7 @@
           <a:p>
             <a:pPr algn="l"/>
             <a:r>
-              <a:rPr lang="en-US" sz="1889" dirty="0">
+              <a:rPr lang="en-US" sz="1944" dirty="0">
                 <a:solidFill>
                   <a:srgbClr val="000000"/>
                 </a:solidFill>
@@ -4549,8 +4549,8 @@
         </p:nvSpPr>
         <p:spPr>
           <a:xfrm>
-            <a:off x="1800000" y="2600000"/>
-            <a:ext cx="300000" cy="300000"/>
+            <a:off x="1280160" y="2880360"/>
+            <a:ext cx="274320" cy="274320"/>
           </a:xfrm>
           <a:prstGeom prst="ellipse">
             <a:avLst/>
@@ -4573,8 +4573,8 @@
         </p:nvSpPr>
         <p:spPr>
           <a:xfrm>
-            <a:off x="4000000" y="2600000"/>
-            <a:ext cx="300000" cy="300000"/>
+            <a:off x="3474720" y="2880360"/>
+            <a:ext cx="274320" cy="274320"/>
           </a:xfrm>
           <a:prstGeom prst="ellipse">
             <a:avLst/>
@@ -4597,8 +4597,8 @@
         </p:nvSpPr>
         <p:spPr>
           <a:xfrm>
-            <a:off x="6200000" y="2600000"/>
-            <a:ext cx="300000" cy="300000"/>
+            <a:off x="5669280" y="2880360"/>
+            <a:ext cx="274320" cy="274320"/>
           </a:xfrm>
           <a:prstGeom prst="ellipse">
             <a:avLst/>
@@ -4621,8 +4621,8 @@
         </p:nvSpPr>
         <p:spPr>
           <a:xfrm>
-            <a:off x="8400000" y="2600000"/>
-            <a:ext cx="300000" cy="300000"/>
+            <a:off x="7863840" y="2880360"/>
+            <a:ext cx="274320" cy="274320"/>
           </a:xfrm>
           <a:prstGeom prst="ellipse">
             <a:avLst/>
@@ -6915,7 +6915,7 @@
         <a:graphic>
           <a:graphicData uri="http://schemas.openxmlformats.org/drawingml/2006/table">
             <a:tbl>
-              <a:tblPr firstRow="1" bandHVals="1"/>
+              <a:tblPr firstRow="1" bandRow="1"/>
               <a:tblGrid>
                 <a:gridCol w="2000000"/>
                 <a:gridCol w="2000000"/>
@@ -7567,7 +7567,7 @@
         <a:graphic>
           <a:graphicData uri="http://schemas.openxmlformats.org/drawingml/2006/table">
             <a:tbl>
-              <a:tblPr firstRow="1" bandHVals="1"/>
+              <a:tblPr firstRow="1" bandRow="1"/>
               <a:tblGrid>
                 <a:gridCol w="1800000"/>
                 <a:gridCol w="2000000"/>
@@ -8183,7 +8183,7 @@
         <a:graphic>
           <a:graphicData uri="http://schemas.openxmlformats.org/drawingml/2006/table">
             <a:tbl>
-              <a:tblPr firstRow="1" bandHVals="1"/>
+              <a:tblPr firstRow="1" bandRow="1"/>
               <a:tblGrid>
                 <a:gridCol w="1500000"/>
                 <a:gridCol w="2000000"/>
@@ -9028,7 +9028,7 @@
         <a:graphic>
           <a:graphicData uri="http://schemas.openxmlformats.org/drawingml/2006/table">
             <a:tbl>
-              <a:tblPr firstRow="1" bandHVals="1"/>
+              <a:tblPr firstRow="1" bandRow="1"/>
               <a:tblGrid>
                 <a:gridCol w="1500000"/>
                 <a:gridCol w="1500000"/>

</xml_diff>